<commit_message>
slight tweaks to first day slides
</commit_message>
<xml_diff>
--- a/ClassMaterials/C_Pointers/C_KeyConcepts.pptx
+++ b/ClassMaterials/C_Pointers/C_KeyConcepts.pptx
@@ -5,10 +5,10 @@
     <p:sldMasterId id="2147483648" r:id="rId1"/>
   </p:sldMasterIdLst>
   <p:notesMasterIdLst>
-    <p:notesMasterId r:id="rId17"/>
+    <p:notesMasterId r:id="rId18"/>
   </p:notesMasterIdLst>
   <p:handoutMasterIdLst>
-    <p:handoutMasterId r:id="rId18"/>
+    <p:handoutMasterId r:id="rId19"/>
   </p:handoutMasterIdLst>
   <p:sldIdLst>
     <p:sldId id="256" r:id="rId2"/>
@@ -17,15 +17,16 @@
     <p:sldId id="260" r:id="rId5"/>
     <p:sldId id="261" r:id="rId6"/>
     <p:sldId id="262" r:id="rId7"/>
-    <p:sldId id="263" r:id="rId8"/>
-    <p:sldId id="264" r:id="rId9"/>
-    <p:sldId id="265" r:id="rId10"/>
-    <p:sldId id="267" r:id="rId11"/>
-    <p:sldId id="270" r:id="rId12"/>
-    <p:sldId id="268" r:id="rId13"/>
-    <p:sldId id="269" r:id="rId14"/>
-    <p:sldId id="272" r:id="rId15"/>
-    <p:sldId id="273" r:id="rId16"/>
+    <p:sldId id="275" r:id="rId8"/>
+    <p:sldId id="263" r:id="rId9"/>
+    <p:sldId id="264" r:id="rId10"/>
+    <p:sldId id="265" r:id="rId11"/>
+    <p:sldId id="267" r:id="rId12"/>
+    <p:sldId id="270" r:id="rId13"/>
+    <p:sldId id="268" r:id="rId14"/>
+    <p:sldId id="269" r:id="rId15"/>
+    <p:sldId id="272" r:id="rId16"/>
+    <p:sldId id="273" r:id="rId17"/>
   </p:sldIdLst>
   <p:sldSz cx="12192000" cy="6858000"/>
   <p:notesSz cx="6858000" cy="9144000"/>
@@ -135,11 +136,160 @@
 <file path=ppt/revisionInfo.xml><?xml version="1.0" encoding="utf-8"?>
 <p1510:revInfo xmlns:a="http://schemas.openxmlformats.org/drawingml/2006/main" xmlns:r="http://schemas.openxmlformats.org/officeDocument/2006/relationships" xmlns:p1510="http://schemas.microsoft.com/office/powerpoint/2015/10/main">
   <p1510:revLst>
-    <p1510:client id="{39116058-B272-44EB-BDF4-D05357F62572}" v="10" dt="2018-11-27T17:08:39.441"/>
-    <p1510:client id="{9B463344-EDF8-9344-AAF0-AD49484A464D}" v="1" dt="2018-11-27T12:55:57.635"/>
-    <p1510:client id="{F1363261-8D11-44FF-ADEE-C24CC4347217}" v="575" dt="2019-12-02T18:57:03.156"/>
+    <p1510:client id="{F0CC25B3-27B1-40D6-B9B6-19EBD35E11D7}" v="6" dt="2020-03-09T17:43:54.737"/>
   </p1510:revLst>
 </p1510:revInfo>
+</file>
+
+<file path=ppt/changesInfos/changesInfo1.xml><?xml version="1.0" encoding="utf-8"?>
+<pc:chgInfo xmlns:a="http://schemas.openxmlformats.org/drawingml/2006/main" xmlns:r="http://schemas.openxmlformats.org/officeDocument/2006/relationships" xmlns:ac="http://schemas.microsoft.com/office/drawing/2013/main/command" xmlns:pc="http://schemas.microsoft.com/office/powerpoint/2013/main/command">
+  <pc:docChgLst>
+    <pc:chgData name="Hewner, Mike" userId="7f3f83dd-6dfb-4127-a87f-c1714bd4fac9" providerId="ADAL" clId="{F0CC25B3-27B1-40D6-B9B6-19EBD35E11D7}"/>
+    <pc:docChg chg="custSel addSld modSld">
+      <pc:chgData name="Hewner, Mike" userId="7f3f83dd-6dfb-4127-a87f-c1714bd4fac9" providerId="ADAL" clId="{F0CC25B3-27B1-40D6-B9B6-19EBD35E11D7}" dt="2020-03-09T17:43:54.737" v="257"/>
+      <pc:docMkLst>
+        <pc:docMk/>
+      </pc:docMkLst>
+      <pc:sldChg chg="delSp modSp">
+        <pc:chgData name="Hewner, Mike" userId="7f3f83dd-6dfb-4127-a87f-c1714bd4fac9" providerId="ADAL" clId="{F0CC25B3-27B1-40D6-B9B6-19EBD35E11D7}" dt="2020-03-09T17:42:13.962" v="238" actId="20577"/>
+        <pc:sldMkLst>
+          <pc:docMk/>
+          <pc:sldMk cId="1738752709" sldId="262"/>
+        </pc:sldMkLst>
+        <pc:spChg chg="mod">
+          <ac:chgData name="Hewner, Mike" userId="7f3f83dd-6dfb-4127-a87f-c1714bd4fac9" providerId="ADAL" clId="{F0CC25B3-27B1-40D6-B9B6-19EBD35E11D7}" dt="2020-03-09T17:42:13.962" v="238" actId="20577"/>
+          <ac:spMkLst>
+            <pc:docMk/>
+            <pc:sldMk cId="1738752709" sldId="262"/>
+            <ac:spMk id="3" creationId="{BC481C08-DED1-FF4E-89FF-313FC91DD323}"/>
+          </ac:spMkLst>
+        </pc:spChg>
+        <pc:spChg chg="del">
+          <ac:chgData name="Hewner, Mike" userId="7f3f83dd-6dfb-4127-a87f-c1714bd4fac9" providerId="ADAL" clId="{F0CC25B3-27B1-40D6-B9B6-19EBD35E11D7}" dt="2020-03-09T17:42:01.821" v="211" actId="478"/>
+          <ac:spMkLst>
+            <pc:docMk/>
+            <pc:sldMk cId="1738752709" sldId="262"/>
+            <ac:spMk id="4" creationId="{CDE73A0F-6A64-4314-A610-485FD95318F6}"/>
+          </ac:spMkLst>
+        </pc:spChg>
+      </pc:sldChg>
+      <pc:sldChg chg="modSp">
+        <pc:chgData name="Hewner, Mike" userId="7f3f83dd-6dfb-4127-a87f-c1714bd4fac9" providerId="ADAL" clId="{F0CC25B3-27B1-40D6-B9B6-19EBD35E11D7}" dt="2020-03-09T17:42:46.885" v="240"/>
+        <pc:sldMkLst>
+          <pc:docMk/>
+          <pc:sldMk cId="2847988046" sldId="263"/>
+        </pc:sldMkLst>
+        <pc:spChg chg="mod">
+          <ac:chgData name="Hewner, Mike" userId="7f3f83dd-6dfb-4127-a87f-c1714bd4fac9" providerId="ADAL" clId="{F0CC25B3-27B1-40D6-B9B6-19EBD35E11D7}" dt="2020-03-09T17:42:31.251" v="239" actId="6549"/>
+          <ac:spMkLst>
+            <pc:docMk/>
+            <pc:sldMk cId="2847988046" sldId="263"/>
+            <ac:spMk id="3" creationId="{857737CA-6CBF-D64B-B8E1-9155F1242E27}"/>
+          </ac:spMkLst>
+        </pc:spChg>
+        <pc:spChg chg="mod">
+          <ac:chgData name="Hewner, Mike" userId="7f3f83dd-6dfb-4127-a87f-c1714bd4fac9" providerId="ADAL" clId="{F0CC25B3-27B1-40D6-B9B6-19EBD35E11D7}" dt="2020-03-09T17:42:46.885" v="240"/>
+          <ac:spMkLst>
+            <pc:docMk/>
+            <pc:sldMk cId="2847988046" sldId="263"/>
+            <ac:spMk id="4" creationId="{887E4CCD-9FCE-D946-8454-9D646FF6F57E}"/>
+          </ac:spMkLst>
+        </pc:spChg>
+      </pc:sldChg>
+      <pc:sldChg chg="modSp">
+        <pc:chgData name="Hewner, Mike" userId="7f3f83dd-6dfb-4127-a87f-c1714bd4fac9" providerId="ADAL" clId="{F0CC25B3-27B1-40D6-B9B6-19EBD35E11D7}" dt="2020-03-09T17:43:11.680" v="254" actId="20577"/>
+        <pc:sldMkLst>
+          <pc:docMk/>
+          <pc:sldMk cId="426053574" sldId="267"/>
+        </pc:sldMkLst>
+        <pc:spChg chg="mod">
+          <ac:chgData name="Hewner, Mike" userId="7f3f83dd-6dfb-4127-a87f-c1714bd4fac9" providerId="ADAL" clId="{F0CC25B3-27B1-40D6-B9B6-19EBD35E11D7}" dt="2020-03-09T17:43:11.680" v="254" actId="20577"/>
+          <ac:spMkLst>
+            <pc:docMk/>
+            <pc:sldMk cId="426053574" sldId="267"/>
+            <ac:spMk id="3" creationId="{7DCF15DE-508F-4DC3-AB29-34E60EDE79AE}"/>
+          </ac:spMkLst>
+        </pc:spChg>
+      </pc:sldChg>
+      <pc:sldChg chg="modSp">
+        <pc:chgData name="Hewner, Mike" userId="7f3f83dd-6dfb-4127-a87f-c1714bd4fac9" providerId="ADAL" clId="{F0CC25B3-27B1-40D6-B9B6-19EBD35E11D7}" dt="2020-03-09T17:43:49.631" v="256" actId="1076"/>
+        <pc:sldMkLst>
+          <pc:docMk/>
+          <pc:sldMk cId="2828717473" sldId="269"/>
+        </pc:sldMkLst>
+        <pc:spChg chg="mod">
+          <ac:chgData name="Hewner, Mike" userId="7f3f83dd-6dfb-4127-a87f-c1714bd4fac9" providerId="ADAL" clId="{F0CC25B3-27B1-40D6-B9B6-19EBD35E11D7}" dt="2020-03-09T17:43:49.631" v="256" actId="1076"/>
+          <ac:spMkLst>
+            <pc:docMk/>
+            <pc:sldMk cId="2828717473" sldId="269"/>
+            <ac:spMk id="4" creationId="{403A24A4-7151-4D4B-97ED-2BA97DC5A2D8}"/>
+          </ac:spMkLst>
+        </pc:spChg>
+      </pc:sldChg>
+      <pc:sldChg chg="modSp">
+        <pc:chgData name="Hewner, Mike" userId="7f3f83dd-6dfb-4127-a87f-c1714bd4fac9" providerId="ADAL" clId="{F0CC25B3-27B1-40D6-B9B6-19EBD35E11D7}" dt="2020-03-09T17:43:33.329" v="255"/>
+        <pc:sldMkLst>
+          <pc:docMk/>
+          <pc:sldMk cId="1866616194" sldId="270"/>
+        </pc:sldMkLst>
+        <pc:spChg chg="mod">
+          <ac:chgData name="Hewner, Mike" userId="7f3f83dd-6dfb-4127-a87f-c1714bd4fac9" providerId="ADAL" clId="{F0CC25B3-27B1-40D6-B9B6-19EBD35E11D7}" dt="2020-03-09T17:43:33.329" v="255"/>
+          <ac:spMkLst>
+            <pc:docMk/>
+            <pc:sldMk cId="1866616194" sldId="270"/>
+            <ac:spMk id="4" creationId="{887E4CCD-9FCE-D946-8454-9D646FF6F57E}"/>
+          </ac:spMkLst>
+        </pc:spChg>
+      </pc:sldChg>
+      <pc:sldChg chg="modSp">
+        <pc:chgData name="Hewner, Mike" userId="7f3f83dd-6dfb-4127-a87f-c1714bd4fac9" providerId="ADAL" clId="{F0CC25B3-27B1-40D6-B9B6-19EBD35E11D7}" dt="2020-03-09T17:43:54.737" v="257"/>
+        <pc:sldMkLst>
+          <pc:docMk/>
+          <pc:sldMk cId="1905498065" sldId="273"/>
+        </pc:sldMkLst>
+        <pc:spChg chg="mod">
+          <ac:chgData name="Hewner, Mike" userId="7f3f83dd-6dfb-4127-a87f-c1714bd4fac9" providerId="ADAL" clId="{F0CC25B3-27B1-40D6-B9B6-19EBD35E11D7}" dt="2020-03-09T17:43:54.737" v="257"/>
+          <ac:spMkLst>
+            <pc:docMk/>
+            <pc:sldMk cId="1905498065" sldId="273"/>
+            <ac:spMk id="4" creationId="{887E4CCD-9FCE-D946-8454-9D646FF6F57E}"/>
+          </ac:spMkLst>
+        </pc:spChg>
+      </pc:sldChg>
+      <pc:sldChg chg="addSp delSp modSp add">
+        <pc:chgData name="Hewner, Mike" userId="7f3f83dd-6dfb-4127-a87f-c1714bd4fac9" providerId="ADAL" clId="{F0CC25B3-27B1-40D6-B9B6-19EBD35E11D7}" dt="2020-03-09T17:41:55.639" v="210" actId="1076"/>
+        <pc:sldMkLst>
+          <pc:docMk/>
+          <pc:sldMk cId="1268965906" sldId="275"/>
+        </pc:sldMkLst>
+        <pc:spChg chg="mod">
+          <ac:chgData name="Hewner, Mike" userId="7f3f83dd-6dfb-4127-a87f-c1714bd4fac9" providerId="ADAL" clId="{F0CC25B3-27B1-40D6-B9B6-19EBD35E11D7}" dt="2020-03-09T17:28:01.156" v="18" actId="20577"/>
+          <ac:spMkLst>
+            <pc:docMk/>
+            <pc:sldMk cId="1268965906" sldId="275"/>
+            <ac:spMk id="2" creationId="{876FF073-80BD-404B-B770-494A22972105}"/>
+          </ac:spMkLst>
+        </pc:spChg>
+        <pc:spChg chg="del">
+          <ac:chgData name="Hewner, Mike" userId="7f3f83dd-6dfb-4127-a87f-c1714bd4fac9" providerId="ADAL" clId="{F0CC25B3-27B1-40D6-B9B6-19EBD35E11D7}" dt="2020-03-09T17:41:48.034" v="209" actId="478"/>
+          <ac:spMkLst>
+            <pc:docMk/>
+            <pc:sldMk cId="1268965906" sldId="275"/>
+            <ac:spMk id="3" creationId="{481BD68F-BEC3-426A-9172-278CC649E8D9}"/>
+          </ac:spMkLst>
+        </pc:spChg>
+        <pc:spChg chg="add mod">
+          <ac:chgData name="Hewner, Mike" userId="7f3f83dd-6dfb-4127-a87f-c1714bd4fac9" providerId="ADAL" clId="{F0CC25B3-27B1-40D6-B9B6-19EBD35E11D7}" dt="2020-03-09T17:41:55.639" v="210" actId="1076"/>
+          <ac:spMkLst>
+            <pc:docMk/>
+            <pc:sldMk cId="1268965906" sldId="275"/>
+            <ac:spMk id="4" creationId="{1E8B9F02-B87F-4D50-8352-3E153AF69A1A}"/>
+          </ac:spMkLst>
+        </pc:spChg>
+      </pc:sldChg>
+    </pc:docChg>
+  </pc:docChgLst>
+</pc:chgInfo>
 </file>
 
 <file path=ppt/handoutMasters/handoutMaster1.xml><?xml version="1.0" encoding="utf-8"?>
@@ -236,7 +386,7 @@
           <a:p>
             <a:fld id="{B2F99CBE-2880-364F-A223-8E393E38EFAB}" type="datetimeFigureOut">
               <a:rPr lang="en-US" smtClean="0"/>
-              <a:t>12/2/2019</a:t>
+              <a:t>3/9/2020</a:t>
             </a:fld>
             <a:endParaRPr lang="en-US"/>
           </a:p>
@@ -413,7 +563,7 @@
           <a:p>
             <a:fld id="{8D9AE51D-F948-044F-B984-1DA50063DADE}" type="datetimeFigureOut">
               <a:rPr lang="en-US" smtClean="0"/>
-              <a:t>12/2/2019</a:t>
+              <a:t>3/9/2020</a:t>
             </a:fld>
             <a:endParaRPr lang="en-US"/>
           </a:p>
@@ -995,7 +1145,7 @@
           <a:p>
             <a:fld id="{82A73E24-5133-184A-B08C-013331FC8007}" type="datetimeFigureOut">
               <a:rPr lang="en-US" smtClean="0"/>
-              <a:t>12/2/2019</a:t>
+              <a:t>3/9/2020</a:t>
             </a:fld>
             <a:endParaRPr lang="en-US"/>
           </a:p>
@@ -1275,7 +1425,7 @@
           <a:p>
             <a:fld id="{82A73E24-5133-184A-B08C-013331FC8007}" type="datetimeFigureOut">
               <a:rPr lang="en-US" smtClean="0"/>
-              <a:t>12/2/2019</a:t>
+              <a:t>3/9/2020</a:t>
             </a:fld>
             <a:endParaRPr lang="en-US"/>
           </a:p>
@@ -1483,7 +1633,7 @@
           <a:p>
             <a:fld id="{82A73E24-5133-184A-B08C-013331FC8007}" type="datetimeFigureOut">
               <a:rPr lang="en-US" smtClean="0"/>
-              <a:t>12/2/2019</a:t>
+              <a:t>3/9/2020</a:t>
             </a:fld>
             <a:endParaRPr lang="en-US"/>
           </a:p>
@@ -1723,7 +1873,7 @@
           <a:p>
             <a:fld id="{82A73E24-5133-184A-B08C-013331FC8007}" type="datetimeFigureOut">
               <a:rPr lang="en-US" smtClean="0"/>
-              <a:t>12/2/2019</a:t>
+              <a:t>3/9/2020</a:t>
             </a:fld>
             <a:endParaRPr lang="en-US"/>
           </a:p>
@@ -2025,7 +2175,7 @@
           <a:p>
             <a:fld id="{82A73E24-5133-184A-B08C-013331FC8007}" type="datetimeFigureOut">
               <a:rPr lang="en-US" smtClean="0"/>
-              <a:t>12/2/2019</a:t>
+              <a:t>3/9/2020</a:t>
             </a:fld>
             <a:endParaRPr lang="en-US"/>
           </a:p>
@@ -2290,7 +2440,7 @@
           <a:p>
             <a:fld id="{82A73E24-5133-184A-B08C-013331FC8007}" type="datetimeFigureOut">
               <a:rPr lang="en-US" smtClean="0"/>
-              <a:t>12/2/2019</a:t>
+              <a:t>3/9/2020</a:t>
             </a:fld>
             <a:endParaRPr lang="en-US"/>
           </a:p>
@@ -2702,7 +2852,7 @@
           <a:p>
             <a:fld id="{82A73E24-5133-184A-B08C-013331FC8007}" type="datetimeFigureOut">
               <a:rPr lang="en-US" smtClean="0"/>
-              <a:t>12/2/2019</a:t>
+              <a:t>3/9/2020</a:t>
             </a:fld>
             <a:endParaRPr lang="en-US"/>
           </a:p>
@@ -2843,7 +2993,7 @@
           <a:p>
             <a:fld id="{82A73E24-5133-184A-B08C-013331FC8007}" type="datetimeFigureOut">
               <a:rPr lang="en-US" smtClean="0"/>
-              <a:t>12/2/2019</a:t>
+              <a:t>3/9/2020</a:t>
             </a:fld>
             <a:endParaRPr lang="en-US"/>
           </a:p>
@@ -2956,7 +3106,7 @@
           <a:p>
             <a:fld id="{82A73E24-5133-184A-B08C-013331FC8007}" type="datetimeFigureOut">
               <a:rPr lang="en-US" smtClean="0"/>
-              <a:t>12/2/2019</a:t>
+              <a:t>3/9/2020</a:t>
             </a:fld>
             <a:endParaRPr lang="en-US"/>
           </a:p>
@@ -3267,7 +3417,7 @@
           <a:p>
             <a:fld id="{82A73E24-5133-184A-B08C-013331FC8007}" type="datetimeFigureOut">
               <a:rPr lang="en-US" smtClean="0"/>
-              <a:t>12/2/2019</a:t>
+              <a:t>3/9/2020</a:t>
             </a:fld>
             <a:endParaRPr lang="en-US"/>
           </a:p>
@@ -3558,7 +3708,7 @@
           <a:p>
             <a:fld id="{82A73E24-5133-184A-B08C-013331FC8007}" type="datetimeFigureOut">
               <a:rPr lang="en-US" smtClean="0"/>
-              <a:t>12/2/2019</a:t>
+              <a:t>3/9/2020</a:t>
             </a:fld>
             <a:endParaRPr lang="en-US"/>
           </a:p>
@@ -3799,7 +3949,7 @@
           <a:p>
             <a:fld id="{82A73E24-5133-184A-B08C-013331FC8007}" type="datetimeFigureOut">
               <a:rPr lang="en-US" smtClean="0"/>
-              <a:t>12/2/2019</a:t>
+              <a:t>3/9/2020</a:t>
             </a:fld>
             <a:endParaRPr lang="en-US"/>
           </a:p>
@@ -4281,7 +4431,7 @@
           <a:p>
             <a:fld id="{B7B09853-F130-A44D-A7BC-226D14CA7C56}" type="datetime2">
               <a:rPr lang="en-US" smtClean="0"/>
-              <a:t>Monday, December 2, 2019</a:t>
+              <a:t>Monday, March 9, 2020</a:t>
             </a:fld>
             <a:endParaRPr lang="en-US"/>
           </a:p>
@@ -4322,7 +4472,7 @@
           <p:cNvPr id="2" name="Title 1">
             <a:extLst>
               <a:ext uri="{FF2B5EF4-FFF2-40B4-BE49-F238E27FC236}">
-                <a16:creationId xmlns:a16="http://schemas.microsoft.com/office/drawing/2014/main" id="{F08048C8-DACE-46B2-81AF-EEA6D3BFB94A}"/>
+                <a16:creationId xmlns:a16="http://schemas.microsoft.com/office/drawing/2014/main" id="{1CE9E348-A33D-7B49-A301-03CD7EFB51DD}"/>
               </a:ext>
             </a:extLst>
           </p:cNvPr>
@@ -4339,135 +4489,374 @@
           <a:lstStyle/>
           <a:p>
             <a:r>
+              <a:rPr lang="en-US"/>
+              <a:t>Malloc/Free example</a:t>
+            </a:r>
+          </a:p>
+        </p:txBody>
+      </p:sp>
+      <p:sp>
+        <p:nvSpPr>
+          <p:cNvPr id="4" name="Rectangle 3">
+            <a:extLst>
+              <a:ext uri="{FF2B5EF4-FFF2-40B4-BE49-F238E27FC236}">
+                <a16:creationId xmlns:a16="http://schemas.microsoft.com/office/drawing/2014/main" id="{B4ED3985-1387-7243-B391-F0433F88F2E6}"/>
+              </a:ext>
+            </a:extLst>
+          </p:cNvPr>
+          <p:cNvSpPr/>
+          <p:nvPr/>
+        </p:nvSpPr>
+        <p:spPr>
+          <a:xfrm>
+            <a:off x="2825261" y="1690688"/>
+            <a:ext cx="6096000" cy="3693319"/>
+          </a:xfrm>
+          <a:prstGeom prst="rect">
+            <a:avLst/>
+          </a:prstGeom>
+        </p:spPr>
+        <p:txBody>
+          <a:bodyPr>
+            <a:spAutoFit/>
+          </a:bodyPr>
+          <a:lstStyle/>
+          <a:p>
+            <a:pPr>
+              <a:buNone/>
+            </a:pPr>
+            <a:r>
               <a:rPr lang="en-US">
-                <a:cs typeface="Calibri Light"/>
-              </a:rPr>
-              <a:t>Malloc/Free Notes</a:t>
-            </a:r>
-            <a:endParaRPr lang="en-US"/>
-          </a:p>
-        </p:txBody>
-      </p:sp>
-      <p:sp>
-        <p:nvSpPr>
-          <p:cNvPr id="3" name="Content Placeholder 2">
-            <a:extLst>
-              <a:ext uri="{FF2B5EF4-FFF2-40B4-BE49-F238E27FC236}">
-                <a16:creationId xmlns:a16="http://schemas.microsoft.com/office/drawing/2014/main" id="{7DCF15DE-508F-4DC3-AB29-34E60EDE79AE}"/>
-              </a:ext>
-            </a:extLst>
-          </p:cNvPr>
-          <p:cNvSpPr>
-            <a:spLocks noGrp="1"/>
-          </p:cNvSpPr>
-          <p:nvPr>
-            <p:ph idx="1"/>
-          </p:nvPr>
-        </p:nvSpPr>
-        <p:spPr/>
-        <p:txBody>
-          <a:bodyPr vert="horz" lIns="91440" tIns="45720" rIns="91440" bIns="45720" rtlCol="0" anchor="t">
-            <a:normAutofit/>
-          </a:bodyPr>
-          <a:lstStyle/>
-          <a:p>
+                <a:latin typeface="Consolas"/>
+                <a:cs typeface="Calibri"/>
+              </a:rPr>
+              <a:t>void *</a:t>
+            </a:r>
+            <a:r>
+              <a:rPr lang="en-US" err="1">
+                <a:latin typeface="Consolas"/>
+                <a:cs typeface="Calibri"/>
+              </a:rPr>
+              <a:t>malloc_result</a:t>
+            </a:r>
             <a:r>
               <a:rPr lang="en-US">
-                <a:cs typeface="Calibri"/>
-              </a:rPr>
-              <a:t>You must free everything you -  C will not warn you memory leakage</a:t>
-            </a:r>
-          </a:p>
-          <a:p>
+                <a:latin typeface="Consolas"/>
+                <a:cs typeface="Calibri"/>
+              </a:rPr>
+              <a:t> = malloc(4*</a:t>
+            </a:r>
+            <a:r>
+              <a:rPr lang="en-US" err="1">
+                <a:latin typeface="Consolas"/>
+                <a:cs typeface="Calibri"/>
+              </a:rPr>
+              <a:t>sizeof</a:t>
+            </a:r>
             <a:r>
               <a:rPr lang="en-US">
-                <a:cs typeface="Calibri"/>
-              </a:rPr>
-              <a:t>You should check the return value of </a:t>
+                <a:latin typeface="Consolas"/>
+                <a:cs typeface="Calibri"/>
+              </a:rPr>
+              <a:t>(</a:t>
             </a:r>
             <a:r>
               <a:rPr lang="en-US" err="1">
-                <a:latin typeface="Anonymous Pro for Powerline" panose="02060609030202000504" pitchFamily="49" charset="0"/>
-                <a:ea typeface="Anonymous Pro for Powerline" panose="02060609030202000504" pitchFamily="49" charset="0"/>
-                <a:cs typeface="Calibri"/>
-              </a:rPr>
-              <a:t>malloc</a:t>
+                <a:latin typeface="Consolas"/>
+                <a:cs typeface="Calibri"/>
+              </a:rPr>
+              <a:t>int</a:t>
             </a:r>
             <a:r>
               <a:rPr lang="en-US">
-                <a:cs typeface="Calibri"/>
-              </a:rPr>
-              <a:t> to ensure it's not NULL</a:t>
-            </a:r>
-          </a:p>
-          <a:p>
+                <a:latin typeface="Consolas"/>
+                <a:cs typeface="Calibri"/>
+              </a:rPr>
+              <a:t>));</a:t>
+            </a:r>
+            <a:endParaRPr lang="en-US">
+              <a:latin typeface="Consolas"/>
+            </a:endParaRPr>
+          </a:p>
+          <a:p>
+            <a:pPr>
+              <a:buNone/>
+            </a:pPr>
             <a:r>
               <a:rPr lang="en-US">
-                <a:cs typeface="Calibri"/>
-              </a:rPr>
-              <a:t>You free by passing the same pointer to free that was originally returned from malloc</a:t>
-            </a:r>
-            <a:endParaRPr lang="en-US"/>
-          </a:p>
-          <a:p>
+                <a:latin typeface="Consolas"/>
+                <a:cs typeface="Calibri"/>
+              </a:rPr>
+              <a:t>if(</a:t>
+            </a:r>
+            <a:r>
+              <a:rPr lang="en-US" err="1">
+                <a:latin typeface="Consolas"/>
+                <a:cs typeface="Calibri"/>
+              </a:rPr>
+              <a:t>malloc_result</a:t>
+            </a:r>
             <a:r>
               <a:rPr lang="en-US">
-                <a:cs typeface="Calibri"/>
-              </a:rPr>
-              <a:t>The memory you </a:t>
-            </a:r>
+                <a:latin typeface="Consolas"/>
+                <a:cs typeface="Calibri"/>
+              </a:rPr>
+              <a:t> == NULL) {</a:t>
+            </a:r>
+            <a:endParaRPr lang="en-US">
+              <a:latin typeface="Consolas"/>
+            </a:endParaRPr>
+          </a:p>
+          <a:p>
+            <a:pPr>
+              <a:buNone/>
+            </a:pPr>
+            <a:r>
+              <a:rPr lang="en-US">
+                <a:latin typeface="Consolas"/>
+                <a:cs typeface="Calibri"/>
+              </a:rPr>
+              <a:t>    //malloc can of course fail if you're out of memory</a:t>
+            </a:r>
+            <a:endParaRPr lang="en-US">
+              <a:latin typeface="Consolas"/>
+            </a:endParaRPr>
+          </a:p>
+          <a:p>
+            <a:pPr>
+              <a:buNone/>
+            </a:pPr>
+            <a:r>
+              <a:rPr lang="en-US">
+                <a:latin typeface="Consolas"/>
+                <a:cs typeface="Calibri"/>
+              </a:rPr>
+              <a:t>    exit(77);</a:t>
+            </a:r>
+            <a:endParaRPr lang="en-US">
+              <a:latin typeface="Consolas"/>
+            </a:endParaRPr>
+          </a:p>
+          <a:p>
+            <a:pPr>
+              <a:buNone/>
+            </a:pPr>
+            <a:r>
+              <a:rPr lang="en-US">
+                <a:latin typeface="Consolas"/>
+                <a:cs typeface="Calibri"/>
+              </a:rPr>
+              <a:t>}</a:t>
+            </a:r>
+            <a:endParaRPr lang="en-US">
+              <a:latin typeface="Consolas"/>
+            </a:endParaRPr>
+          </a:p>
+          <a:p>
+            <a:pPr>
+              <a:buNone/>
+            </a:pPr>
             <a:r>
               <a:rPr lang="en-US" err="1">
-                <a:latin typeface="Anonymous Pro for Powerline" panose="02060609030202000504" pitchFamily="49" charset="0"/>
-                <a:ea typeface="Anonymous Pro for Powerline" panose="02060609030202000504" pitchFamily="49" charset="0"/>
-                <a:cs typeface="Calibri"/>
-              </a:rPr>
-              <a:t>malloc</a:t>
+                <a:latin typeface="Consolas"/>
+                <a:cs typeface="Calibri"/>
+              </a:rPr>
+              <a:t>int</a:t>
             </a:r>
             <a:r>
               <a:rPr lang="en-US">
-                <a:cs typeface="Calibri"/>
-              </a:rPr>
-              <a:t> is filled with garbage data</a:t>
-            </a:r>
-          </a:p>
-          <a:p>
+                <a:latin typeface="Consolas"/>
+                <a:cs typeface="Calibri"/>
+              </a:rPr>
+              <a:t> *data = </a:t>
+            </a:r>
+            <a:r>
+              <a:rPr lang="en-US" err="1">
+                <a:latin typeface="Consolas"/>
+                <a:cs typeface="Calibri"/>
+              </a:rPr>
+              <a:t>malloc_result</a:t>
+            </a:r>
             <a:r>
               <a:rPr lang="en-US">
-                <a:cs typeface="Calibri"/>
-              </a:rPr>
-              <a:t>Don’t access freed memory though it may be still there</a:t>
-            </a:r>
-          </a:p>
-          <a:p>
+                <a:latin typeface="Consolas"/>
+                <a:cs typeface="Calibri"/>
+              </a:rPr>
+              <a:t>;</a:t>
+            </a:r>
+            <a:endParaRPr lang="en-US">
+              <a:latin typeface="Consolas"/>
+            </a:endParaRPr>
+          </a:p>
+          <a:p>
+            <a:pPr>
+              <a:buNone/>
+            </a:pPr>
             <a:r>
               <a:rPr lang="en-US">
-                <a:cs typeface="Calibri"/>
-              </a:rPr>
-              <a:t>Freeing the same memory twice is unsafe</a:t>
-            </a:r>
-          </a:p>
-          <a:p>
+                <a:latin typeface="Consolas"/>
+                <a:cs typeface="Calibri"/>
+              </a:rPr>
+              <a:t>for(</a:t>
+            </a:r>
+            <a:r>
+              <a:rPr lang="en-US" err="1">
+                <a:latin typeface="Consolas"/>
+                <a:cs typeface="Calibri"/>
+              </a:rPr>
+              <a:t>int</a:t>
+            </a:r>
+            <a:r>
+              <a:rPr lang="en-US">
+                <a:latin typeface="Consolas"/>
+                <a:cs typeface="Calibri"/>
+              </a:rPr>
+              <a:t> </a:t>
+            </a:r>
+            <a:r>
+              <a:rPr lang="en-US" err="1">
+                <a:latin typeface="Consolas"/>
+                <a:cs typeface="Calibri"/>
+              </a:rPr>
+              <a:t>i</a:t>
+            </a:r>
+            <a:r>
+              <a:rPr lang="en-US">
+                <a:latin typeface="Consolas"/>
+                <a:cs typeface="Calibri"/>
+              </a:rPr>
+              <a:t> = 0; </a:t>
+            </a:r>
+            <a:r>
+              <a:rPr lang="en-US" err="1">
+                <a:latin typeface="Consolas"/>
+                <a:cs typeface="Calibri"/>
+              </a:rPr>
+              <a:t>i</a:t>
+            </a:r>
+            <a:r>
+              <a:rPr lang="en-US">
+                <a:latin typeface="Consolas"/>
+                <a:cs typeface="Calibri"/>
+              </a:rPr>
+              <a:t> &lt; 4; </a:t>
+            </a:r>
+            <a:r>
+              <a:rPr lang="en-US" err="1">
+                <a:latin typeface="Consolas"/>
+                <a:cs typeface="Calibri"/>
+              </a:rPr>
+              <a:t>i</a:t>
+            </a:r>
+            <a:r>
+              <a:rPr lang="en-US">
+                <a:latin typeface="Consolas"/>
+                <a:cs typeface="Calibri"/>
+              </a:rPr>
+              <a:t>++) {</a:t>
+            </a:r>
             <a:endParaRPr lang="en-US">
-              <a:cs typeface="Calibri"/>
+              <a:latin typeface="Consolas"/>
             </a:endParaRPr>
           </a:p>
           <a:p>
+            <a:pPr>
+              <a:buNone/>
+            </a:pPr>
+            <a:r>
+              <a:rPr lang="en-US">
+                <a:latin typeface="Consolas"/>
+                <a:cs typeface="Calibri"/>
+              </a:rPr>
+              <a:t>  data[</a:t>
+            </a:r>
+            <a:r>
+              <a:rPr lang="en-US" err="1">
+                <a:latin typeface="Consolas"/>
+                <a:cs typeface="Calibri"/>
+              </a:rPr>
+              <a:t>i</a:t>
+            </a:r>
+            <a:r>
+              <a:rPr lang="en-US">
+                <a:latin typeface="Consolas"/>
+                <a:cs typeface="Calibri"/>
+              </a:rPr>
+              <a:t>] = i+1;</a:t>
+            </a:r>
             <a:endParaRPr lang="en-US">
-              <a:cs typeface="Calibri"/>
+              <a:latin typeface="Consolas"/>
             </a:endParaRPr>
           </a:p>
           <a:p>
+            <a:pPr>
+              <a:buNone/>
+            </a:pPr>
+            <a:r>
+              <a:rPr lang="en-US">
+                <a:latin typeface="Consolas"/>
+                <a:cs typeface="Calibri"/>
+              </a:rPr>
+              <a:t>}</a:t>
+            </a:r>
             <a:endParaRPr lang="en-US">
-              <a:cs typeface="Calibri"/>
+              <a:latin typeface="Consolas"/>
             </a:endParaRPr>
+          </a:p>
+          <a:p>
+            <a:pPr>
+              <a:buNone/>
+            </a:pPr>
+            <a:r>
+              <a:rPr lang="en-US" err="1">
+                <a:latin typeface="Consolas"/>
+                <a:cs typeface="Calibri"/>
+              </a:rPr>
+              <a:t>printf</a:t>
+            </a:r>
+            <a:r>
+              <a:rPr lang="en-US">
+                <a:latin typeface="Consolas"/>
+                <a:cs typeface="Calibri"/>
+              </a:rPr>
+              <a:t>("data %d %d %d %d\n", data[0], data[1], data[2], data[3]);</a:t>
+            </a:r>
+            <a:endParaRPr lang="en-US">
+              <a:latin typeface="Consolas"/>
+            </a:endParaRPr>
+          </a:p>
+          <a:p>
+            <a:pPr>
+              <a:buNone/>
+            </a:pPr>
+            <a:r>
+              <a:rPr lang="en-US">
+                <a:latin typeface="Consolas"/>
+                <a:cs typeface="Calibri"/>
+              </a:rPr>
+              <a:t>free(</a:t>
+            </a:r>
+            <a:r>
+              <a:rPr lang="en-US" err="1">
+                <a:latin typeface="Consolas"/>
+                <a:cs typeface="Calibri"/>
+              </a:rPr>
+              <a:t>malloc_result</a:t>
+            </a:r>
+            <a:r>
+              <a:rPr lang="en-US">
+                <a:latin typeface="Consolas"/>
+                <a:cs typeface="Calibri"/>
+              </a:rPr>
+              <a:t>);</a:t>
+            </a:r>
           </a:p>
         </p:txBody>
       </p:sp>
     </p:spTree>
     <p:extLst>
       <p:ext uri="{BB962C8B-B14F-4D97-AF65-F5344CB8AC3E}">
-        <p14:creationId xmlns:p14="http://schemas.microsoft.com/office/powerpoint/2010/main" val="426053574"/>
+        <p14:creationId xmlns:p14="http://schemas.microsoft.com/office/powerpoint/2010/main" val="2054888560"/>
       </p:ext>
     </p:extLst>
   </p:cSld>
@@ -4499,7 +4888,7 @@
           <p:cNvPr id="2" name="Title 1">
             <a:extLst>
               <a:ext uri="{FF2B5EF4-FFF2-40B4-BE49-F238E27FC236}">
-                <a16:creationId xmlns:a16="http://schemas.microsoft.com/office/drawing/2014/main" id="{9D5B93B6-31DC-0944-9275-F32583D1F2C1}"/>
+                <a16:creationId xmlns:a16="http://schemas.microsoft.com/office/drawing/2014/main" id="{F08048C8-DACE-46B2-81AF-EEA6D3BFB94A}"/>
               </a:ext>
             </a:extLst>
           </p:cNvPr>
@@ -4516,9 +4905,12 @@
           <a:lstStyle/>
           <a:p>
             <a:r>
-              <a:rPr lang="en-US"/>
-              <a:t>Activity</a:t>
-            </a:r>
+              <a:rPr lang="en-US">
+                <a:cs typeface="Calibri Light"/>
+              </a:rPr>
+              <a:t>Malloc/Free Notes</a:t>
+            </a:r>
+            <a:endParaRPr lang="en-US"/>
           </a:p>
         </p:txBody>
       </p:sp>
@@ -4527,7 +4919,7 @@
           <p:cNvPr id="3" name="Content Placeholder 2">
             <a:extLst>
               <a:ext uri="{FF2B5EF4-FFF2-40B4-BE49-F238E27FC236}">
-                <a16:creationId xmlns:a16="http://schemas.microsoft.com/office/drawing/2014/main" id="{857737CA-6CBF-D64B-B8E1-9155F1242E27}"/>
+                <a16:creationId xmlns:a16="http://schemas.microsoft.com/office/drawing/2014/main" id="{7DCF15DE-508F-4DC3-AB29-34E60EDE79AE}"/>
               </a:ext>
             </a:extLst>
           </p:cNvPr>
@@ -4540,203 +4932,108 @@
         </p:nvSpPr>
         <p:spPr/>
         <p:txBody>
-          <a:bodyPr/>
-          <a:lstStyle/>
-          <a:p>
-            <a:r>
-              <a:rPr lang="en-US">
-                <a:cs typeface="Calibri"/>
-              </a:rPr>
-              <a:t>Do </a:t>
-            </a:r>
-            <a:r>
-              <a:rPr lang="en-US" b="1" i="1">
-                <a:cs typeface="Calibri"/>
-              </a:rPr>
-              <a:t>Step 2 </a:t>
-            </a:r>
-            <a:r>
-              <a:rPr lang="en-US">
-                <a:cs typeface="Calibri"/>
-              </a:rPr>
-              <a:t>of today's activity within </a:t>
-            </a:r>
-            <a:r>
-              <a:rPr lang="en-US" err="1">
-                <a:cs typeface="Calibri"/>
-              </a:rPr>
-              <a:t>repl</a:t>
-            </a:r>
-            <a:r>
-              <a:rPr lang="en-US">
-                <a:cs typeface="Calibri"/>
-              </a:rPr>
-              <a:t> (that's the first test case)</a:t>
-            </a:r>
-          </a:p>
-          <a:p>
-            <a:r>
-              <a:rPr lang="en-US">
-                <a:cs typeface="Calibri"/>
-              </a:rPr>
-              <a:t>You can work in groups of 2 if you wish</a:t>
-            </a:r>
-          </a:p>
-          <a:p>
-            <a:endParaRPr lang="en-US"/>
-          </a:p>
-          <a:p>
-            <a:endParaRPr lang="en-US"/>
-          </a:p>
-          <a:p>
-            <a:endParaRPr lang="en-US"/>
-          </a:p>
-        </p:txBody>
-      </p:sp>
-      <p:sp>
-        <p:nvSpPr>
-          <p:cNvPr id="4" name="Rectangle 3">
-            <a:extLst>
-              <a:ext uri="{FF2B5EF4-FFF2-40B4-BE49-F238E27FC236}">
-                <a16:creationId xmlns:a16="http://schemas.microsoft.com/office/drawing/2014/main" id="{887E4CCD-9FCE-D946-8454-9D646FF6F57E}"/>
-              </a:ext>
-            </a:extLst>
-          </p:cNvPr>
-          <p:cNvSpPr/>
-          <p:nvPr/>
-        </p:nvSpPr>
-        <p:spPr>
-          <a:xfrm>
-            <a:off x="1443300" y="4396154"/>
-            <a:ext cx="8789586" cy="523220"/>
-          </a:xfrm>
-          <a:prstGeom prst="rect">
-            <a:avLst/>
-          </a:prstGeom>
-          <a:ln>
-            <a:headEnd type="none" w="med" len="med"/>
-            <a:tailEnd type="none" w="med" len="med"/>
-          </a:ln>
-        </p:spPr>
-        <p:style>
-          <a:lnRef idx="0">
-            <a:schemeClr val="accent1"/>
-          </a:lnRef>
-          <a:fillRef idx="3">
-            <a:schemeClr val="accent1"/>
-          </a:fillRef>
-          <a:effectRef idx="3">
-            <a:schemeClr val="accent1"/>
-          </a:effectRef>
-          <a:fontRef idx="minor">
-            <a:schemeClr val="lt1"/>
-          </a:fontRef>
-        </p:style>
-        <p:txBody>
-          <a:bodyPr wrap="none">
-            <a:spAutoFit/>
+          <a:bodyPr vert="horz" lIns="91440" tIns="45720" rIns="91440" bIns="45720" rtlCol="0" anchor="t">
+            <a:normAutofit/>
           </a:bodyPr>
           <a:lstStyle/>
           <a:p>
             <a:r>
-              <a:rPr lang="en-US" sz="2800" i="1">
+              <a:rPr lang="en-US" dirty="0">
+                <a:cs typeface="Calibri"/>
+              </a:rPr>
+              <a:t>You must free everything you malloc-  C will not warn you about memory leakage</a:t>
+            </a:r>
+          </a:p>
+          <a:p>
+            <a:r>
+              <a:rPr lang="en-US" dirty="0">
+                <a:cs typeface="Calibri"/>
+              </a:rPr>
+              <a:t>You should check the return value of </a:t>
+            </a:r>
+            <a:r>
+              <a:rPr lang="en-US" dirty="0">
                 <a:latin typeface="Anonymous Pro for Powerline" panose="02060609030202000504" pitchFamily="49" charset="0"/>
                 <a:ea typeface="Anonymous Pro for Powerline" panose="02060609030202000504" pitchFamily="49" charset="0"/>
-              </a:rPr>
-              <a:t>https://</a:t>
-            </a:r>
-            <a:r>
-              <a:rPr lang="en-US" sz="2800" i="1" err="1">
+                <a:cs typeface="Calibri"/>
+              </a:rPr>
+              <a:t>malloc</a:t>
+            </a:r>
+            <a:r>
+              <a:rPr lang="en-US" dirty="0">
+                <a:cs typeface="Calibri"/>
+              </a:rPr>
+              <a:t> to ensure it's not NULL</a:t>
+            </a:r>
+          </a:p>
+          <a:p>
+            <a:r>
+              <a:rPr lang="en-US" dirty="0">
+                <a:cs typeface="Calibri"/>
+              </a:rPr>
+              <a:t>You free by passing the same pointer to free that was originally returned from malloc</a:t>
+            </a:r>
+            <a:endParaRPr lang="en-US" dirty="0"/>
+          </a:p>
+          <a:p>
+            <a:r>
+              <a:rPr lang="en-US" dirty="0">
+                <a:cs typeface="Calibri"/>
+              </a:rPr>
+              <a:t>The memory you </a:t>
+            </a:r>
+            <a:r>
+              <a:rPr lang="en-US" dirty="0">
                 <a:latin typeface="Anonymous Pro for Powerline" panose="02060609030202000504" pitchFamily="49" charset="0"/>
                 <a:ea typeface="Anonymous Pro for Powerline" panose="02060609030202000504" pitchFamily="49" charset="0"/>
-              </a:rPr>
-              <a:t>repl.it</a:t>
-            </a:r>
-            <a:r>
-              <a:rPr lang="en-US" sz="2800" i="1">
-                <a:latin typeface="Anonymous Pro for Powerline" panose="02060609030202000504" pitchFamily="49" charset="0"/>
-                <a:ea typeface="Anonymous Pro for Powerline" panose="02060609030202000504" pitchFamily="49" charset="0"/>
-              </a:rPr>
-              <a:t>/@</a:t>
-            </a:r>
-            <a:r>
-              <a:rPr lang="en-US" sz="2800" i="1" err="1">
-                <a:latin typeface="Anonymous Pro for Powerline" panose="02060609030202000504" pitchFamily="49" charset="0"/>
-                <a:ea typeface="Anonymous Pro for Powerline" panose="02060609030202000504" pitchFamily="49" charset="0"/>
-              </a:rPr>
-              <a:t>hewner</a:t>
-            </a:r>
-            <a:r>
-              <a:rPr lang="en-US" sz="2800" i="1">
-                <a:latin typeface="Anonymous Pro for Powerline" panose="02060609030202000504" pitchFamily="49" charset="0"/>
-                <a:ea typeface="Anonymous Pro for Powerline" panose="02060609030202000504" pitchFamily="49" charset="0"/>
-              </a:rPr>
-              <a:t>/</a:t>
-            </a:r>
-            <a:r>
-              <a:rPr lang="en-US" sz="2800" i="1" err="1">
-                <a:latin typeface="Anonymous Pro for Powerline" panose="02060609030202000504" pitchFamily="49" charset="0"/>
-                <a:ea typeface="Anonymous Pro for Powerline" panose="02060609030202000504" pitchFamily="49" charset="0"/>
-              </a:rPr>
-              <a:t>VoidMallocFPActivity</a:t>
-            </a:r>
-            <a:endParaRPr lang="en-US" sz="2800" i="1">
-              <a:latin typeface="Anonymous Pro for Powerline" panose="02060609030202000504" pitchFamily="49" charset="0"/>
-              <a:ea typeface="Anonymous Pro for Powerline" panose="02060609030202000504" pitchFamily="49" charset="0"/>
+                <a:cs typeface="Calibri"/>
+              </a:rPr>
+              <a:t>malloc</a:t>
+            </a:r>
+            <a:r>
+              <a:rPr lang="en-US" dirty="0">
+                <a:cs typeface="Calibri"/>
+              </a:rPr>
+              <a:t> is filled with garbage data</a:t>
+            </a:r>
+          </a:p>
+          <a:p>
+            <a:r>
+              <a:rPr lang="en-US" dirty="0">
+                <a:cs typeface="Calibri"/>
+              </a:rPr>
+              <a:t>Don’t access freed memory though it may be still there</a:t>
+            </a:r>
+          </a:p>
+          <a:p>
+            <a:r>
+              <a:rPr lang="en-US" dirty="0">
+                <a:cs typeface="Calibri"/>
+              </a:rPr>
+              <a:t>Freeing the same memory twice is unsafe</a:t>
+            </a:r>
+          </a:p>
+          <a:p>
+            <a:endParaRPr lang="en-US" dirty="0">
+              <a:cs typeface="Calibri"/>
             </a:endParaRPr>
           </a:p>
-        </p:txBody>
-      </p:sp>
-      <p:sp>
-        <p:nvSpPr>
-          <p:cNvPr id="5" name="Right Arrow 4">
-            <a:extLst>
-              <a:ext uri="{FF2B5EF4-FFF2-40B4-BE49-F238E27FC236}">
-                <a16:creationId xmlns:a16="http://schemas.microsoft.com/office/drawing/2014/main" id="{0243E05C-57B6-3047-B8B4-D16C05D366E9}"/>
-              </a:ext>
-            </a:extLst>
-          </p:cNvPr>
-          <p:cNvSpPr/>
-          <p:nvPr/>
-        </p:nvSpPr>
-        <p:spPr>
-          <a:xfrm rot="5400000">
-            <a:off x="4888523" y="3774831"/>
-            <a:ext cx="890954" cy="351692"/>
-          </a:xfrm>
-          <a:prstGeom prst="rightArrow">
-            <a:avLst/>
-          </a:prstGeom>
-        </p:spPr>
-        <p:style>
-          <a:lnRef idx="2">
-            <a:schemeClr val="accent1">
-              <a:shade val="50000"/>
-            </a:schemeClr>
-          </a:lnRef>
-          <a:fillRef idx="1">
-            <a:schemeClr val="accent1"/>
-          </a:fillRef>
-          <a:effectRef idx="0">
-            <a:schemeClr val="accent1"/>
-          </a:effectRef>
-          <a:fontRef idx="minor">
-            <a:schemeClr val="lt1"/>
-          </a:fontRef>
-        </p:style>
-        <p:txBody>
-          <a:bodyPr rtlCol="0" anchor="ctr"/>
-          <a:lstStyle/>
-          <a:p>
-            <a:pPr algn="ctr"/>
-            <a:endParaRPr lang="en-US"/>
+          <a:p>
+            <a:endParaRPr lang="en-US" dirty="0">
+              <a:cs typeface="Calibri"/>
+            </a:endParaRPr>
+          </a:p>
+          <a:p>
+            <a:endParaRPr lang="en-US" dirty="0">
+              <a:cs typeface="Calibri"/>
+            </a:endParaRPr>
           </a:p>
         </p:txBody>
       </p:sp>
     </p:spTree>
     <p:extLst>
       <p:ext uri="{BB962C8B-B14F-4D97-AF65-F5344CB8AC3E}">
-        <p14:creationId xmlns:p14="http://schemas.microsoft.com/office/powerpoint/2010/main" val="1866616194"/>
+        <p14:creationId xmlns:p14="http://schemas.microsoft.com/office/powerpoint/2010/main" val="426053574"/>
       </p:ext>
     </p:extLst>
   </p:cSld>
@@ -4768,7 +5065,7 @@
           <p:cNvPr id="2" name="Title 1">
             <a:extLst>
               <a:ext uri="{FF2B5EF4-FFF2-40B4-BE49-F238E27FC236}">
-                <a16:creationId xmlns:a16="http://schemas.microsoft.com/office/drawing/2014/main" id="{78D025BC-A53A-0640-A19E-38CE357F0438}"/>
+                <a16:creationId xmlns:a16="http://schemas.microsoft.com/office/drawing/2014/main" id="{9D5B93B6-31DC-0944-9275-F32583D1F2C1}"/>
               </a:ext>
             </a:extLst>
           </p:cNvPr>
@@ -4786,7 +5083,7 @@
           <a:p>
             <a:r>
               <a:rPr lang="en-US"/>
-              <a:t>Function pointers</a:t>
+              <a:t>Activity</a:t>
             </a:r>
           </a:p>
         </p:txBody>
@@ -4796,7 +5093,7 @@
           <p:cNvPr id="3" name="Content Placeholder 2">
             <a:extLst>
               <a:ext uri="{FF2B5EF4-FFF2-40B4-BE49-F238E27FC236}">
-                <a16:creationId xmlns:a16="http://schemas.microsoft.com/office/drawing/2014/main" id="{AF391C20-6F73-844C-9F5E-F447515E2BB6}"/>
+                <a16:creationId xmlns:a16="http://schemas.microsoft.com/office/drawing/2014/main" id="{857737CA-6CBF-D64B-B8E1-9155F1242E27}"/>
               </a:ext>
             </a:extLst>
           </p:cNvPr>
@@ -4813,46 +5110,160 @@
           <a:lstStyle/>
           <a:p>
             <a:r>
-              <a:rPr lang="en-US"/>
-              <a:t>like normal data pointers (</a:t>
-            </a:r>
-            <a:r>
-              <a:rPr lang="en-US" err="1"/>
-              <a:t>int</a:t>
-            </a:r>
-            <a:r>
-              <a:rPr lang="en-US"/>
-              <a:t> *, char *, </a:t>
-            </a:r>
-            <a:r>
-              <a:rPr lang="en-US" err="1"/>
-              <a:t>etc</a:t>
-            </a:r>
-            <a:r>
-              <a:rPr lang="en-US"/>
-              <a:t>), we can have pointers to functions. </a:t>
-            </a:r>
-          </a:p>
-          <a:p>
-            <a:r>
-              <a:rPr lang="en-US"/>
-              <a:t>We can use (</a:t>
-            </a:r>
-            <a:r>
-              <a:rPr lang="en-US" err="1"/>
-              <a:t>a.k.a</a:t>
-            </a:r>
-            <a:r>
-              <a:rPr lang="en-US"/>
-              <a:t> call) the pointer</a:t>
-            </a:r>
+              <a:rPr lang="en-US">
+                <a:cs typeface="Calibri"/>
+              </a:rPr>
+              <a:t>Do </a:t>
+            </a:r>
+            <a:r>
+              <a:rPr lang="en-US" b="1" i="1">
+                <a:cs typeface="Calibri"/>
+              </a:rPr>
+              <a:t>Step 2 </a:t>
+            </a:r>
+            <a:r>
+              <a:rPr lang="en-US">
+                <a:cs typeface="Calibri"/>
+              </a:rPr>
+              <a:t>of today's activity within </a:t>
+            </a:r>
+            <a:r>
+              <a:rPr lang="en-US" err="1">
+                <a:cs typeface="Calibri"/>
+              </a:rPr>
+              <a:t>repl</a:t>
+            </a:r>
+            <a:r>
+              <a:rPr lang="en-US">
+                <a:cs typeface="Calibri"/>
+              </a:rPr>
+              <a:t> (that's the first test case)</a:t>
+            </a:r>
+          </a:p>
+          <a:p>
+            <a:r>
+              <a:rPr lang="en-US">
+                <a:cs typeface="Calibri"/>
+              </a:rPr>
+              <a:t>You can work in groups of 2 if you wish</a:t>
+            </a:r>
+          </a:p>
+          <a:p>
+            <a:endParaRPr lang="en-US"/>
+          </a:p>
+          <a:p>
+            <a:endParaRPr lang="en-US"/>
+          </a:p>
+          <a:p>
+            <a:endParaRPr lang="en-US"/>
+          </a:p>
+        </p:txBody>
+      </p:sp>
+      <p:sp>
+        <p:nvSpPr>
+          <p:cNvPr id="4" name="Rectangle 3">
+            <a:extLst>
+              <a:ext uri="{FF2B5EF4-FFF2-40B4-BE49-F238E27FC236}">
+                <a16:creationId xmlns:a16="http://schemas.microsoft.com/office/drawing/2014/main" id="{887E4CCD-9FCE-D946-8454-9D646FF6F57E}"/>
+              </a:ext>
+            </a:extLst>
+          </p:cNvPr>
+          <p:cNvSpPr/>
+          <p:nvPr/>
+        </p:nvSpPr>
+        <p:spPr>
+          <a:xfrm>
+            <a:off x="1443300" y="4396154"/>
+            <a:ext cx="6346994" cy="523220"/>
+          </a:xfrm>
+          <a:prstGeom prst="rect">
+            <a:avLst/>
+          </a:prstGeom>
+          <a:ln>
+            <a:headEnd type="none" w="med" len="med"/>
+            <a:tailEnd type="none" w="med" len="med"/>
+          </a:ln>
+        </p:spPr>
+        <p:style>
+          <a:lnRef idx="0">
+            <a:schemeClr val="accent1"/>
+          </a:lnRef>
+          <a:fillRef idx="3">
+            <a:schemeClr val="accent1"/>
+          </a:fillRef>
+          <a:effectRef idx="3">
+            <a:schemeClr val="accent1"/>
+          </a:effectRef>
+          <a:fontRef idx="minor">
+            <a:schemeClr val="lt1"/>
+          </a:fontRef>
+        </p:style>
+        <p:txBody>
+          <a:bodyPr wrap="none">
+            <a:spAutoFit/>
+          </a:bodyPr>
+          <a:lstStyle/>
+          <a:p>
+            <a:r>
+              <a:rPr lang="en-US" sz="2800" i="1" dirty="0">
+                <a:latin typeface="Anonymous Pro for Powerline" panose="02060609030202000504" pitchFamily="49" charset="0"/>
+                <a:ea typeface="Anonymous Pro for Powerline" panose="02060609030202000504" pitchFamily="49" charset="0"/>
+              </a:rPr>
+              <a:t>https://repl.it/@hewner/ArrayListExample</a:t>
+            </a:r>
+          </a:p>
+        </p:txBody>
+      </p:sp>
+      <p:sp>
+        <p:nvSpPr>
+          <p:cNvPr id="5" name="Right Arrow 4">
+            <a:extLst>
+              <a:ext uri="{FF2B5EF4-FFF2-40B4-BE49-F238E27FC236}">
+                <a16:creationId xmlns:a16="http://schemas.microsoft.com/office/drawing/2014/main" id="{0243E05C-57B6-3047-B8B4-D16C05D366E9}"/>
+              </a:ext>
+            </a:extLst>
+          </p:cNvPr>
+          <p:cNvSpPr/>
+          <p:nvPr/>
+        </p:nvSpPr>
+        <p:spPr>
+          <a:xfrm rot="5400000">
+            <a:off x="4888523" y="3774831"/>
+            <a:ext cx="890954" cy="351692"/>
+          </a:xfrm>
+          <a:prstGeom prst="rightArrow">
+            <a:avLst/>
+          </a:prstGeom>
+        </p:spPr>
+        <p:style>
+          <a:lnRef idx="2">
+            <a:schemeClr val="accent1">
+              <a:shade val="50000"/>
+            </a:schemeClr>
+          </a:lnRef>
+          <a:fillRef idx="1">
+            <a:schemeClr val="accent1"/>
+          </a:fillRef>
+          <a:effectRef idx="0">
+            <a:schemeClr val="accent1"/>
+          </a:effectRef>
+          <a:fontRef idx="minor">
+            <a:schemeClr val="lt1"/>
+          </a:fontRef>
+        </p:style>
+        <p:txBody>
+          <a:bodyPr rtlCol="0" anchor="ctr"/>
+          <a:lstStyle/>
+          <a:p>
+            <a:pPr algn="ctr"/>
+            <a:endParaRPr lang="en-US"/>
           </a:p>
         </p:txBody>
       </p:sp>
     </p:spTree>
     <p:extLst>
       <p:ext uri="{BB962C8B-B14F-4D97-AF65-F5344CB8AC3E}">
-        <p14:creationId xmlns:p14="http://schemas.microsoft.com/office/powerpoint/2010/main" val="1488755403"/>
+        <p14:creationId xmlns:p14="http://schemas.microsoft.com/office/powerpoint/2010/main" val="1866616194"/>
       </p:ext>
     </p:extLst>
   </p:cSld>
@@ -4884,7 +5295,7 @@
           <p:cNvPr id="2" name="Title 1">
             <a:extLst>
               <a:ext uri="{FF2B5EF4-FFF2-40B4-BE49-F238E27FC236}">
-                <a16:creationId xmlns:a16="http://schemas.microsoft.com/office/drawing/2014/main" id="{5F76E36C-303A-D842-9837-A9A2CF6579C9}"/>
+                <a16:creationId xmlns:a16="http://schemas.microsoft.com/office/drawing/2014/main" id="{78D025BC-A53A-0640-A19E-38CE357F0438}"/>
               </a:ext>
             </a:extLst>
           </p:cNvPr>
@@ -4902,336 +5313,73 @@
           <a:p>
             <a:r>
               <a:rPr lang="en-US"/>
-              <a:t>Function pointers (cont.)</a:t>
-            </a:r>
-          </a:p>
-        </p:txBody>
-      </p:sp>
-      <p:sp>
-        <p:nvSpPr>
-          <p:cNvPr id="4" name="TextBox 3">
-            <a:extLst>
-              <a:ext uri="{FF2B5EF4-FFF2-40B4-BE49-F238E27FC236}">
-                <a16:creationId xmlns:a16="http://schemas.microsoft.com/office/drawing/2014/main" id="{403A24A4-7151-4D4B-97ED-2BA97DC5A2D8}"/>
-              </a:ext>
-            </a:extLst>
-          </p:cNvPr>
-          <p:cNvSpPr txBox="1"/>
-          <p:nvPr/>
-        </p:nvSpPr>
-        <p:spPr>
-          <a:xfrm>
-            <a:off x="2311346" y="2001471"/>
-            <a:ext cx="10162008" cy="4801314"/>
-          </a:xfrm>
-          <a:prstGeom prst="rect">
-            <a:avLst/>
-          </a:prstGeom>
-        </p:spPr>
-        <p:txBody>
-          <a:bodyPr rot="0" spcFirstLastPara="0" vertOverflow="overflow" horzOverflow="overflow" vert="horz" wrap="square" lIns="91440" tIns="45720" rIns="91440" bIns="45720" numCol="1" spcCol="0" rtlCol="0" fromWordArt="0" anchor="t" anchorCtr="0" forceAA="0" compatLnSpc="1">
-            <a:prstTxWarp prst="textNoShape">
-              <a:avLst/>
-            </a:prstTxWarp>
-            <a:spAutoFit/>
-          </a:bodyPr>
-          <a:lstStyle/>
-          <a:p>
-            <a:r>
-              <a:rPr lang="en-US" err="1">
-                <a:latin typeface="Consolas"/>
-              </a:rPr>
+              <a:t>Function pointers</a:t>
+            </a:r>
+          </a:p>
+        </p:txBody>
+      </p:sp>
+      <p:sp>
+        <p:nvSpPr>
+          <p:cNvPr id="3" name="Content Placeholder 2">
+            <a:extLst>
+              <a:ext uri="{FF2B5EF4-FFF2-40B4-BE49-F238E27FC236}">
+                <a16:creationId xmlns:a16="http://schemas.microsoft.com/office/drawing/2014/main" id="{AF391C20-6F73-844C-9F5E-F447515E2BB6}"/>
+              </a:ext>
+            </a:extLst>
+          </p:cNvPr>
+          <p:cNvSpPr>
+            <a:spLocks noGrp="1"/>
+          </p:cNvSpPr>
+          <p:nvPr>
+            <p:ph idx="1"/>
+          </p:nvPr>
+        </p:nvSpPr>
+        <p:spPr/>
+        <p:txBody>
+          <a:bodyPr/>
+          <a:lstStyle/>
+          <a:p>
+            <a:r>
+              <a:rPr lang="en-US"/>
+              <a:t>like normal data pointers (</a:t>
+            </a:r>
+            <a:r>
+              <a:rPr lang="en-US" err="1"/>
               <a:t>int</a:t>
             </a:r>
             <a:r>
-              <a:rPr lang="en-US">
-                <a:latin typeface="Consolas"/>
-              </a:rPr>
-              <a:t> example_1(double val1, double val2) {</a:t>
-            </a:r>
-          </a:p>
-          <a:p>
-            <a:r>
-              <a:rPr lang="en-US">
-                <a:latin typeface="Consolas"/>
-              </a:rPr>
-              <a:t>  </a:t>
-            </a:r>
-            <a:r>
-              <a:rPr lang="en-US" err="1">
-                <a:latin typeface="Consolas"/>
-              </a:rPr>
-              <a:t>printf</a:t>
-            </a:r>
-            <a:r>
-              <a:rPr lang="en-US">
-                <a:latin typeface="Consolas"/>
-              </a:rPr>
-              <a:t>("calling example 1 %f %f\n", val1, val2);</a:t>
-            </a:r>
-            <a:endParaRPr lang="en-US">
-              <a:latin typeface="Consolas"/>
-              <a:cs typeface="Calibri"/>
-            </a:endParaRPr>
-          </a:p>
-          <a:p>
-            <a:r>
-              <a:rPr lang="en-US">
-                <a:latin typeface="Consolas"/>
-              </a:rPr>
-              <a:t>  return 1;</a:t>
-            </a:r>
-            <a:endParaRPr lang="en-US">
-              <a:latin typeface="Consolas"/>
-              <a:cs typeface="Calibri"/>
-            </a:endParaRPr>
-          </a:p>
-          <a:p>
-            <a:r>
-              <a:rPr lang="en-US">
-                <a:latin typeface="Consolas"/>
-              </a:rPr>
-              <a:t>}</a:t>
-            </a:r>
-          </a:p>
-          <a:p>
-            <a:r>
-              <a:rPr lang="en-US" err="1">
-                <a:latin typeface="Consolas"/>
-              </a:rPr>
-              <a:t>int</a:t>
-            </a:r>
-            <a:r>
-              <a:rPr lang="en-US">
-                <a:latin typeface="Consolas"/>
-              </a:rPr>
-              <a:t> example_2(double val1, double val2) {</a:t>
-            </a:r>
-          </a:p>
-          <a:p>
-            <a:r>
-              <a:rPr lang="en-US">
-                <a:latin typeface="Consolas"/>
-              </a:rPr>
-              <a:t>  </a:t>
-            </a:r>
-            <a:r>
-              <a:rPr lang="en-US" err="1">
-                <a:latin typeface="Consolas"/>
-              </a:rPr>
-              <a:t>printf</a:t>
-            </a:r>
-            <a:r>
-              <a:rPr lang="en-US">
-                <a:latin typeface="Consolas"/>
-              </a:rPr>
-              <a:t>("calling example 2 %f %f\n", val1, val2);</a:t>
-            </a:r>
-            <a:endParaRPr lang="en-US">
-              <a:latin typeface="Consolas"/>
-              <a:cs typeface="Calibri"/>
-            </a:endParaRPr>
-          </a:p>
-          <a:p>
-            <a:r>
-              <a:rPr lang="en-US">
-                <a:latin typeface="Consolas"/>
-              </a:rPr>
-              <a:t>  return 1;</a:t>
-            </a:r>
-            <a:endParaRPr lang="en-US">
-              <a:latin typeface="Consolas"/>
-              <a:cs typeface="Calibri"/>
-            </a:endParaRPr>
-          </a:p>
-          <a:p>
-            <a:r>
-              <a:rPr lang="en-US">
-                <a:latin typeface="Consolas"/>
-              </a:rPr>
-              <a:t>}</a:t>
-            </a:r>
-          </a:p>
-          <a:p>
-            <a:endParaRPr lang="en-US">
-              <a:latin typeface="Consolas"/>
-              <a:cs typeface="Calibri"/>
-            </a:endParaRPr>
-          </a:p>
-          <a:p>
-            <a:r>
-              <a:rPr lang="en-US">
-                <a:latin typeface="Consolas"/>
-              </a:rPr>
-              <a:t>//elsewhere</a:t>
-            </a:r>
-            <a:endParaRPr lang="en-US">
-              <a:latin typeface="Consolas"/>
-              <a:cs typeface="Calibri"/>
-            </a:endParaRPr>
-          </a:p>
-          <a:p>
-            <a:r>
-              <a:rPr lang="en-US" err="1">
-                <a:latin typeface="Consolas"/>
-              </a:rPr>
-              <a:t>int</a:t>
-            </a:r>
-            <a:r>
-              <a:rPr lang="en-US">
-                <a:latin typeface="Consolas"/>
-              </a:rPr>
-              <a:t> (*</a:t>
-            </a:r>
-            <a:r>
-              <a:rPr lang="en-US" err="1">
-                <a:latin typeface="Consolas"/>
-              </a:rPr>
-              <a:t>my_fun_pointer</a:t>
-            </a:r>
-            <a:r>
-              <a:rPr lang="en-US">
-                <a:latin typeface="Consolas"/>
-              </a:rPr>
-              <a:t>)(</a:t>
-            </a:r>
-            <a:r>
-              <a:rPr lang="en-US" err="1">
-                <a:latin typeface="Consolas"/>
-              </a:rPr>
-              <a:t>double,double</a:t>
-            </a:r>
-            <a:r>
-              <a:rPr lang="en-US">
-                <a:latin typeface="Consolas"/>
-              </a:rPr>
-              <a:t>);</a:t>
-            </a:r>
-            <a:endParaRPr lang="en-US">
-              <a:latin typeface="Consolas"/>
-              <a:cs typeface="Calibri"/>
-            </a:endParaRPr>
-          </a:p>
-          <a:p>
-            <a:r>
-              <a:rPr lang="en-US" err="1">
-                <a:latin typeface="Consolas"/>
-              </a:rPr>
-              <a:t>my_fun_pointer</a:t>
-            </a:r>
-            <a:r>
-              <a:rPr lang="en-US">
-                <a:latin typeface="Consolas"/>
-              </a:rPr>
-              <a:t> = example_1;</a:t>
-            </a:r>
-            <a:endParaRPr lang="en-US">
-              <a:latin typeface="Consolas"/>
-              <a:cs typeface="Calibri"/>
-            </a:endParaRPr>
-          </a:p>
-          <a:p>
-            <a:r>
-              <a:rPr lang="en-US">
-                <a:latin typeface="Consolas"/>
-              </a:rPr>
-              <a:t>  </a:t>
-            </a:r>
-            <a:endParaRPr lang="en-US">
-              <a:latin typeface="Consolas"/>
-              <a:cs typeface="Calibri"/>
-            </a:endParaRPr>
-          </a:p>
-          <a:p>
-            <a:r>
-              <a:rPr lang="en-US" err="1">
-                <a:latin typeface="Consolas"/>
-              </a:rPr>
-              <a:t>int</a:t>
-            </a:r>
-            <a:r>
-              <a:rPr lang="en-US">
-                <a:latin typeface="Consolas"/>
-              </a:rPr>
-              <a:t> result = </a:t>
-            </a:r>
-            <a:r>
-              <a:rPr lang="en-US" err="1">
-                <a:latin typeface="Consolas"/>
-              </a:rPr>
-              <a:t>my_fun_pointer</a:t>
-            </a:r>
-            <a:r>
-              <a:rPr lang="en-US">
-                <a:latin typeface="Consolas"/>
-              </a:rPr>
-              <a:t>(66,7);</a:t>
-            </a:r>
-            <a:endParaRPr lang="en-US">
-              <a:latin typeface="Consolas"/>
-              <a:cs typeface="Calibri"/>
-            </a:endParaRPr>
-          </a:p>
-          <a:p>
-            <a:r>
-              <a:rPr lang="en-US">
-                <a:latin typeface="Consolas"/>
-              </a:rPr>
-              <a:t>  </a:t>
-            </a:r>
-            <a:endParaRPr lang="en-US">
-              <a:latin typeface="Consolas"/>
-              <a:cs typeface="Calibri"/>
-            </a:endParaRPr>
-          </a:p>
-          <a:p>
-            <a:r>
-              <a:rPr lang="en-US" err="1">
-                <a:latin typeface="Consolas"/>
-              </a:rPr>
-              <a:t>my_fun_pointer</a:t>
-            </a:r>
-            <a:r>
-              <a:rPr lang="en-US">
-                <a:latin typeface="Consolas"/>
-              </a:rPr>
-              <a:t> = example_2;</a:t>
-            </a:r>
-            <a:endParaRPr lang="en-US">
-              <a:latin typeface="Consolas"/>
-              <a:cs typeface="Calibri"/>
-            </a:endParaRPr>
-          </a:p>
-          <a:p>
-            <a:r>
-              <a:rPr lang="en-US">
-                <a:latin typeface="Consolas"/>
-              </a:rPr>
-              <a:t>result = </a:t>
-            </a:r>
-            <a:r>
-              <a:rPr lang="en-US" err="1">
-                <a:latin typeface="Consolas"/>
-              </a:rPr>
-              <a:t>my_fun_pointer</a:t>
-            </a:r>
-            <a:r>
-              <a:rPr lang="en-US">
-                <a:latin typeface="Consolas"/>
-              </a:rPr>
-              <a:t>(66,7);</a:t>
-            </a:r>
-            <a:endParaRPr lang="en-US" sz="1600">
-              <a:latin typeface="Consolas"/>
-              <a:cs typeface="Calibri"/>
-            </a:endParaRPr>
+              <a:rPr lang="en-US"/>
+              <a:t> *, char *, </a:t>
+            </a:r>
+            <a:r>
+              <a:rPr lang="en-US" err="1"/>
+              <a:t>etc</a:t>
+            </a:r>
+            <a:r>
+              <a:rPr lang="en-US"/>
+              <a:t>), we can have pointers to functions. </a:t>
+            </a:r>
+          </a:p>
+          <a:p>
+            <a:r>
+              <a:rPr lang="en-US"/>
+              <a:t>We can use (</a:t>
+            </a:r>
+            <a:r>
+              <a:rPr lang="en-US" err="1"/>
+              <a:t>a.k.a</a:t>
+            </a:r>
+            <a:r>
+              <a:rPr lang="en-US"/>
+              <a:t> call) the pointer</a:t>
+            </a:r>
           </a:p>
         </p:txBody>
       </p:sp>
     </p:spTree>
     <p:extLst>
       <p:ext uri="{BB962C8B-B14F-4D97-AF65-F5344CB8AC3E}">
-        <p14:creationId xmlns:p14="http://schemas.microsoft.com/office/powerpoint/2010/main" val="2828717473"/>
+        <p14:creationId xmlns:p14="http://schemas.microsoft.com/office/powerpoint/2010/main" val="1488755403"/>
       </p:ext>
     </p:extLst>
   </p:cSld>
@@ -5263,7 +5411,7 @@
           <p:cNvPr id="2" name="Title 1">
             <a:extLst>
               <a:ext uri="{FF2B5EF4-FFF2-40B4-BE49-F238E27FC236}">
-                <a16:creationId xmlns:a16="http://schemas.microsoft.com/office/drawing/2014/main" id="{630794F3-333F-4048-B763-1DA68809B657}"/>
+                <a16:creationId xmlns:a16="http://schemas.microsoft.com/office/drawing/2014/main" id="{5F76E36C-303A-D842-9837-A9A2CF6579C9}"/>
               </a:ext>
             </a:extLst>
           </p:cNvPr>
@@ -5280,165 +5428,313 @@
           <a:lstStyle/>
           <a:p>
             <a:r>
-              <a:rPr lang="en-US">
-                <a:cs typeface="Calibri Light"/>
-              </a:rPr>
-              <a:t>Function Pointer Notes</a:t>
-            </a:r>
-            <a:endParaRPr lang="en-US"/>
-          </a:p>
-        </p:txBody>
-      </p:sp>
-      <p:sp>
-        <p:nvSpPr>
-          <p:cNvPr id="3" name="Content Placeholder 2">
-            <a:extLst>
-              <a:ext uri="{FF2B5EF4-FFF2-40B4-BE49-F238E27FC236}">
-                <a16:creationId xmlns:a16="http://schemas.microsoft.com/office/drawing/2014/main" id="{CF8918F7-7349-4626-B682-C3781D71E00B}"/>
-              </a:ext>
-            </a:extLst>
-          </p:cNvPr>
-          <p:cNvSpPr>
-            <a:spLocks noGrp="1"/>
-          </p:cNvSpPr>
-          <p:nvPr>
-            <p:ph idx="1"/>
-          </p:nvPr>
-        </p:nvSpPr>
-        <p:spPr/>
-        <p:txBody>
-          <a:bodyPr vert="horz" lIns="91440" tIns="45720" rIns="91440" bIns="45720" rtlCol="0" anchor="t">
-            <a:normAutofit/>
+              <a:rPr lang="en-US"/>
+              <a:t>Function pointers (cont.)</a:t>
+            </a:r>
+          </a:p>
+        </p:txBody>
+      </p:sp>
+      <p:sp>
+        <p:nvSpPr>
+          <p:cNvPr id="4" name="TextBox 3">
+            <a:extLst>
+              <a:ext uri="{FF2B5EF4-FFF2-40B4-BE49-F238E27FC236}">
+                <a16:creationId xmlns:a16="http://schemas.microsoft.com/office/drawing/2014/main" id="{403A24A4-7151-4D4B-97ED-2BA97DC5A2D8}"/>
+              </a:ext>
+            </a:extLst>
+          </p:cNvPr>
+          <p:cNvSpPr txBox="1"/>
+          <p:nvPr/>
+        </p:nvSpPr>
+        <p:spPr>
+          <a:xfrm>
+            <a:off x="2174497" y="1528720"/>
+            <a:ext cx="10162008" cy="4801314"/>
+          </a:xfrm>
+          <a:prstGeom prst="rect">
+            <a:avLst/>
+          </a:prstGeom>
+        </p:spPr>
+        <p:txBody>
+          <a:bodyPr rot="0" spcFirstLastPara="0" vertOverflow="overflow" horzOverflow="overflow" vert="horz" wrap="square" lIns="91440" tIns="45720" rIns="91440" bIns="45720" numCol="1" spcCol="0" rtlCol="0" fromWordArt="0" anchor="t" anchorCtr="0" forceAA="0" compatLnSpc="1">
+            <a:prstTxWarp prst="textNoShape">
+              <a:avLst/>
+            </a:prstTxWarp>
+            <a:spAutoFit/>
           </a:bodyPr>
           <a:lstStyle/>
           <a:p>
             <a:r>
-              <a:rPr lang="en-US">
-                <a:cs typeface="Calibri"/>
-              </a:rPr>
-              <a:t>When assigning from an existing function, the &amp; can be omitted or not</a:t>
-            </a:r>
-          </a:p>
-          <a:p>
-            <a:pPr marL="0" indent="0">
-              <a:buNone/>
-            </a:pPr>
-            <a:r>
-              <a:rPr lang="en-US" err="1">
-                <a:latin typeface="Anonymous Pro for Powerline" panose="02060609030202000504" pitchFamily="49" charset="0"/>
-                <a:ea typeface="Anonymous Pro for Powerline" panose="02060609030202000504" pitchFamily="49" charset="0"/>
-                <a:cs typeface="Calibri"/>
-              </a:rPr>
-              <a:t>my_ptr</a:t>
-            </a:r>
-            <a:r>
-              <a:rPr lang="en-US">
-                <a:latin typeface="Anonymous Pro for Powerline" panose="02060609030202000504" pitchFamily="49" charset="0"/>
-                <a:ea typeface="Anonymous Pro for Powerline" panose="02060609030202000504" pitchFamily="49" charset="0"/>
-                <a:cs typeface="Calibri"/>
-              </a:rPr>
-              <a:t> = </a:t>
-            </a:r>
-            <a:r>
-              <a:rPr lang="en-US" err="1">
-                <a:latin typeface="Anonymous Pro for Powerline" panose="02060609030202000504" pitchFamily="49" charset="0"/>
-                <a:ea typeface="Anonymous Pro for Powerline" panose="02060609030202000504" pitchFamily="49" charset="0"/>
-                <a:cs typeface="Calibri"/>
-              </a:rPr>
-              <a:t>some_existing_function</a:t>
-            </a:r>
-            <a:r>
-              <a:rPr lang="en-US">
-                <a:latin typeface="Anonymous Pro for Powerline" panose="02060609030202000504" pitchFamily="49" charset="0"/>
-                <a:ea typeface="Anonymous Pro for Powerline" panose="02060609030202000504" pitchFamily="49" charset="0"/>
-                <a:cs typeface="Calibri"/>
-              </a:rPr>
-              <a:t>;</a:t>
-            </a:r>
-          </a:p>
-          <a:p>
-            <a:pPr marL="0" indent="0">
-              <a:buNone/>
-            </a:pPr>
-            <a:r>
-              <a:rPr lang="en-US" err="1">
-                <a:latin typeface="Anonymous Pro for Powerline" panose="02060609030202000504" pitchFamily="49" charset="0"/>
-                <a:ea typeface="Anonymous Pro for Powerline" panose="02060609030202000504" pitchFamily="49" charset="0"/>
-                <a:cs typeface="Calibri"/>
-              </a:rPr>
-              <a:t>my_ptr</a:t>
-            </a:r>
-            <a:r>
-              <a:rPr lang="en-US">
-                <a:latin typeface="Anonymous Pro for Powerline" panose="02060609030202000504" pitchFamily="49" charset="0"/>
-                <a:ea typeface="Anonymous Pro for Powerline" panose="02060609030202000504" pitchFamily="49" charset="0"/>
-                <a:cs typeface="Calibri"/>
-              </a:rPr>
-              <a:t> = &amp;</a:t>
-            </a:r>
-            <a:r>
-              <a:rPr lang="en-US" err="1">
-                <a:latin typeface="Anonymous Pro for Powerline" panose="02060609030202000504" pitchFamily="49" charset="0"/>
-                <a:ea typeface="Anonymous Pro for Powerline" panose="02060609030202000504" pitchFamily="49" charset="0"/>
-                <a:cs typeface="Calibri"/>
-              </a:rPr>
-              <a:t>some_existing_function</a:t>
-            </a:r>
-            <a:r>
-              <a:rPr lang="en-US">
-                <a:latin typeface="Anonymous Pro for Powerline" panose="02060609030202000504" pitchFamily="49" charset="0"/>
-                <a:ea typeface="Anonymous Pro for Powerline" panose="02060609030202000504" pitchFamily="49" charset="0"/>
-                <a:cs typeface="Calibri"/>
-              </a:rPr>
-              <a:t>;</a:t>
-            </a:r>
-          </a:p>
-          <a:p>
-            <a:pPr marL="0" indent="0">
-              <a:buNone/>
-            </a:pPr>
-            <a:endParaRPr lang="en-US">
+              <a:rPr lang="en-US" dirty="0">
+                <a:latin typeface="Consolas"/>
+              </a:rPr>
+              <a:t>int example_1(double val1, double val2) {</a:t>
+            </a:r>
+          </a:p>
+          <a:p>
+            <a:r>
+              <a:rPr lang="en-US" dirty="0">
+                <a:latin typeface="Consolas"/>
+              </a:rPr>
+              <a:t>  </a:t>
+            </a:r>
+            <a:r>
+              <a:rPr lang="en-US" dirty="0" err="1">
+                <a:latin typeface="Consolas"/>
+              </a:rPr>
+              <a:t>printf</a:t>
+            </a:r>
+            <a:r>
+              <a:rPr lang="en-US" dirty="0">
+                <a:latin typeface="Consolas"/>
+              </a:rPr>
+              <a:t>("calling example 1 %f %f\n", val1, val2);</a:t>
+            </a:r>
+            <a:endParaRPr lang="en-US" dirty="0">
+              <a:latin typeface="Consolas"/>
               <a:cs typeface="Calibri"/>
             </a:endParaRPr>
           </a:p>
           <a:p>
             <a:r>
-              <a:rPr lang="en-US">
-                <a:cs typeface="Calibri"/>
-              </a:rPr>
-              <a:t>Useful 😃 if you've got a struct (</a:t>
-            </a:r>
-            <a:r>
-              <a:rPr lang="en-US" i="1">
-                <a:cs typeface="Calibri"/>
-              </a:rPr>
-              <a:t>things</a:t>
-            </a:r>
-            <a:r>
-              <a:rPr lang="en-US">
-                <a:cs typeface="Calibri"/>
-              </a:rPr>
-              <a:t>) and you want it to act a little like an object (</a:t>
-            </a:r>
-            <a:r>
-              <a:rPr lang="en-US" i="1">
-                <a:cs typeface="Calibri"/>
-              </a:rPr>
-              <a:t>things + tools</a:t>
-            </a:r>
-            <a:r>
-              <a:rPr lang="en-US">
-                <a:cs typeface="Calibri"/>
-              </a:rPr>
-              <a:t>)</a:t>
-            </a:r>
+              <a:rPr lang="en-US" dirty="0">
+                <a:latin typeface="Consolas"/>
+              </a:rPr>
+              <a:t>  return 1;</a:t>
+            </a:r>
+            <a:endParaRPr lang="en-US" dirty="0">
+              <a:latin typeface="Consolas"/>
+              <a:cs typeface="Calibri"/>
+            </a:endParaRPr>
+          </a:p>
+          <a:p>
+            <a:r>
+              <a:rPr lang="en-US" dirty="0">
+                <a:latin typeface="Consolas"/>
+              </a:rPr>
+              <a:t>}</a:t>
+            </a:r>
+          </a:p>
+          <a:p>
+            <a:r>
+              <a:rPr lang="en-US" dirty="0">
+                <a:latin typeface="Consolas"/>
+              </a:rPr>
+              <a:t>int example_2(double val1, double val2) {</a:t>
+            </a:r>
+          </a:p>
+          <a:p>
+            <a:r>
+              <a:rPr lang="en-US" dirty="0">
+                <a:latin typeface="Consolas"/>
+              </a:rPr>
+              <a:t>  </a:t>
+            </a:r>
+            <a:r>
+              <a:rPr lang="en-US" dirty="0" err="1">
+                <a:latin typeface="Consolas"/>
+              </a:rPr>
+              <a:t>printf</a:t>
+            </a:r>
+            <a:r>
+              <a:rPr lang="en-US" dirty="0">
+                <a:latin typeface="Consolas"/>
+              </a:rPr>
+              <a:t>("calling example 2 %f %f\n", val1, val2);</a:t>
+            </a:r>
+            <a:endParaRPr lang="en-US" dirty="0">
+              <a:latin typeface="Consolas"/>
+              <a:cs typeface="Calibri"/>
+            </a:endParaRPr>
+          </a:p>
+          <a:p>
+            <a:r>
+              <a:rPr lang="en-US" dirty="0">
+                <a:latin typeface="Consolas"/>
+              </a:rPr>
+              <a:t>  return 1;</a:t>
+            </a:r>
+            <a:endParaRPr lang="en-US" dirty="0">
+              <a:latin typeface="Consolas"/>
+              <a:cs typeface="Calibri"/>
+            </a:endParaRPr>
+          </a:p>
+          <a:p>
+            <a:r>
+              <a:rPr lang="en-US" dirty="0">
+                <a:latin typeface="Consolas"/>
+              </a:rPr>
+              <a:t>}</a:t>
+            </a:r>
+          </a:p>
+          <a:p>
+            <a:endParaRPr lang="en-US" dirty="0">
+              <a:latin typeface="Consolas"/>
+              <a:cs typeface="Calibri"/>
+            </a:endParaRPr>
+          </a:p>
+          <a:p>
+            <a:r>
+              <a:rPr lang="en-US" dirty="0">
+                <a:latin typeface="Consolas"/>
+              </a:rPr>
+              <a:t>//elsewhere</a:t>
+            </a:r>
+            <a:endParaRPr lang="en-US" dirty="0">
+              <a:latin typeface="Consolas"/>
+              <a:cs typeface="Calibri"/>
+            </a:endParaRPr>
+          </a:p>
+          <a:p>
+            <a:r>
+              <a:rPr lang="en-US" dirty="0">
+                <a:latin typeface="Consolas"/>
+              </a:rPr>
+              <a:t>int (*</a:t>
+            </a:r>
+            <a:r>
+              <a:rPr lang="en-US" dirty="0" err="1">
+                <a:latin typeface="Consolas"/>
+              </a:rPr>
+              <a:t>my_fun_pointer</a:t>
+            </a:r>
+            <a:r>
+              <a:rPr lang="en-US" dirty="0">
+                <a:latin typeface="Consolas"/>
+              </a:rPr>
+              <a:t>)(</a:t>
+            </a:r>
+            <a:r>
+              <a:rPr lang="en-US" dirty="0" err="1">
+                <a:latin typeface="Consolas"/>
+              </a:rPr>
+              <a:t>double,double</a:t>
+            </a:r>
+            <a:r>
+              <a:rPr lang="en-US" dirty="0">
+                <a:latin typeface="Consolas"/>
+              </a:rPr>
+              <a:t>);</a:t>
+            </a:r>
+            <a:endParaRPr lang="en-US" dirty="0">
+              <a:latin typeface="Consolas"/>
+              <a:cs typeface="Calibri"/>
+            </a:endParaRPr>
+          </a:p>
+          <a:p>
+            <a:r>
+              <a:rPr lang="en-US" dirty="0" err="1">
+                <a:latin typeface="Consolas"/>
+              </a:rPr>
+              <a:t>my_fun_pointer</a:t>
+            </a:r>
+            <a:r>
+              <a:rPr lang="en-US" dirty="0">
+                <a:latin typeface="Consolas"/>
+              </a:rPr>
+              <a:t> = example_1;</a:t>
+            </a:r>
+            <a:endParaRPr lang="en-US" dirty="0">
+              <a:latin typeface="Consolas"/>
+              <a:cs typeface="Calibri"/>
+            </a:endParaRPr>
+          </a:p>
+          <a:p>
+            <a:r>
+              <a:rPr lang="en-US" dirty="0">
+                <a:latin typeface="Consolas"/>
+              </a:rPr>
+              <a:t>  </a:t>
+            </a:r>
+            <a:endParaRPr lang="en-US" dirty="0">
+              <a:latin typeface="Consolas"/>
+              <a:cs typeface="Calibri"/>
+            </a:endParaRPr>
+          </a:p>
+          <a:p>
+            <a:r>
+              <a:rPr lang="en-US" dirty="0">
+                <a:latin typeface="Consolas"/>
+              </a:rPr>
+              <a:t>int result = </a:t>
+            </a:r>
+            <a:r>
+              <a:rPr lang="en-US" dirty="0" err="1">
+                <a:latin typeface="Consolas"/>
+              </a:rPr>
+              <a:t>my_fun_pointer</a:t>
+            </a:r>
+            <a:r>
+              <a:rPr lang="en-US" dirty="0">
+                <a:latin typeface="Consolas"/>
+              </a:rPr>
+              <a:t>(66,7);</a:t>
+            </a:r>
+            <a:endParaRPr lang="en-US" dirty="0">
+              <a:latin typeface="Consolas"/>
+              <a:cs typeface="Calibri"/>
+            </a:endParaRPr>
+          </a:p>
+          <a:p>
+            <a:r>
+              <a:rPr lang="en-US" dirty="0">
+                <a:latin typeface="Consolas"/>
+              </a:rPr>
+              <a:t>  </a:t>
+            </a:r>
+            <a:endParaRPr lang="en-US" dirty="0">
+              <a:latin typeface="Consolas"/>
+              <a:cs typeface="Calibri"/>
+            </a:endParaRPr>
+          </a:p>
+          <a:p>
+            <a:r>
+              <a:rPr lang="en-US" dirty="0" err="1">
+                <a:latin typeface="Consolas"/>
+              </a:rPr>
+              <a:t>my_fun_pointer</a:t>
+            </a:r>
+            <a:r>
+              <a:rPr lang="en-US" dirty="0">
+                <a:latin typeface="Consolas"/>
+              </a:rPr>
+              <a:t> = example_2;</a:t>
+            </a:r>
+            <a:endParaRPr lang="en-US" dirty="0">
+              <a:latin typeface="Consolas"/>
+              <a:cs typeface="Calibri"/>
+            </a:endParaRPr>
+          </a:p>
+          <a:p>
+            <a:r>
+              <a:rPr lang="en-US" dirty="0">
+                <a:latin typeface="Consolas"/>
+              </a:rPr>
+              <a:t>result = </a:t>
+            </a:r>
+            <a:r>
+              <a:rPr lang="en-US" dirty="0" err="1">
+                <a:latin typeface="Consolas"/>
+              </a:rPr>
+              <a:t>my_fun_pointer</a:t>
+            </a:r>
+            <a:r>
+              <a:rPr lang="en-US" dirty="0">
+                <a:latin typeface="Consolas"/>
+              </a:rPr>
+              <a:t>(66,7);</a:t>
+            </a:r>
+            <a:endParaRPr lang="en-US" sz="1600" dirty="0">
+              <a:latin typeface="Consolas"/>
+              <a:cs typeface="Calibri"/>
+            </a:endParaRPr>
           </a:p>
         </p:txBody>
       </p:sp>
     </p:spTree>
     <p:extLst>
       <p:ext uri="{BB962C8B-B14F-4D97-AF65-F5344CB8AC3E}">
-        <p14:creationId xmlns:p14="http://schemas.microsoft.com/office/powerpoint/2010/main" val="3986571793"/>
+        <p14:creationId xmlns:p14="http://schemas.microsoft.com/office/powerpoint/2010/main" val="2828717473"/>
       </p:ext>
     </p:extLst>
   </p:cSld>
@@ -5470,6 +5766,213 @@
           <p:cNvPr id="2" name="Title 1">
             <a:extLst>
               <a:ext uri="{FF2B5EF4-FFF2-40B4-BE49-F238E27FC236}">
+                <a16:creationId xmlns:a16="http://schemas.microsoft.com/office/drawing/2014/main" id="{630794F3-333F-4048-B763-1DA68809B657}"/>
+              </a:ext>
+            </a:extLst>
+          </p:cNvPr>
+          <p:cNvSpPr>
+            <a:spLocks noGrp="1"/>
+          </p:cNvSpPr>
+          <p:nvPr>
+            <p:ph type="title"/>
+          </p:nvPr>
+        </p:nvSpPr>
+        <p:spPr/>
+        <p:txBody>
+          <a:bodyPr/>
+          <a:lstStyle/>
+          <a:p>
+            <a:r>
+              <a:rPr lang="en-US">
+                <a:cs typeface="Calibri Light"/>
+              </a:rPr>
+              <a:t>Function Pointer Notes</a:t>
+            </a:r>
+            <a:endParaRPr lang="en-US"/>
+          </a:p>
+        </p:txBody>
+      </p:sp>
+      <p:sp>
+        <p:nvSpPr>
+          <p:cNvPr id="3" name="Content Placeholder 2">
+            <a:extLst>
+              <a:ext uri="{FF2B5EF4-FFF2-40B4-BE49-F238E27FC236}">
+                <a16:creationId xmlns:a16="http://schemas.microsoft.com/office/drawing/2014/main" id="{CF8918F7-7349-4626-B682-C3781D71E00B}"/>
+              </a:ext>
+            </a:extLst>
+          </p:cNvPr>
+          <p:cNvSpPr>
+            <a:spLocks noGrp="1"/>
+          </p:cNvSpPr>
+          <p:nvPr>
+            <p:ph idx="1"/>
+          </p:nvPr>
+        </p:nvSpPr>
+        <p:spPr/>
+        <p:txBody>
+          <a:bodyPr vert="horz" lIns="91440" tIns="45720" rIns="91440" bIns="45720" rtlCol="0" anchor="t">
+            <a:normAutofit/>
+          </a:bodyPr>
+          <a:lstStyle/>
+          <a:p>
+            <a:r>
+              <a:rPr lang="en-US">
+                <a:cs typeface="Calibri"/>
+              </a:rPr>
+              <a:t>When assigning from an existing function, the &amp; can be omitted or not</a:t>
+            </a:r>
+          </a:p>
+          <a:p>
+            <a:pPr marL="0" indent="0">
+              <a:buNone/>
+            </a:pPr>
+            <a:r>
+              <a:rPr lang="en-US" err="1">
+                <a:latin typeface="Anonymous Pro for Powerline" panose="02060609030202000504" pitchFamily="49" charset="0"/>
+                <a:ea typeface="Anonymous Pro for Powerline" panose="02060609030202000504" pitchFamily="49" charset="0"/>
+                <a:cs typeface="Calibri"/>
+              </a:rPr>
+              <a:t>my_ptr</a:t>
+            </a:r>
+            <a:r>
+              <a:rPr lang="en-US">
+                <a:latin typeface="Anonymous Pro for Powerline" panose="02060609030202000504" pitchFamily="49" charset="0"/>
+                <a:ea typeface="Anonymous Pro for Powerline" panose="02060609030202000504" pitchFamily="49" charset="0"/>
+                <a:cs typeface="Calibri"/>
+              </a:rPr>
+              <a:t> = </a:t>
+            </a:r>
+            <a:r>
+              <a:rPr lang="en-US" err="1">
+                <a:latin typeface="Anonymous Pro for Powerline" panose="02060609030202000504" pitchFamily="49" charset="0"/>
+                <a:ea typeface="Anonymous Pro for Powerline" panose="02060609030202000504" pitchFamily="49" charset="0"/>
+                <a:cs typeface="Calibri"/>
+              </a:rPr>
+              <a:t>some_existing_function</a:t>
+            </a:r>
+            <a:r>
+              <a:rPr lang="en-US">
+                <a:latin typeface="Anonymous Pro for Powerline" panose="02060609030202000504" pitchFamily="49" charset="0"/>
+                <a:ea typeface="Anonymous Pro for Powerline" panose="02060609030202000504" pitchFamily="49" charset="0"/>
+                <a:cs typeface="Calibri"/>
+              </a:rPr>
+              <a:t>;</a:t>
+            </a:r>
+          </a:p>
+          <a:p>
+            <a:pPr marL="0" indent="0">
+              <a:buNone/>
+            </a:pPr>
+            <a:r>
+              <a:rPr lang="en-US" err="1">
+                <a:latin typeface="Anonymous Pro for Powerline" panose="02060609030202000504" pitchFamily="49" charset="0"/>
+                <a:ea typeface="Anonymous Pro for Powerline" panose="02060609030202000504" pitchFamily="49" charset="0"/>
+                <a:cs typeface="Calibri"/>
+              </a:rPr>
+              <a:t>my_ptr</a:t>
+            </a:r>
+            <a:r>
+              <a:rPr lang="en-US">
+                <a:latin typeface="Anonymous Pro for Powerline" panose="02060609030202000504" pitchFamily="49" charset="0"/>
+                <a:ea typeface="Anonymous Pro for Powerline" panose="02060609030202000504" pitchFamily="49" charset="0"/>
+                <a:cs typeface="Calibri"/>
+              </a:rPr>
+              <a:t> = &amp;</a:t>
+            </a:r>
+            <a:r>
+              <a:rPr lang="en-US" err="1">
+                <a:latin typeface="Anonymous Pro for Powerline" panose="02060609030202000504" pitchFamily="49" charset="0"/>
+                <a:ea typeface="Anonymous Pro for Powerline" panose="02060609030202000504" pitchFamily="49" charset="0"/>
+                <a:cs typeface="Calibri"/>
+              </a:rPr>
+              <a:t>some_existing_function</a:t>
+            </a:r>
+            <a:r>
+              <a:rPr lang="en-US">
+                <a:latin typeface="Anonymous Pro for Powerline" panose="02060609030202000504" pitchFamily="49" charset="0"/>
+                <a:ea typeface="Anonymous Pro for Powerline" panose="02060609030202000504" pitchFamily="49" charset="0"/>
+                <a:cs typeface="Calibri"/>
+              </a:rPr>
+              <a:t>;</a:t>
+            </a:r>
+          </a:p>
+          <a:p>
+            <a:pPr marL="0" indent="0">
+              <a:buNone/>
+            </a:pPr>
+            <a:endParaRPr lang="en-US">
+              <a:cs typeface="Calibri"/>
+            </a:endParaRPr>
+          </a:p>
+          <a:p>
+            <a:r>
+              <a:rPr lang="en-US">
+                <a:cs typeface="Calibri"/>
+              </a:rPr>
+              <a:t>Useful 😃 if you've got a struct (</a:t>
+            </a:r>
+            <a:r>
+              <a:rPr lang="en-US" i="1">
+                <a:cs typeface="Calibri"/>
+              </a:rPr>
+              <a:t>things</a:t>
+            </a:r>
+            <a:r>
+              <a:rPr lang="en-US">
+                <a:cs typeface="Calibri"/>
+              </a:rPr>
+              <a:t>) and you want it to act a little like an object (</a:t>
+            </a:r>
+            <a:r>
+              <a:rPr lang="en-US" i="1">
+                <a:cs typeface="Calibri"/>
+              </a:rPr>
+              <a:t>things + tools</a:t>
+            </a:r>
+            <a:r>
+              <a:rPr lang="en-US">
+                <a:cs typeface="Calibri"/>
+              </a:rPr>
+              <a:t>)</a:t>
+            </a:r>
+          </a:p>
+        </p:txBody>
+      </p:sp>
+    </p:spTree>
+    <p:extLst>
+      <p:ext uri="{BB962C8B-B14F-4D97-AF65-F5344CB8AC3E}">
+        <p14:creationId xmlns:p14="http://schemas.microsoft.com/office/powerpoint/2010/main" val="3986571793"/>
+      </p:ext>
+    </p:extLst>
+  </p:cSld>
+  <p:clrMapOvr>
+    <a:masterClrMapping/>
+  </p:clrMapOvr>
+</p:sld>
+</file>
+
+<file path=ppt/slides/slide16.xml><?xml version="1.0" encoding="utf-8"?>
+<p:sld xmlns:a="http://schemas.openxmlformats.org/drawingml/2006/main" xmlns:r="http://schemas.openxmlformats.org/officeDocument/2006/relationships" xmlns:p="http://schemas.openxmlformats.org/presentationml/2006/main">
+  <p:cSld>
+    <p:spTree>
+      <p:nvGrpSpPr>
+        <p:cNvPr id="1" name=""/>
+        <p:cNvGrpSpPr/>
+        <p:nvPr/>
+      </p:nvGrpSpPr>
+      <p:grpSpPr>
+        <a:xfrm>
+          <a:off x="0" y="0"/>
+          <a:ext cx="0" cy="0"/>
+          <a:chOff x="0" y="0"/>
+          <a:chExt cx="0" cy="0"/>
+        </a:xfrm>
+      </p:grpSpPr>
+      <p:sp>
+        <p:nvSpPr>
+          <p:cNvPr id="2" name="Title 1">
+            <a:extLst>
+              <a:ext uri="{FF2B5EF4-FFF2-40B4-BE49-F238E27FC236}">
                 <a16:creationId xmlns:a16="http://schemas.microsoft.com/office/drawing/2014/main" id="{9D5B93B6-31DC-0944-9275-F32583D1F2C1}"/>
               </a:ext>
             </a:extLst>
@@ -5579,7 +6082,7 @@
         <p:spPr>
           <a:xfrm>
             <a:off x="1443300" y="4396154"/>
-            <a:ext cx="8789586" cy="523220"/>
+            <a:ext cx="6346994" cy="523220"/>
           </a:xfrm>
           <a:prstGeom prst="rect">
             <a:avLst/>
@@ -5610,51 +6113,12 @@
           <a:lstStyle/>
           <a:p>
             <a:r>
-              <a:rPr lang="en-US" sz="2800" i="1">
+              <a:rPr lang="en-US" sz="2800" i="1" dirty="0">
                 <a:latin typeface="Anonymous Pro for Powerline" panose="02060609030202000504" pitchFamily="49" charset="0"/>
                 <a:ea typeface="Anonymous Pro for Powerline" panose="02060609030202000504" pitchFamily="49" charset="0"/>
               </a:rPr>
-              <a:t>https://</a:t>
-            </a:r>
-            <a:r>
-              <a:rPr lang="en-US" sz="2800" i="1" err="1">
-                <a:latin typeface="Anonymous Pro for Powerline" panose="02060609030202000504" pitchFamily="49" charset="0"/>
-                <a:ea typeface="Anonymous Pro for Powerline" panose="02060609030202000504" pitchFamily="49" charset="0"/>
-              </a:rPr>
-              <a:t>repl.it</a:t>
-            </a:r>
-            <a:r>
-              <a:rPr lang="en-US" sz="2800" i="1">
-                <a:latin typeface="Anonymous Pro for Powerline" panose="02060609030202000504" pitchFamily="49" charset="0"/>
-                <a:ea typeface="Anonymous Pro for Powerline" panose="02060609030202000504" pitchFamily="49" charset="0"/>
-              </a:rPr>
-              <a:t>/@</a:t>
-            </a:r>
-            <a:r>
-              <a:rPr lang="en-US" sz="2800" i="1" err="1">
-                <a:latin typeface="Anonymous Pro for Powerline" panose="02060609030202000504" pitchFamily="49" charset="0"/>
-                <a:ea typeface="Anonymous Pro for Powerline" panose="02060609030202000504" pitchFamily="49" charset="0"/>
-              </a:rPr>
-              <a:t>hewner</a:t>
-            </a:r>
-            <a:r>
-              <a:rPr lang="en-US" sz="2800" i="1">
-                <a:latin typeface="Anonymous Pro for Powerline" panose="02060609030202000504" pitchFamily="49" charset="0"/>
-                <a:ea typeface="Anonymous Pro for Powerline" panose="02060609030202000504" pitchFamily="49" charset="0"/>
-              </a:rPr>
-              <a:t>/</a:t>
-            </a:r>
-            <a:r>
-              <a:rPr lang="en-US" sz="2800" i="1" err="1">
-                <a:latin typeface="Anonymous Pro for Powerline" panose="02060609030202000504" pitchFamily="49" charset="0"/>
-                <a:ea typeface="Anonymous Pro for Powerline" panose="02060609030202000504" pitchFamily="49" charset="0"/>
-              </a:rPr>
-              <a:t>VoidMallocFPActivity</a:t>
-            </a:r>
-            <a:endParaRPr lang="en-US" sz="2800" i="1">
-              <a:latin typeface="Anonymous Pro for Powerline" panose="02060609030202000504" pitchFamily="49" charset="0"/>
-              <a:ea typeface="Anonymous Pro for Powerline" panose="02060609030202000504" pitchFamily="49" charset="0"/>
-            </a:endParaRPr>
+              <a:t>https://repl.it/@hewner/ArrayListExample</a:t>
+            </a:r>
           </a:p>
         </p:txBody>
       </p:sp>
@@ -6863,336 +7327,21 @@
           <a:lstStyle/>
           <a:p>
             <a:r>
-              <a:rPr lang="en-US"/>
+              <a:rPr lang="en-US" dirty="0"/>
               <a:t>Problems if converting between incompatible types</a:t>
             </a:r>
           </a:p>
           <a:p>
             <a:r>
-              <a:rPr lang="en-US">
-                <a:cs typeface="Calibri"/>
-              </a:rPr>
-              <a:t>No pointer arithmetic because the type of the underlying object isn't known.</a:t>
-            </a:r>
-          </a:p>
-          <a:p>
-            <a:endParaRPr lang="en-US">
+              <a:rPr lang="en-US" dirty="0">
+                <a:cs typeface="Calibri"/>
+              </a:rPr>
+              <a:t>Pointer arithmetic is weird</a:t>
+            </a:r>
+          </a:p>
+          <a:p>
+            <a:endParaRPr lang="en-US" dirty="0">
               <a:cs typeface="Calibri"/>
-            </a:endParaRPr>
-          </a:p>
-        </p:txBody>
-      </p:sp>
-      <p:sp>
-        <p:nvSpPr>
-          <p:cNvPr id="4" name="TextBox 3">
-            <a:extLst>
-              <a:ext uri="{FF2B5EF4-FFF2-40B4-BE49-F238E27FC236}">
-                <a16:creationId xmlns:a16="http://schemas.microsoft.com/office/drawing/2014/main" id="{CDE73A0F-6A64-4314-A610-485FD95318F6}"/>
-              </a:ext>
-            </a:extLst>
-          </p:cNvPr>
-          <p:cNvSpPr txBox="1"/>
-          <p:nvPr/>
-        </p:nvSpPr>
-        <p:spPr>
-          <a:xfrm>
-            <a:off x="2056190" y="3780971"/>
-            <a:ext cx="7523238" cy="2862322"/>
-          </a:xfrm>
-          <a:prstGeom prst="rect">
-            <a:avLst/>
-          </a:prstGeom>
-        </p:spPr>
-        <p:txBody>
-          <a:bodyPr rot="0" spcFirstLastPara="0" vertOverflow="overflow" horzOverflow="overflow" vert="horz" wrap="square" lIns="91440" tIns="45720" rIns="91440" bIns="45720" numCol="1" spcCol="0" rtlCol="0" fromWordArt="0" anchor="t" anchorCtr="0" forceAA="0" compatLnSpc="1">
-            <a:prstTxWarp prst="textNoShape">
-              <a:avLst/>
-            </a:prstTxWarp>
-            <a:spAutoFit/>
-          </a:bodyPr>
-          <a:lstStyle/>
-          <a:p>
-            <a:r>
-              <a:rPr lang="en-US">
-                <a:latin typeface="Consolas"/>
-              </a:rPr>
-              <a:t>    char </a:t>
-            </a:r>
-            <a:r>
-              <a:rPr lang="en-US" err="1">
-                <a:latin typeface="Consolas"/>
-              </a:rPr>
-              <a:t>charArray</a:t>
-            </a:r>
-            <a:r>
-              <a:rPr lang="en-US">
-                <a:latin typeface="Consolas"/>
-              </a:rPr>
-              <a:t>[] = {'</a:t>
-            </a:r>
-            <a:r>
-              <a:rPr lang="en-US" err="1">
-                <a:latin typeface="Consolas"/>
-              </a:rPr>
-              <a:t>a','b','c','d</a:t>
-            </a:r>
-            <a:r>
-              <a:rPr lang="en-US">
-                <a:latin typeface="Consolas"/>
-              </a:rPr>
-              <a:t>'};</a:t>
-            </a:r>
-            <a:br>
-              <a:rPr lang="en-US">
-                <a:latin typeface="Consolas"/>
-              </a:rPr>
-            </a:br>
-            <a:r>
-              <a:rPr lang="en-US">
-                <a:latin typeface="Consolas"/>
-              </a:rPr>
-              <a:t>    int </a:t>
-            </a:r>
-            <a:r>
-              <a:rPr lang="en-US" err="1">
-                <a:latin typeface="Consolas"/>
-              </a:rPr>
-              <a:t>intArray</a:t>
-            </a:r>
-            <a:r>
-              <a:rPr lang="en-US">
-                <a:latin typeface="Consolas"/>
-              </a:rPr>
-              <a:t>[] = {1,2,3,4};</a:t>
-            </a:r>
-            <a:br>
-              <a:rPr lang="en-US">
-                <a:latin typeface="Consolas"/>
-              </a:rPr>
-            </a:br>
-            <a:r>
-              <a:rPr lang="en-US">
-                <a:latin typeface="Consolas"/>
-              </a:rPr>
-              <a:t>    char *</a:t>
-            </a:r>
-            <a:r>
-              <a:rPr lang="en-US" err="1">
-                <a:latin typeface="Consolas"/>
-              </a:rPr>
-              <a:t>cPtr</a:t>
-            </a:r>
-            <a:r>
-              <a:rPr lang="en-US">
-                <a:latin typeface="Consolas"/>
-              </a:rPr>
-              <a:t> = </a:t>
-            </a:r>
-            <a:r>
-              <a:rPr lang="en-US" err="1">
-                <a:latin typeface="Consolas"/>
-              </a:rPr>
-              <a:t>charArray</a:t>
-            </a:r>
-            <a:r>
-              <a:rPr lang="en-US">
-                <a:latin typeface="Consolas"/>
-              </a:rPr>
-              <a:t>;</a:t>
-            </a:r>
-            <a:br>
-              <a:rPr lang="en-US">
-                <a:latin typeface="Consolas"/>
-              </a:rPr>
-            </a:br>
-            <a:r>
-              <a:rPr lang="en-US">
-                <a:latin typeface="Consolas"/>
-              </a:rPr>
-              <a:t>    int *</a:t>
-            </a:r>
-            <a:r>
-              <a:rPr lang="en-US" err="1">
-                <a:latin typeface="Consolas"/>
-              </a:rPr>
-              <a:t>iPtr</a:t>
-            </a:r>
-            <a:r>
-              <a:rPr lang="en-US">
-                <a:latin typeface="Consolas"/>
-              </a:rPr>
-              <a:t> = </a:t>
-            </a:r>
-            <a:r>
-              <a:rPr lang="en-US" err="1">
-                <a:latin typeface="Consolas"/>
-              </a:rPr>
-              <a:t>intArray</a:t>
-            </a:r>
-            <a:r>
-              <a:rPr lang="en-US">
-                <a:latin typeface="Consolas"/>
-              </a:rPr>
-              <a:t>;</a:t>
-            </a:r>
-            <a:br>
-              <a:rPr lang="en-US">
-                <a:latin typeface="Consolas"/>
-              </a:rPr>
-            </a:br>
-            <a:r>
-              <a:rPr lang="en-US">
-                <a:latin typeface="Consolas"/>
-              </a:rPr>
-              <a:t>    void *</a:t>
-            </a:r>
-            <a:r>
-              <a:rPr lang="en-US" err="1">
-                <a:latin typeface="Consolas"/>
-              </a:rPr>
-              <a:t>anyPtr</a:t>
-            </a:r>
-            <a:r>
-              <a:rPr lang="en-US">
-                <a:latin typeface="Consolas"/>
-              </a:rPr>
-              <a:t> = </a:t>
-            </a:r>
-            <a:r>
-              <a:rPr lang="en-US" err="1">
-                <a:latin typeface="Consolas"/>
-              </a:rPr>
-              <a:t>iPtr</a:t>
-            </a:r>
-            <a:r>
-              <a:rPr lang="en-US">
-                <a:latin typeface="Consolas"/>
-              </a:rPr>
-              <a:t>;</a:t>
-            </a:r>
-            <a:br>
-              <a:rPr lang="en-US">
-                <a:latin typeface="Consolas"/>
-              </a:rPr>
-            </a:br>
-            <a:r>
-              <a:rPr lang="en-US">
-                <a:latin typeface="Consolas"/>
-              </a:rPr>
-              <a:t>    </a:t>
-            </a:r>
-            <a:br>
-              <a:rPr lang="en-US">
-                <a:latin typeface="Consolas"/>
-              </a:rPr>
-            </a:br>
-            <a:r>
-              <a:rPr lang="en-US">
-                <a:latin typeface="Consolas"/>
-              </a:rPr>
-              <a:t>    </a:t>
-            </a:r>
-            <a:r>
-              <a:rPr lang="en-US" err="1">
-                <a:latin typeface="Consolas"/>
-              </a:rPr>
-              <a:t>cPtr</a:t>
-            </a:r>
-            <a:r>
-              <a:rPr lang="en-US">
-                <a:latin typeface="Consolas"/>
-              </a:rPr>
-              <a:t> = </a:t>
-            </a:r>
-            <a:r>
-              <a:rPr lang="en-US" err="1">
-                <a:latin typeface="Consolas"/>
-              </a:rPr>
-              <a:t>cPtr</a:t>
-            </a:r>
-            <a:r>
-              <a:rPr lang="en-US">
-                <a:latin typeface="Consolas"/>
-              </a:rPr>
-              <a:t> + 1; </a:t>
-            </a:r>
-            <a:br>
-              <a:rPr lang="en-US">
-                <a:latin typeface="Consolas"/>
-              </a:rPr>
-            </a:br>
-            <a:r>
-              <a:rPr lang="en-US">
-                <a:latin typeface="Consolas"/>
-              </a:rPr>
-              <a:t>    </a:t>
-            </a:r>
-            <a:r>
-              <a:rPr lang="en-US" err="1">
-                <a:latin typeface="Consolas"/>
-              </a:rPr>
-              <a:t>iPtr</a:t>
-            </a:r>
-            <a:r>
-              <a:rPr lang="en-US">
-                <a:latin typeface="Consolas"/>
-              </a:rPr>
-              <a:t> = </a:t>
-            </a:r>
-            <a:r>
-              <a:rPr lang="en-US" err="1">
-                <a:latin typeface="Consolas"/>
-              </a:rPr>
-              <a:t>iPtr</a:t>
-            </a:r>
-            <a:r>
-              <a:rPr lang="en-US">
-                <a:latin typeface="Consolas"/>
-              </a:rPr>
-              <a:t> + 1; </a:t>
-            </a:r>
-            <a:br>
-              <a:rPr lang="en-US">
-                <a:latin typeface="Consolas"/>
-              </a:rPr>
-            </a:br>
-            <a:r>
-              <a:rPr lang="en-US">
-                <a:latin typeface="Consolas"/>
-              </a:rPr>
-              <a:t>    </a:t>
-            </a:r>
-            <a:r>
-              <a:rPr lang="en-US" err="1">
-                <a:latin typeface="Consolas"/>
-              </a:rPr>
-              <a:t>anyPtr</a:t>
-            </a:r>
-            <a:r>
-              <a:rPr lang="en-US">
-                <a:latin typeface="Consolas"/>
-              </a:rPr>
-              <a:t> = </a:t>
-            </a:r>
-            <a:r>
-              <a:rPr lang="en-US" err="1">
-                <a:latin typeface="Consolas"/>
-              </a:rPr>
-              <a:t>anyPtr</a:t>
-            </a:r>
-            <a:r>
-              <a:rPr lang="en-US">
-                <a:latin typeface="Consolas"/>
-              </a:rPr>
-              <a:t> + 1; //fails on many compliers</a:t>
-            </a:r>
-            <a:br>
-              <a:rPr lang="en-US">
-                <a:latin typeface="Consolas"/>
-              </a:rPr>
-            </a:br>
-            <a:endParaRPr lang="en-US">
-              <a:latin typeface="Consolas"/>
             </a:endParaRPr>
           </a:p>
         </p:txBody>
@@ -7232,7 +7381,7 @@
           <p:cNvPr id="2" name="Title 1">
             <a:extLst>
               <a:ext uri="{FF2B5EF4-FFF2-40B4-BE49-F238E27FC236}">
-                <a16:creationId xmlns:a16="http://schemas.microsoft.com/office/drawing/2014/main" id="{9D5B93B6-31DC-0944-9275-F32583D1F2C1}"/>
+                <a16:creationId xmlns:a16="http://schemas.microsoft.com/office/drawing/2014/main" id="{876FF073-80BD-404B-B770-494A22972105}"/>
               </a:ext>
             </a:extLst>
           </p:cNvPr>
@@ -7249,227 +7398,376 @@
           <a:lstStyle/>
           <a:p>
             <a:r>
-              <a:rPr lang="en-US"/>
-              <a:t>Activity</a:t>
-            </a:r>
-          </a:p>
-        </p:txBody>
-      </p:sp>
-      <p:sp>
-        <p:nvSpPr>
-          <p:cNvPr id="3" name="Content Placeholder 2">
-            <a:extLst>
-              <a:ext uri="{FF2B5EF4-FFF2-40B4-BE49-F238E27FC236}">
-                <a16:creationId xmlns:a16="http://schemas.microsoft.com/office/drawing/2014/main" id="{857737CA-6CBF-D64B-B8E1-9155F1242E27}"/>
-              </a:ext>
-            </a:extLst>
-          </p:cNvPr>
-          <p:cNvSpPr>
-            <a:spLocks noGrp="1"/>
-          </p:cNvSpPr>
-          <p:nvPr>
-            <p:ph idx="1"/>
-          </p:nvPr>
-        </p:nvSpPr>
-        <p:spPr/>
-        <p:txBody>
-          <a:bodyPr/>
-          <a:lstStyle/>
-          <a:p>
-            <a:r>
-              <a:rPr lang="en-US">
-                <a:cs typeface="Calibri"/>
-              </a:rPr>
-              <a:t>Do </a:t>
-            </a:r>
-            <a:r>
-              <a:rPr lang="en-US" b="1" i="1">
-                <a:cs typeface="Calibri"/>
-              </a:rPr>
-              <a:t>Step 1 </a:t>
-            </a:r>
-            <a:r>
-              <a:rPr lang="en-US">
-                <a:cs typeface="Calibri"/>
-              </a:rPr>
-              <a:t>of today's activity within </a:t>
-            </a:r>
-            <a:r>
-              <a:rPr lang="en-US" err="1">
-                <a:cs typeface="Calibri"/>
-              </a:rPr>
-              <a:t>repl</a:t>
-            </a:r>
-            <a:r>
-              <a:rPr lang="en-US">
-                <a:cs typeface="Calibri"/>
-              </a:rPr>
-              <a:t> (that's the first test case)</a:t>
-            </a:r>
-          </a:p>
-          <a:p>
-            <a:r>
-              <a:rPr lang="en-US">
-                <a:cs typeface="Calibri"/>
-              </a:rPr>
-              <a:t>You can work in groups of 2 if you wish</a:t>
-            </a:r>
-          </a:p>
-          <a:p>
-            <a:endParaRPr lang="en-US"/>
-          </a:p>
-          <a:p>
-            <a:endParaRPr lang="en-US"/>
-          </a:p>
-          <a:p>
-            <a:endParaRPr lang="en-US"/>
-          </a:p>
-        </p:txBody>
-      </p:sp>
-      <p:sp>
-        <p:nvSpPr>
-          <p:cNvPr id="4" name="Rectangle 3">
-            <a:extLst>
-              <a:ext uri="{FF2B5EF4-FFF2-40B4-BE49-F238E27FC236}">
-                <a16:creationId xmlns:a16="http://schemas.microsoft.com/office/drawing/2014/main" id="{887E4CCD-9FCE-D946-8454-9D646FF6F57E}"/>
-              </a:ext>
-            </a:extLst>
-          </p:cNvPr>
-          <p:cNvSpPr/>
+              <a:rPr lang="en-US" dirty="0"/>
+              <a:t>Pointer arithmetic</a:t>
+            </a:r>
+          </a:p>
+        </p:txBody>
+      </p:sp>
+      <p:sp>
+        <p:nvSpPr>
+          <p:cNvPr id="4" name="TextBox 3">
+            <a:extLst>
+              <a:ext uri="{FF2B5EF4-FFF2-40B4-BE49-F238E27FC236}">
+                <a16:creationId xmlns:a16="http://schemas.microsoft.com/office/drawing/2014/main" id="{1E8B9F02-B87F-4D50-8352-3E153AF69A1A}"/>
+              </a:ext>
+            </a:extLst>
+          </p:cNvPr>
+          <p:cNvSpPr txBox="1"/>
           <p:nvPr/>
         </p:nvSpPr>
         <p:spPr>
           <a:xfrm>
-            <a:off x="1443300" y="4396154"/>
-            <a:ext cx="8789586" cy="523220"/>
+            <a:off x="1412032" y="2107682"/>
+            <a:ext cx="8080310" cy="2862322"/>
           </a:xfrm>
           <a:prstGeom prst="rect">
             <a:avLst/>
           </a:prstGeom>
-          <a:ln>
-            <a:headEnd type="none" w="med" len="med"/>
-            <a:tailEnd type="none" w="med" len="med"/>
-          </a:ln>
         </p:spPr>
-        <p:style>
-          <a:lnRef idx="0">
-            <a:schemeClr val="accent1"/>
-          </a:lnRef>
-          <a:fillRef idx="3">
-            <a:schemeClr val="accent1"/>
-          </a:fillRef>
-          <a:effectRef idx="3">
-            <a:schemeClr val="accent1"/>
-          </a:effectRef>
-          <a:fontRef idx="minor">
-            <a:schemeClr val="lt1"/>
-          </a:fontRef>
-        </p:style>
-        <p:txBody>
-          <a:bodyPr wrap="none">
+        <p:txBody>
+          <a:bodyPr rot="0" spcFirstLastPara="0" vertOverflow="overflow" horzOverflow="overflow" vert="horz" wrap="square" lIns="91440" tIns="45720" rIns="91440" bIns="45720" numCol="1" spcCol="0" rtlCol="0" fromWordArt="0" anchor="t" anchorCtr="0" forceAA="0" compatLnSpc="1">
+            <a:prstTxWarp prst="textNoShape">
+              <a:avLst/>
+            </a:prstTxWarp>
             <a:spAutoFit/>
           </a:bodyPr>
           <a:lstStyle/>
           <a:p>
             <a:r>
-              <a:rPr lang="en-US" sz="2800" i="1">
-                <a:latin typeface="Anonymous Pro for Powerline" panose="02060609030202000504" pitchFamily="49" charset="0"/>
-                <a:ea typeface="Anonymous Pro for Powerline" panose="02060609030202000504" pitchFamily="49" charset="0"/>
-              </a:rPr>
-              <a:t>https://</a:t>
-            </a:r>
-            <a:r>
-              <a:rPr lang="en-US" sz="2800" i="1" err="1">
-                <a:latin typeface="Anonymous Pro for Powerline" panose="02060609030202000504" pitchFamily="49" charset="0"/>
-                <a:ea typeface="Anonymous Pro for Powerline" panose="02060609030202000504" pitchFamily="49" charset="0"/>
-              </a:rPr>
-              <a:t>repl.it</a:t>
-            </a:r>
-            <a:r>
-              <a:rPr lang="en-US" sz="2800" i="1">
-                <a:latin typeface="Anonymous Pro for Powerline" panose="02060609030202000504" pitchFamily="49" charset="0"/>
-                <a:ea typeface="Anonymous Pro for Powerline" panose="02060609030202000504" pitchFamily="49" charset="0"/>
-              </a:rPr>
-              <a:t>/@</a:t>
-            </a:r>
-            <a:r>
-              <a:rPr lang="en-US" sz="2800" i="1" err="1">
-                <a:latin typeface="Anonymous Pro for Powerline" panose="02060609030202000504" pitchFamily="49" charset="0"/>
-                <a:ea typeface="Anonymous Pro for Powerline" panose="02060609030202000504" pitchFamily="49" charset="0"/>
-              </a:rPr>
-              <a:t>hewner</a:t>
-            </a:r>
-            <a:r>
-              <a:rPr lang="en-US" sz="2800" i="1">
-                <a:latin typeface="Anonymous Pro for Powerline" panose="02060609030202000504" pitchFamily="49" charset="0"/>
-                <a:ea typeface="Anonymous Pro for Powerline" panose="02060609030202000504" pitchFamily="49" charset="0"/>
-              </a:rPr>
-              <a:t>/</a:t>
-            </a:r>
-            <a:r>
-              <a:rPr lang="en-US" sz="2800" i="1" err="1">
-                <a:latin typeface="Anonymous Pro for Powerline" panose="02060609030202000504" pitchFamily="49" charset="0"/>
-                <a:ea typeface="Anonymous Pro for Powerline" panose="02060609030202000504" pitchFamily="49" charset="0"/>
-              </a:rPr>
-              <a:t>VoidMallocFPActivity</a:t>
-            </a:r>
-            <a:endParaRPr lang="en-US" sz="2800" i="1">
-              <a:latin typeface="Anonymous Pro for Powerline" panose="02060609030202000504" pitchFamily="49" charset="0"/>
-              <a:ea typeface="Anonymous Pro for Powerline" panose="02060609030202000504" pitchFamily="49" charset="0"/>
+              <a:rPr lang="en-US" dirty="0">
+                <a:latin typeface="Consolas"/>
+              </a:rPr>
+              <a:t>    char </a:t>
+            </a:r>
+            <a:r>
+              <a:rPr lang="en-US" dirty="0" err="1">
+                <a:latin typeface="Consolas"/>
+              </a:rPr>
+              <a:t>charArray</a:t>
+            </a:r>
+            <a:r>
+              <a:rPr lang="en-US" dirty="0">
+                <a:latin typeface="Consolas"/>
+              </a:rPr>
+              <a:t>[] = {'</a:t>
+            </a:r>
+            <a:r>
+              <a:rPr lang="en-US" dirty="0" err="1">
+                <a:latin typeface="Consolas"/>
+              </a:rPr>
+              <a:t>a','b','c','d</a:t>
+            </a:r>
+            <a:r>
+              <a:rPr lang="en-US" dirty="0">
+                <a:latin typeface="Consolas"/>
+              </a:rPr>
+              <a:t>'};</a:t>
+            </a:r>
+            <a:br>
+              <a:rPr lang="en-US" dirty="0">
+                <a:latin typeface="Consolas"/>
+              </a:rPr>
+            </a:br>
+            <a:r>
+              <a:rPr lang="en-US" dirty="0">
+                <a:latin typeface="Consolas"/>
+              </a:rPr>
+              <a:t>    int </a:t>
+            </a:r>
+            <a:r>
+              <a:rPr lang="en-US" dirty="0" err="1">
+                <a:latin typeface="Consolas"/>
+              </a:rPr>
+              <a:t>intArray</a:t>
+            </a:r>
+            <a:r>
+              <a:rPr lang="en-US" dirty="0">
+                <a:latin typeface="Consolas"/>
+              </a:rPr>
+              <a:t>[] = {1,2,3,4};</a:t>
+            </a:r>
+            <a:br>
+              <a:rPr lang="en-US" dirty="0">
+                <a:latin typeface="Consolas"/>
+              </a:rPr>
+            </a:br>
+            <a:r>
+              <a:rPr lang="en-US" dirty="0">
+                <a:latin typeface="Consolas"/>
+              </a:rPr>
+              <a:t>    char *</a:t>
+            </a:r>
+            <a:r>
+              <a:rPr lang="en-US" dirty="0" err="1">
+                <a:latin typeface="Consolas"/>
+              </a:rPr>
+              <a:t>cPtr</a:t>
+            </a:r>
+            <a:r>
+              <a:rPr lang="en-US" dirty="0">
+                <a:latin typeface="Consolas"/>
+              </a:rPr>
+              <a:t> = </a:t>
+            </a:r>
+            <a:r>
+              <a:rPr lang="en-US" dirty="0" err="1">
+                <a:latin typeface="Consolas"/>
+              </a:rPr>
+              <a:t>charArray</a:t>
+            </a:r>
+            <a:r>
+              <a:rPr lang="en-US" dirty="0">
+                <a:latin typeface="Consolas"/>
+              </a:rPr>
+              <a:t>;</a:t>
+            </a:r>
+            <a:br>
+              <a:rPr lang="en-US" dirty="0">
+                <a:latin typeface="Consolas"/>
+              </a:rPr>
+            </a:br>
+            <a:r>
+              <a:rPr lang="en-US" dirty="0">
+                <a:latin typeface="Consolas"/>
+              </a:rPr>
+              <a:t>    int *</a:t>
+            </a:r>
+            <a:r>
+              <a:rPr lang="en-US" dirty="0" err="1">
+                <a:latin typeface="Consolas"/>
+              </a:rPr>
+              <a:t>iPtr</a:t>
+            </a:r>
+            <a:r>
+              <a:rPr lang="en-US" dirty="0">
+                <a:latin typeface="Consolas"/>
+              </a:rPr>
+              <a:t> = </a:t>
+            </a:r>
+            <a:r>
+              <a:rPr lang="en-US" dirty="0" err="1">
+                <a:latin typeface="Consolas"/>
+              </a:rPr>
+              <a:t>intArray</a:t>
+            </a:r>
+            <a:r>
+              <a:rPr lang="en-US" dirty="0">
+                <a:latin typeface="Consolas"/>
+              </a:rPr>
+              <a:t>;</a:t>
+            </a:r>
+            <a:br>
+              <a:rPr lang="en-US" dirty="0">
+                <a:latin typeface="Consolas"/>
+              </a:rPr>
+            </a:br>
+            <a:r>
+              <a:rPr lang="en-US" dirty="0">
+                <a:latin typeface="Consolas"/>
+              </a:rPr>
+              <a:t>    void *</a:t>
+            </a:r>
+            <a:r>
+              <a:rPr lang="en-US" dirty="0" err="1">
+                <a:latin typeface="Consolas"/>
+              </a:rPr>
+              <a:t>anyPtr</a:t>
+            </a:r>
+            <a:r>
+              <a:rPr lang="en-US" dirty="0">
+                <a:latin typeface="Consolas"/>
+              </a:rPr>
+              <a:t> = </a:t>
+            </a:r>
+            <a:r>
+              <a:rPr lang="en-US" dirty="0" err="1">
+                <a:latin typeface="Consolas"/>
+              </a:rPr>
+              <a:t>iPtr</a:t>
+            </a:r>
+            <a:r>
+              <a:rPr lang="en-US" dirty="0">
+                <a:latin typeface="Consolas"/>
+              </a:rPr>
+              <a:t>;</a:t>
+            </a:r>
+            <a:br>
+              <a:rPr lang="en-US" dirty="0">
+                <a:latin typeface="Consolas"/>
+              </a:rPr>
+            </a:br>
+            <a:r>
+              <a:rPr lang="en-US" dirty="0">
+                <a:latin typeface="Consolas"/>
+              </a:rPr>
+              <a:t>    </a:t>
+            </a:r>
+            <a:br>
+              <a:rPr lang="en-US" dirty="0">
+                <a:latin typeface="Consolas"/>
+              </a:rPr>
+            </a:br>
+            <a:r>
+              <a:rPr lang="en-US" dirty="0">
+                <a:latin typeface="Consolas"/>
+              </a:rPr>
+              <a:t>    </a:t>
+            </a:r>
+            <a:r>
+              <a:rPr lang="en-US" dirty="0" err="1">
+                <a:latin typeface="Consolas"/>
+              </a:rPr>
+              <a:t>cPtr</a:t>
+            </a:r>
+            <a:r>
+              <a:rPr lang="en-US" dirty="0">
+                <a:latin typeface="Consolas"/>
+              </a:rPr>
+              <a:t> = </a:t>
+            </a:r>
+            <a:r>
+              <a:rPr lang="en-US" dirty="0" err="1">
+                <a:latin typeface="Consolas"/>
+              </a:rPr>
+              <a:t>cPtr</a:t>
+            </a:r>
+            <a:r>
+              <a:rPr lang="en-US" dirty="0">
+                <a:latin typeface="Consolas"/>
+              </a:rPr>
+              <a:t> + 1; // points to b (1 bytes further)</a:t>
+            </a:r>
+            <a:br>
+              <a:rPr lang="en-US" dirty="0">
+                <a:latin typeface="Consolas"/>
+              </a:rPr>
+            </a:br>
+            <a:r>
+              <a:rPr lang="en-US" dirty="0">
+                <a:latin typeface="Consolas"/>
+              </a:rPr>
+              <a:t>    </a:t>
+            </a:r>
+            <a:r>
+              <a:rPr lang="en-US" dirty="0" err="1">
+                <a:latin typeface="Consolas"/>
+              </a:rPr>
+              <a:t>iPtr</a:t>
+            </a:r>
+            <a:r>
+              <a:rPr lang="en-US" dirty="0">
+                <a:latin typeface="Consolas"/>
+              </a:rPr>
+              <a:t> = </a:t>
+            </a:r>
+            <a:r>
+              <a:rPr lang="en-US" dirty="0" err="1">
+                <a:latin typeface="Consolas"/>
+              </a:rPr>
+              <a:t>iPtr</a:t>
+            </a:r>
+            <a:r>
+              <a:rPr lang="en-US" dirty="0">
+                <a:latin typeface="Consolas"/>
+              </a:rPr>
+              <a:t> + 1; // points to 2 (4 bytes further)</a:t>
+            </a:r>
+            <a:br>
+              <a:rPr lang="en-US" dirty="0">
+                <a:latin typeface="Consolas"/>
+              </a:rPr>
+            </a:br>
+            <a:r>
+              <a:rPr lang="en-US" dirty="0">
+                <a:latin typeface="Consolas"/>
+              </a:rPr>
+              <a:t>    </a:t>
+            </a:r>
+            <a:r>
+              <a:rPr lang="en-US" dirty="0" err="1">
+                <a:latin typeface="Consolas"/>
+              </a:rPr>
+              <a:t>anyPtr</a:t>
+            </a:r>
+            <a:r>
+              <a:rPr lang="en-US" dirty="0">
+                <a:latin typeface="Consolas"/>
+              </a:rPr>
+              <a:t> = </a:t>
+            </a:r>
+            <a:r>
+              <a:rPr lang="en-US" dirty="0" err="1">
+                <a:latin typeface="Consolas"/>
+              </a:rPr>
+              <a:t>anyPtr</a:t>
+            </a:r>
+            <a:r>
+              <a:rPr lang="en-US" dirty="0">
+                <a:latin typeface="Consolas"/>
+              </a:rPr>
+              <a:t> + 1; //somewhat odd, 1 byte further in </a:t>
+            </a:r>
+            <a:r>
+              <a:rPr lang="en-US" dirty="0" err="1">
+                <a:latin typeface="Consolas"/>
+              </a:rPr>
+              <a:t>gcc</a:t>
+            </a:r>
+            <a:endParaRPr lang="en-US" dirty="0">
+              <a:latin typeface="Consolas"/>
             </a:endParaRPr>
           </a:p>
-        </p:txBody>
-      </p:sp>
-      <p:sp>
-        <p:nvSpPr>
-          <p:cNvPr id="5" name="Right Arrow 4">
-            <a:extLst>
-              <a:ext uri="{FF2B5EF4-FFF2-40B4-BE49-F238E27FC236}">
-                <a16:creationId xmlns:a16="http://schemas.microsoft.com/office/drawing/2014/main" id="{0243E05C-57B6-3047-B8B4-D16C05D366E9}"/>
-              </a:ext>
-            </a:extLst>
-          </p:cNvPr>
-          <p:cNvSpPr/>
-          <p:nvPr/>
-        </p:nvSpPr>
-        <p:spPr>
-          <a:xfrm rot="5400000">
-            <a:off x="4888523" y="3774831"/>
-            <a:ext cx="890954" cy="351692"/>
-          </a:xfrm>
-          <a:prstGeom prst="rightArrow">
-            <a:avLst/>
-          </a:prstGeom>
-        </p:spPr>
-        <p:style>
-          <a:lnRef idx="2">
-            <a:schemeClr val="accent1">
-              <a:shade val="50000"/>
-            </a:schemeClr>
-          </a:lnRef>
-          <a:fillRef idx="1">
-            <a:schemeClr val="accent1"/>
-          </a:fillRef>
-          <a:effectRef idx="0">
-            <a:schemeClr val="accent1"/>
-          </a:effectRef>
-          <a:fontRef idx="minor">
-            <a:schemeClr val="lt1"/>
-          </a:fontRef>
-        </p:style>
-        <p:txBody>
-          <a:bodyPr rtlCol="0" anchor="ctr"/>
-          <a:lstStyle/>
-          <a:p>
-            <a:pPr algn="ctr"/>
-            <a:endParaRPr lang="en-US"/>
+          <a:p>
+            <a:r>
+              <a:rPr lang="en-US" dirty="0">
+                <a:latin typeface="Consolas"/>
+              </a:rPr>
+              <a:t>    int </a:t>
+            </a:r>
+            <a:r>
+              <a:rPr lang="en-US" dirty="0" err="1">
+                <a:latin typeface="Consolas"/>
+              </a:rPr>
+              <a:t>intVal</a:t>
+            </a:r>
+            <a:r>
+              <a:rPr lang="en-US" dirty="0">
+                <a:latin typeface="Consolas"/>
+              </a:rPr>
+              <a:t> = * (int*) </a:t>
+            </a:r>
+            <a:r>
+              <a:rPr lang="en-US" dirty="0" err="1">
+                <a:latin typeface="Consolas"/>
+              </a:rPr>
+              <a:t>anyPtr</a:t>
+            </a:r>
+            <a:r>
+              <a:rPr lang="en-US" dirty="0">
+                <a:latin typeface="Consolas"/>
+              </a:rPr>
+              <a:t>; //</a:t>
+            </a:r>
+            <a:r>
+              <a:rPr lang="en-US" dirty="0" err="1">
+                <a:latin typeface="Consolas"/>
+              </a:rPr>
+              <a:t>intVal</a:t>
+            </a:r>
+            <a:r>
+              <a:rPr lang="en-US" dirty="0">
+                <a:latin typeface="Consolas"/>
+              </a:rPr>
+              <a:t> = 33554432</a:t>
+            </a:r>
           </a:p>
         </p:txBody>
       </p:sp>
     </p:spTree>
     <p:extLst>
       <p:ext uri="{BB962C8B-B14F-4D97-AF65-F5344CB8AC3E}">
-        <p14:creationId xmlns:p14="http://schemas.microsoft.com/office/powerpoint/2010/main" val="2847988046"/>
+        <p14:creationId xmlns:p14="http://schemas.microsoft.com/office/powerpoint/2010/main" val="1268965906"/>
       </p:ext>
     </p:extLst>
   </p:cSld>
@@ -7501,7 +7799,7 @@
           <p:cNvPr id="2" name="Title 1">
             <a:extLst>
               <a:ext uri="{FF2B5EF4-FFF2-40B4-BE49-F238E27FC236}">
-                <a16:creationId xmlns:a16="http://schemas.microsoft.com/office/drawing/2014/main" id="{389BE242-E911-FE46-8635-74DA89E02332}"/>
+                <a16:creationId xmlns:a16="http://schemas.microsoft.com/office/drawing/2014/main" id="{9D5B93B6-31DC-0944-9275-F32583D1F2C1}"/>
               </a:ext>
             </a:extLst>
           </p:cNvPr>
@@ -7519,7 +7817,7 @@
           <a:p>
             <a:r>
               <a:rPr lang="en-US"/>
-              <a:t>Memory management</a:t>
+              <a:t>Activity</a:t>
             </a:r>
           </a:p>
         </p:txBody>
@@ -7529,7 +7827,7 @@
           <p:cNvPr id="3" name="Content Placeholder 2">
             <a:extLst>
               <a:ext uri="{FF2B5EF4-FFF2-40B4-BE49-F238E27FC236}">
-                <a16:creationId xmlns:a16="http://schemas.microsoft.com/office/drawing/2014/main" id="{FC03CD60-DC39-2C42-9BC8-D37CDB15EE23}"/>
+                <a16:creationId xmlns:a16="http://schemas.microsoft.com/office/drawing/2014/main" id="{857737CA-6CBF-D64B-B8E1-9155F1242E27}"/>
               </a:ext>
             </a:extLst>
           </p:cNvPr>
@@ -7546,50 +7844,157 @@
           <a:lstStyle/>
           <a:p>
             <a:r>
-              <a:rPr lang="en-US">
+              <a:rPr lang="en-US" dirty="0">
+                <a:cs typeface="Calibri"/>
+              </a:rPr>
+              <a:t>Do </a:t>
+            </a:r>
+            <a:r>
+              <a:rPr lang="en-US" b="1" i="1" dirty="0">
+                <a:cs typeface="Calibri"/>
+              </a:rPr>
+              <a:t>Step 1 </a:t>
+            </a:r>
+            <a:r>
+              <a:rPr lang="en-US" dirty="0">
+                <a:cs typeface="Calibri"/>
+              </a:rPr>
+              <a:t>of today's activity within </a:t>
+            </a:r>
+            <a:r>
+              <a:rPr lang="en-US" dirty="0" err="1">
+                <a:cs typeface="Calibri"/>
+              </a:rPr>
+              <a:t>repl</a:t>
+            </a:r>
+            <a:endParaRPr lang="en-US" dirty="0">
+              <a:cs typeface="Calibri"/>
+            </a:endParaRPr>
+          </a:p>
+          <a:p>
+            <a:r>
+              <a:rPr lang="en-US" dirty="0">
+                <a:cs typeface="Calibri"/>
+              </a:rPr>
+              <a:t>You can work in groups of 2 if you wish</a:t>
+            </a:r>
+          </a:p>
+          <a:p>
+            <a:endParaRPr lang="en-US" dirty="0"/>
+          </a:p>
+          <a:p>
+            <a:endParaRPr lang="en-US" dirty="0"/>
+          </a:p>
+          <a:p>
+            <a:endParaRPr lang="en-US" dirty="0"/>
+          </a:p>
+        </p:txBody>
+      </p:sp>
+      <p:sp>
+        <p:nvSpPr>
+          <p:cNvPr id="4" name="Rectangle 3">
+            <a:extLst>
+              <a:ext uri="{FF2B5EF4-FFF2-40B4-BE49-F238E27FC236}">
+                <a16:creationId xmlns:a16="http://schemas.microsoft.com/office/drawing/2014/main" id="{887E4CCD-9FCE-D946-8454-9D646FF6F57E}"/>
+              </a:ext>
+            </a:extLst>
+          </p:cNvPr>
+          <p:cNvSpPr/>
+          <p:nvPr/>
+        </p:nvSpPr>
+        <p:spPr>
+          <a:xfrm>
+            <a:off x="1443300" y="4396154"/>
+            <a:ext cx="6346994" cy="523220"/>
+          </a:xfrm>
+          <a:prstGeom prst="rect">
+            <a:avLst/>
+          </a:prstGeom>
+          <a:ln>
+            <a:headEnd type="none" w="med" len="med"/>
+            <a:tailEnd type="none" w="med" len="med"/>
+          </a:ln>
+        </p:spPr>
+        <p:style>
+          <a:lnRef idx="0">
+            <a:schemeClr val="accent1"/>
+          </a:lnRef>
+          <a:fillRef idx="3">
+            <a:schemeClr val="accent1"/>
+          </a:fillRef>
+          <a:effectRef idx="3">
+            <a:schemeClr val="accent1"/>
+          </a:effectRef>
+          <a:fontRef idx="minor">
+            <a:schemeClr val="lt1"/>
+          </a:fontRef>
+        </p:style>
+        <p:txBody>
+          <a:bodyPr wrap="none">
+            <a:spAutoFit/>
+          </a:bodyPr>
+          <a:lstStyle/>
+          <a:p>
+            <a:r>
+              <a:rPr lang="en-US" sz="2800" i="1" dirty="0">
                 <a:latin typeface="Anonymous Pro for Powerline" panose="02060609030202000504" pitchFamily="49" charset="0"/>
                 <a:ea typeface="Anonymous Pro for Powerline" panose="02060609030202000504" pitchFamily="49" charset="0"/>
               </a:rPr>
-              <a:t>malloc(</a:t>
-            </a:r>
-            <a:r>
-              <a:rPr lang="en-US" err="1">
-                <a:latin typeface="Anonymous Pro for Powerline" panose="02060609030202000504" pitchFamily="49" charset="0"/>
-                <a:ea typeface="Anonymous Pro for Powerline" panose="02060609030202000504" pitchFamily="49" charset="0"/>
-              </a:rPr>
-              <a:t>int</a:t>
-            </a:r>
-            <a:r>
-              <a:rPr lang="en-US">
-                <a:latin typeface="Anonymous Pro for Powerline" panose="02060609030202000504" pitchFamily="49" charset="0"/>
-                <a:ea typeface="Anonymous Pro for Powerline" panose="02060609030202000504" pitchFamily="49" charset="0"/>
-              </a:rPr>
-              <a:t> size) </a:t>
-            </a:r>
-            <a:r>
-              <a:rPr lang="en-US"/>
-              <a:t>– give me certain size of memory.</a:t>
-            </a:r>
-          </a:p>
-          <a:p>
-            <a:r>
-              <a:rPr lang="en-US">
-                <a:latin typeface="Anonymous Pro for Powerline" panose="02060609030202000504" pitchFamily="49" charset="0"/>
-                <a:ea typeface="Anonymous Pro for Powerline" panose="02060609030202000504" pitchFamily="49" charset="0"/>
-              </a:rPr>
-              <a:t>free (void *) </a:t>
-            </a:r>
-            <a:r>
-              <a:rPr lang="en-US"/>
-              <a:t>– release that memory for me.</a:t>
-            </a:r>
+              <a:t>https://repl.it/@hewner/ArrayListExample</a:t>
+            </a:r>
+          </a:p>
+        </p:txBody>
+      </p:sp>
+      <p:sp>
+        <p:nvSpPr>
+          <p:cNvPr id="5" name="Right Arrow 4">
+            <a:extLst>
+              <a:ext uri="{FF2B5EF4-FFF2-40B4-BE49-F238E27FC236}">
+                <a16:creationId xmlns:a16="http://schemas.microsoft.com/office/drawing/2014/main" id="{0243E05C-57B6-3047-B8B4-D16C05D366E9}"/>
+              </a:ext>
+            </a:extLst>
+          </p:cNvPr>
+          <p:cNvSpPr/>
+          <p:nvPr/>
+        </p:nvSpPr>
+        <p:spPr>
+          <a:xfrm rot="5400000">
+            <a:off x="4888523" y="3774831"/>
+            <a:ext cx="890954" cy="351692"/>
+          </a:xfrm>
+          <a:prstGeom prst="rightArrow">
+            <a:avLst/>
+          </a:prstGeom>
+        </p:spPr>
+        <p:style>
+          <a:lnRef idx="2">
+            <a:schemeClr val="accent1">
+              <a:shade val="50000"/>
+            </a:schemeClr>
+          </a:lnRef>
+          <a:fillRef idx="1">
+            <a:schemeClr val="accent1"/>
+          </a:fillRef>
+          <a:effectRef idx="0">
+            <a:schemeClr val="accent1"/>
+          </a:effectRef>
+          <a:fontRef idx="minor">
+            <a:schemeClr val="lt1"/>
+          </a:fontRef>
+        </p:style>
+        <p:txBody>
+          <a:bodyPr rtlCol="0" anchor="ctr"/>
+          <a:lstStyle/>
+          <a:p>
+            <a:pPr algn="ctr"/>
+            <a:endParaRPr lang="en-US"/>
           </a:p>
         </p:txBody>
       </p:sp>
     </p:spTree>
     <p:extLst>
       <p:ext uri="{BB962C8B-B14F-4D97-AF65-F5344CB8AC3E}">
-        <p14:creationId xmlns:p14="http://schemas.microsoft.com/office/powerpoint/2010/main" val="1076489709"/>
+        <p14:creationId xmlns:p14="http://schemas.microsoft.com/office/powerpoint/2010/main" val="2847988046"/>
       </p:ext>
     </p:extLst>
   </p:cSld>
@@ -7621,7 +8026,7 @@
           <p:cNvPr id="2" name="Title 1">
             <a:extLst>
               <a:ext uri="{FF2B5EF4-FFF2-40B4-BE49-F238E27FC236}">
-                <a16:creationId xmlns:a16="http://schemas.microsoft.com/office/drawing/2014/main" id="{1CE9E348-A33D-7B49-A301-03CD7EFB51DD}"/>
+                <a16:creationId xmlns:a16="http://schemas.microsoft.com/office/drawing/2014/main" id="{389BE242-E911-FE46-8635-74DA89E02332}"/>
               </a:ext>
             </a:extLst>
           </p:cNvPr>
@@ -7639,365 +8044,69 @@
           <a:p>
             <a:r>
               <a:rPr lang="en-US"/>
-              <a:t>Malloc/Free example</a:t>
-            </a:r>
-          </a:p>
-        </p:txBody>
-      </p:sp>
-      <p:sp>
-        <p:nvSpPr>
-          <p:cNvPr id="4" name="Rectangle 3">
-            <a:extLst>
-              <a:ext uri="{FF2B5EF4-FFF2-40B4-BE49-F238E27FC236}">
-                <a16:creationId xmlns:a16="http://schemas.microsoft.com/office/drawing/2014/main" id="{B4ED3985-1387-7243-B391-F0433F88F2E6}"/>
-              </a:ext>
-            </a:extLst>
-          </p:cNvPr>
-          <p:cNvSpPr/>
-          <p:nvPr/>
-        </p:nvSpPr>
-        <p:spPr>
-          <a:xfrm>
-            <a:off x="2825261" y="1690688"/>
-            <a:ext cx="6096000" cy="3693319"/>
-          </a:xfrm>
-          <a:prstGeom prst="rect">
-            <a:avLst/>
-          </a:prstGeom>
-        </p:spPr>
-        <p:txBody>
-          <a:bodyPr>
-            <a:spAutoFit/>
-          </a:bodyPr>
-          <a:lstStyle/>
-          <a:p>
-            <a:pPr>
-              <a:buNone/>
-            </a:pPr>
+              <a:t>Memory management</a:t>
+            </a:r>
+          </a:p>
+        </p:txBody>
+      </p:sp>
+      <p:sp>
+        <p:nvSpPr>
+          <p:cNvPr id="3" name="Content Placeholder 2">
+            <a:extLst>
+              <a:ext uri="{FF2B5EF4-FFF2-40B4-BE49-F238E27FC236}">
+                <a16:creationId xmlns:a16="http://schemas.microsoft.com/office/drawing/2014/main" id="{FC03CD60-DC39-2C42-9BC8-D37CDB15EE23}"/>
+              </a:ext>
+            </a:extLst>
+          </p:cNvPr>
+          <p:cNvSpPr>
+            <a:spLocks noGrp="1"/>
+          </p:cNvSpPr>
+          <p:nvPr>
+            <p:ph idx="1"/>
+          </p:nvPr>
+        </p:nvSpPr>
+        <p:spPr/>
+        <p:txBody>
+          <a:bodyPr/>
+          <a:lstStyle/>
+          <a:p>
             <a:r>
               <a:rPr lang="en-US">
-                <a:latin typeface="Consolas"/>
-                <a:cs typeface="Calibri"/>
-              </a:rPr>
-              <a:t>void *</a:t>
+                <a:latin typeface="Anonymous Pro for Powerline" panose="02060609030202000504" pitchFamily="49" charset="0"/>
+                <a:ea typeface="Anonymous Pro for Powerline" panose="02060609030202000504" pitchFamily="49" charset="0"/>
+              </a:rPr>
+              <a:t>malloc(</a:t>
             </a:r>
             <a:r>
               <a:rPr lang="en-US" err="1">
-                <a:latin typeface="Consolas"/>
-                <a:cs typeface="Calibri"/>
-              </a:rPr>
-              <a:t>malloc_result</a:t>
+                <a:latin typeface="Anonymous Pro for Powerline" panose="02060609030202000504" pitchFamily="49" charset="0"/>
+                <a:ea typeface="Anonymous Pro for Powerline" panose="02060609030202000504" pitchFamily="49" charset="0"/>
+              </a:rPr>
+              <a:t>int</a:t>
             </a:r>
             <a:r>
               <a:rPr lang="en-US">
-                <a:latin typeface="Consolas"/>
-                <a:cs typeface="Calibri"/>
-              </a:rPr>
-              <a:t> = malloc(4*</a:t>
-            </a:r>
-            <a:r>
-              <a:rPr lang="en-US" err="1">
-                <a:latin typeface="Consolas"/>
-                <a:cs typeface="Calibri"/>
-              </a:rPr>
-              <a:t>sizeof</a:t>
-            </a:r>
+                <a:latin typeface="Anonymous Pro for Powerline" panose="02060609030202000504" pitchFamily="49" charset="0"/>
+                <a:ea typeface="Anonymous Pro for Powerline" panose="02060609030202000504" pitchFamily="49" charset="0"/>
+              </a:rPr>
+              <a:t> size) </a:t>
+            </a:r>
+            <a:r>
+              <a:rPr lang="en-US"/>
+              <a:t>– give me certain size of memory.</a:t>
+            </a:r>
+          </a:p>
+          <a:p>
             <a:r>
               <a:rPr lang="en-US">
-                <a:latin typeface="Consolas"/>
-                <a:cs typeface="Calibri"/>
-              </a:rPr>
-              <a:t>(</a:t>
-            </a:r>
-            <a:r>
-              <a:rPr lang="en-US" err="1">
-                <a:latin typeface="Consolas"/>
-                <a:cs typeface="Calibri"/>
-              </a:rPr>
-              <a:t>int</a:t>
-            </a:r>
-            <a:r>
-              <a:rPr lang="en-US">
-                <a:latin typeface="Consolas"/>
-                <a:cs typeface="Calibri"/>
-              </a:rPr>
-              <a:t>));</a:t>
-            </a:r>
-            <a:endParaRPr lang="en-US">
-              <a:latin typeface="Consolas"/>
-            </a:endParaRPr>
-          </a:p>
-          <a:p>
-            <a:pPr>
-              <a:buNone/>
-            </a:pPr>
-            <a:r>
-              <a:rPr lang="en-US">
-                <a:latin typeface="Consolas"/>
-                <a:cs typeface="Calibri"/>
-              </a:rPr>
-              <a:t>if(</a:t>
-            </a:r>
-            <a:r>
-              <a:rPr lang="en-US" err="1">
-                <a:latin typeface="Consolas"/>
-                <a:cs typeface="Calibri"/>
-              </a:rPr>
-              <a:t>malloc_result</a:t>
-            </a:r>
-            <a:r>
-              <a:rPr lang="en-US">
-                <a:latin typeface="Consolas"/>
-                <a:cs typeface="Calibri"/>
-              </a:rPr>
-              <a:t> == NULL) {</a:t>
-            </a:r>
-            <a:endParaRPr lang="en-US">
-              <a:latin typeface="Consolas"/>
-            </a:endParaRPr>
-          </a:p>
-          <a:p>
-            <a:pPr>
-              <a:buNone/>
-            </a:pPr>
-            <a:r>
-              <a:rPr lang="en-US">
-                <a:latin typeface="Consolas"/>
-                <a:cs typeface="Calibri"/>
-              </a:rPr>
-              <a:t>    //malloc can of course fail if you're out of memory</a:t>
-            </a:r>
-            <a:endParaRPr lang="en-US">
-              <a:latin typeface="Consolas"/>
-            </a:endParaRPr>
-          </a:p>
-          <a:p>
-            <a:pPr>
-              <a:buNone/>
-            </a:pPr>
-            <a:r>
-              <a:rPr lang="en-US">
-                <a:latin typeface="Consolas"/>
-                <a:cs typeface="Calibri"/>
-              </a:rPr>
-              <a:t>    exit(77);</a:t>
-            </a:r>
-            <a:endParaRPr lang="en-US">
-              <a:latin typeface="Consolas"/>
-            </a:endParaRPr>
-          </a:p>
-          <a:p>
-            <a:pPr>
-              <a:buNone/>
-            </a:pPr>
-            <a:r>
-              <a:rPr lang="en-US">
-                <a:latin typeface="Consolas"/>
-                <a:cs typeface="Calibri"/>
-              </a:rPr>
-              <a:t>}</a:t>
-            </a:r>
-            <a:endParaRPr lang="en-US">
-              <a:latin typeface="Consolas"/>
-            </a:endParaRPr>
-          </a:p>
-          <a:p>
-            <a:pPr>
-              <a:buNone/>
-            </a:pPr>
-            <a:r>
-              <a:rPr lang="en-US" err="1">
-                <a:latin typeface="Consolas"/>
-                <a:cs typeface="Calibri"/>
-              </a:rPr>
-              <a:t>int</a:t>
-            </a:r>
-            <a:r>
-              <a:rPr lang="en-US">
-                <a:latin typeface="Consolas"/>
-                <a:cs typeface="Calibri"/>
-              </a:rPr>
-              <a:t> *data = </a:t>
-            </a:r>
-            <a:r>
-              <a:rPr lang="en-US" err="1">
-                <a:latin typeface="Consolas"/>
-                <a:cs typeface="Calibri"/>
-              </a:rPr>
-              <a:t>malloc_result</a:t>
-            </a:r>
-            <a:r>
-              <a:rPr lang="en-US">
-                <a:latin typeface="Consolas"/>
-                <a:cs typeface="Calibri"/>
-              </a:rPr>
-              <a:t>;</a:t>
-            </a:r>
-            <a:endParaRPr lang="en-US">
-              <a:latin typeface="Consolas"/>
-            </a:endParaRPr>
-          </a:p>
-          <a:p>
-            <a:pPr>
-              <a:buNone/>
-            </a:pPr>
-            <a:r>
-              <a:rPr lang="en-US">
-                <a:latin typeface="Consolas"/>
-                <a:cs typeface="Calibri"/>
-              </a:rPr>
-              <a:t>for(</a:t>
-            </a:r>
-            <a:r>
-              <a:rPr lang="en-US" err="1">
-                <a:latin typeface="Consolas"/>
-                <a:cs typeface="Calibri"/>
-              </a:rPr>
-              <a:t>int</a:t>
-            </a:r>
-            <a:r>
-              <a:rPr lang="en-US">
-                <a:latin typeface="Consolas"/>
-                <a:cs typeface="Calibri"/>
-              </a:rPr>
-              <a:t> </a:t>
-            </a:r>
-            <a:r>
-              <a:rPr lang="en-US" err="1">
-                <a:latin typeface="Consolas"/>
-                <a:cs typeface="Calibri"/>
-              </a:rPr>
-              <a:t>i</a:t>
-            </a:r>
-            <a:r>
-              <a:rPr lang="en-US">
-                <a:latin typeface="Consolas"/>
-                <a:cs typeface="Calibri"/>
-              </a:rPr>
-              <a:t> = 0; </a:t>
-            </a:r>
-            <a:r>
-              <a:rPr lang="en-US" err="1">
-                <a:latin typeface="Consolas"/>
-                <a:cs typeface="Calibri"/>
-              </a:rPr>
-              <a:t>i</a:t>
-            </a:r>
-            <a:r>
-              <a:rPr lang="en-US">
-                <a:latin typeface="Consolas"/>
-                <a:cs typeface="Calibri"/>
-              </a:rPr>
-              <a:t> &lt; 4; </a:t>
-            </a:r>
-            <a:r>
-              <a:rPr lang="en-US" err="1">
-                <a:latin typeface="Consolas"/>
-                <a:cs typeface="Calibri"/>
-              </a:rPr>
-              <a:t>i</a:t>
-            </a:r>
-            <a:r>
-              <a:rPr lang="en-US">
-                <a:latin typeface="Consolas"/>
-                <a:cs typeface="Calibri"/>
-              </a:rPr>
-              <a:t>++) {</a:t>
-            </a:r>
-            <a:endParaRPr lang="en-US">
-              <a:latin typeface="Consolas"/>
-            </a:endParaRPr>
-          </a:p>
-          <a:p>
-            <a:pPr>
-              <a:buNone/>
-            </a:pPr>
-            <a:r>
-              <a:rPr lang="en-US">
-                <a:latin typeface="Consolas"/>
-                <a:cs typeface="Calibri"/>
-              </a:rPr>
-              <a:t>  data[</a:t>
-            </a:r>
-            <a:r>
-              <a:rPr lang="en-US" err="1">
-                <a:latin typeface="Consolas"/>
-                <a:cs typeface="Calibri"/>
-              </a:rPr>
-              <a:t>i</a:t>
-            </a:r>
-            <a:r>
-              <a:rPr lang="en-US">
-                <a:latin typeface="Consolas"/>
-                <a:cs typeface="Calibri"/>
-              </a:rPr>
-              <a:t>] = i+1;</a:t>
-            </a:r>
-            <a:endParaRPr lang="en-US">
-              <a:latin typeface="Consolas"/>
-            </a:endParaRPr>
-          </a:p>
-          <a:p>
-            <a:pPr>
-              <a:buNone/>
-            </a:pPr>
-            <a:r>
-              <a:rPr lang="en-US">
-                <a:latin typeface="Consolas"/>
-                <a:cs typeface="Calibri"/>
-              </a:rPr>
-              <a:t>}</a:t>
-            </a:r>
-            <a:endParaRPr lang="en-US">
-              <a:latin typeface="Consolas"/>
-            </a:endParaRPr>
-          </a:p>
-          <a:p>
-            <a:pPr>
-              <a:buNone/>
-            </a:pPr>
-            <a:r>
-              <a:rPr lang="en-US" err="1">
-                <a:latin typeface="Consolas"/>
-                <a:cs typeface="Calibri"/>
-              </a:rPr>
-              <a:t>printf</a:t>
-            </a:r>
-            <a:r>
-              <a:rPr lang="en-US">
-                <a:latin typeface="Consolas"/>
-                <a:cs typeface="Calibri"/>
-              </a:rPr>
-              <a:t>("data %d %d %d %d\n", data[0], data[1], data[2], data[3]);</a:t>
-            </a:r>
-            <a:endParaRPr lang="en-US">
-              <a:latin typeface="Consolas"/>
-            </a:endParaRPr>
-          </a:p>
-          <a:p>
-            <a:pPr>
-              <a:buNone/>
-            </a:pPr>
-            <a:r>
-              <a:rPr lang="en-US">
-                <a:latin typeface="Consolas"/>
-                <a:cs typeface="Calibri"/>
-              </a:rPr>
-              <a:t>free(</a:t>
-            </a:r>
-            <a:r>
-              <a:rPr lang="en-US" err="1">
-                <a:latin typeface="Consolas"/>
-                <a:cs typeface="Calibri"/>
-              </a:rPr>
-              <a:t>malloc_result</a:t>
-            </a:r>
-            <a:r>
-              <a:rPr lang="en-US">
-                <a:latin typeface="Consolas"/>
-                <a:cs typeface="Calibri"/>
-              </a:rPr>
-              <a:t>);</a:t>
+                <a:latin typeface="Anonymous Pro for Powerline" panose="02060609030202000504" pitchFamily="49" charset="0"/>
+                <a:ea typeface="Anonymous Pro for Powerline" panose="02060609030202000504" pitchFamily="49" charset="0"/>
+              </a:rPr>
+              <a:t>free (void *) </a:t>
+            </a:r>
+            <a:r>
+              <a:rPr lang="en-US"/>
+              <a:t>– release that memory for me.</a:t>
             </a:r>
           </a:p>
         </p:txBody>
@@ -8005,7 +8114,7 @@
     </p:spTree>
     <p:extLst>
       <p:ext uri="{BB962C8B-B14F-4D97-AF65-F5344CB8AC3E}">
-        <p14:creationId xmlns:p14="http://schemas.microsoft.com/office/powerpoint/2010/main" val="2054888560"/>
+        <p14:creationId xmlns:p14="http://schemas.microsoft.com/office/powerpoint/2010/main" val="1076489709"/>
       </p:ext>
     </p:extLst>
   </p:cSld>

</xml_diff>

<commit_message>
minor editting on C keys lecture
</commit_message>
<xml_diff>
--- a/ClassMaterials/C_Pointers/C_KeyConcepts.pptx
+++ b/ClassMaterials/C_Pointers/C_KeyConcepts.pptx
@@ -386,7 +386,7 @@
           <a:p>
             <a:fld id="{B2F99CBE-2880-364F-A223-8E393E38EFAB}" type="datetimeFigureOut">
               <a:rPr lang="en-US" smtClean="0"/>
-              <a:t>3/9/2020</a:t>
+              <a:t>9/28/20</a:t>
             </a:fld>
             <a:endParaRPr lang="en-US"/>
           </a:p>
@@ -563,7 +563,7 @@
           <a:p>
             <a:fld id="{8D9AE51D-F948-044F-B984-1DA50063DADE}" type="datetimeFigureOut">
               <a:rPr lang="en-US" smtClean="0"/>
-              <a:t>3/9/2020</a:t>
+              <a:t>9/28/20</a:t>
             </a:fld>
             <a:endParaRPr lang="en-US"/>
           </a:p>
@@ -1145,7 +1145,7 @@
           <a:p>
             <a:fld id="{82A73E24-5133-184A-B08C-013331FC8007}" type="datetimeFigureOut">
               <a:rPr lang="en-US" smtClean="0"/>
-              <a:t>3/9/2020</a:t>
+              <a:t>9/28/20</a:t>
             </a:fld>
             <a:endParaRPr lang="en-US"/>
           </a:p>
@@ -1425,7 +1425,7 @@
           <a:p>
             <a:fld id="{82A73E24-5133-184A-B08C-013331FC8007}" type="datetimeFigureOut">
               <a:rPr lang="en-US" smtClean="0"/>
-              <a:t>3/9/2020</a:t>
+              <a:t>9/28/20</a:t>
             </a:fld>
             <a:endParaRPr lang="en-US"/>
           </a:p>
@@ -1633,7 +1633,7 @@
           <a:p>
             <a:fld id="{82A73E24-5133-184A-B08C-013331FC8007}" type="datetimeFigureOut">
               <a:rPr lang="en-US" smtClean="0"/>
-              <a:t>3/9/2020</a:t>
+              <a:t>9/28/20</a:t>
             </a:fld>
             <a:endParaRPr lang="en-US"/>
           </a:p>
@@ -1873,7 +1873,7 @@
           <a:p>
             <a:fld id="{82A73E24-5133-184A-B08C-013331FC8007}" type="datetimeFigureOut">
               <a:rPr lang="en-US" smtClean="0"/>
-              <a:t>3/9/2020</a:t>
+              <a:t>9/28/20</a:t>
             </a:fld>
             <a:endParaRPr lang="en-US"/>
           </a:p>
@@ -2175,7 +2175,7 @@
           <a:p>
             <a:fld id="{82A73E24-5133-184A-B08C-013331FC8007}" type="datetimeFigureOut">
               <a:rPr lang="en-US" smtClean="0"/>
-              <a:t>3/9/2020</a:t>
+              <a:t>9/28/20</a:t>
             </a:fld>
             <a:endParaRPr lang="en-US"/>
           </a:p>
@@ -2440,7 +2440,7 @@
           <a:p>
             <a:fld id="{82A73E24-5133-184A-B08C-013331FC8007}" type="datetimeFigureOut">
               <a:rPr lang="en-US" smtClean="0"/>
-              <a:t>3/9/2020</a:t>
+              <a:t>9/28/20</a:t>
             </a:fld>
             <a:endParaRPr lang="en-US"/>
           </a:p>
@@ -2852,7 +2852,7 @@
           <a:p>
             <a:fld id="{82A73E24-5133-184A-B08C-013331FC8007}" type="datetimeFigureOut">
               <a:rPr lang="en-US" smtClean="0"/>
-              <a:t>3/9/2020</a:t>
+              <a:t>9/28/20</a:t>
             </a:fld>
             <a:endParaRPr lang="en-US"/>
           </a:p>
@@ -2993,7 +2993,7 @@
           <a:p>
             <a:fld id="{82A73E24-5133-184A-B08C-013331FC8007}" type="datetimeFigureOut">
               <a:rPr lang="en-US" smtClean="0"/>
-              <a:t>3/9/2020</a:t>
+              <a:t>9/28/20</a:t>
             </a:fld>
             <a:endParaRPr lang="en-US"/>
           </a:p>
@@ -3106,7 +3106,7 @@
           <a:p>
             <a:fld id="{82A73E24-5133-184A-B08C-013331FC8007}" type="datetimeFigureOut">
               <a:rPr lang="en-US" smtClean="0"/>
-              <a:t>3/9/2020</a:t>
+              <a:t>9/28/20</a:t>
             </a:fld>
             <a:endParaRPr lang="en-US"/>
           </a:p>
@@ -3417,7 +3417,7 @@
           <a:p>
             <a:fld id="{82A73E24-5133-184A-B08C-013331FC8007}" type="datetimeFigureOut">
               <a:rPr lang="en-US" smtClean="0"/>
-              <a:t>3/9/2020</a:t>
+              <a:t>9/28/20</a:t>
             </a:fld>
             <a:endParaRPr lang="en-US"/>
           </a:p>
@@ -3708,7 +3708,7 @@
           <a:p>
             <a:fld id="{82A73E24-5133-184A-B08C-013331FC8007}" type="datetimeFigureOut">
               <a:rPr lang="en-US" smtClean="0"/>
-              <a:t>3/9/2020</a:t>
+              <a:t>9/28/20</a:t>
             </a:fld>
             <a:endParaRPr lang="en-US"/>
           </a:p>
@@ -3949,7 +3949,7 @@
           <a:p>
             <a:fld id="{82A73E24-5133-184A-B08C-013331FC8007}" type="datetimeFigureOut">
               <a:rPr lang="en-US" smtClean="0"/>
-              <a:t>3/9/2020</a:t>
+              <a:t>9/28/20</a:t>
             </a:fld>
             <a:endParaRPr lang="en-US"/>
           </a:p>
@@ -4431,7 +4431,7 @@
           <a:p>
             <a:fld id="{B7B09853-F130-A44D-A7BC-226D14CA7C56}" type="datetime2">
               <a:rPr lang="en-US" smtClean="0"/>
-              <a:t>Monday, March 9, 2020</a:t>
+              <a:t>Monday, September 28, 2020</a:t>
             </a:fld>
             <a:endParaRPr lang="en-US"/>
           </a:p>
@@ -4941,15 +4941,7 @@
               <a:rPr lang="en-US" dirty="0">
                 <a:cs typeface="Calibri"/>
               </a:rPr>
-              <a:t>You must free everything you malloc-  C will not warn you about memory leakage</a:t>
-            </a:r>
-          </a:p>
-          <a:p>
-            <a:r>
-              <a:rPr lang="en-US" dirty="0">
-                <a:cs typeface="Calibri"/>
-              </a:rPr>
-              <a:t>You should check the return value of </a:t>
+              <a:t>You must free everything you </a:t>
             </a:r>
             <a:r>
               <a:rPr lang="en-US" dirty="0">
@@ -4957,13 +4949,13 @@
                 <a:ea typeface="Anonymous Pro for Powerline" panose="02060609030202000504" pitchFamily="49" charset="0"/>
                 <a:cs typeface="Calibri"/>
               </a:rPr>
-              <a:t>malloc</a:t>
+              <a:t>malloc </a:t>
             </a:r>
             <a:r>
               <a:rPr lang="en-US" dirty="0">
                 <a:cs typeface="Calibri"/>
               </a:rPr>
-              <a:t> to ensure it's not NULL</a:t>
+              <a:t>-ed.  C will not warn you about memory leakage</a:t>
             </a:r>
           </a:p>
           <a:p>
@@ -4971,16 +4963,7 @@
               <a:rPr lang="en-US" dirty="0">
                 <a:cs typeface="Calibri"/>
               </a:rPr>
-              <a:t>You free by passing the same pointer to free that was originally returned from malloc</a:t>
-            </a:r>
-            <a:endParaRPr lang="en-US" dirty="0"/>
-          </a:p>
-          <a:p>
-            <a:r>
-              <a:rPr lang="en-US" dirty="0">
-                <a:cs typeface="Calibri"/>
-              </a:rPr>
-              <a:t>The memory you </a:t>
+              <a:t>You should check the return value of </a:t>
             </a:r>
             <a:r>
               <a:rPr lang="en-US" dirty="0">
@@ -4994,7 +4977,7 @@
               <a:rPr lang="en-US" dirty="0">
                 <a:cs typeface="Calibri"/>
               </a:rPr>
-              <a:t> is filled with garbage data</a:t>
+              <a:t> to ensure it's not NULL</a:t>
             </a:r>
           </a:p>
           <a:p>
@@ -5002,7 +4985,52 @@
               <a:rPr lang="en-US" dirty="0">
                 <a:cs typeface="Calibri"/>
               </a:rPr>
-              <a:t>Don’t access freed memory though it may be still there</a:t>
+              <a:t>You free by passing the same pointer to free that was originally returned from </a:t>
+            </a:r>
+            <a:r>
+              <a:rPr lang="en-US" dirty="0">
+                <a:latin typeface="Anonymous Pro for Powerline" panose="02060609030202000504" pitchFamily="49" charset="0"/>
+                <a:ea typeface="Anonymous Pro for Powerline" panose="02060609030202000504" pitchFamily="49" charset="0"/>
+                <a:cs typeface="Calibri"/>
+              </a:rPr>
+              <a:t>malloc</a:t>
+            </a:r>
+            <a:endParaRPr lang="en-US" dirty="0"/>
+          </a:p>
+          <a:p>
+            <a:r>
+              <a:rPr lang="en-US" dirty="0">
+                <a:cs typeface="Calibri"/>
+              </a:rPr>
+              <a:t>The memory you </a:t>
+            </a:r>
+            <a:r>
+              <a:rPr lang="en-US" dirty="0">
+                <a:latin typeface="Anonymous Pro for Powerline" panose="02060609030202000504" pitchFamily="49" charset="0"/>
+                <a:ea typeface="Anonymous Pro for Powerline" panose="02060609030202000504" pitchFamily="49" charset="0"/>
+                <a:cs typeface="Calibri"/>
+              </a:rPr>
+              <a:t>malloc</a:t>
+            </a:r>
+            <a:r>
+              <a:rPr lang="en-US" dirty="0">
+                <a:cs typeface="Calibri"/>
+              </a:rPr>
+              <a:t> is initialized with garbage data</a:t>
+            </a:r>
+          </a:p>
+          <a:p>
+            <a:r>
+              <a:rPr lang="en-US" dirty="0">
+                <a:cs typeface="Calibri"/>
+              </a:rPr>
+              <a:t>Don’t access freed memory </a:t>
+            </a:r>
+            <a:r>
+              <a:rPr lang="en-US" i="1" dirty="0">
+                <a:cs typeface="Calibri"/>
+              </a:rPr>
+              <a:t>though it may be still there</a:t>
             </a:r>
           </a:p>
           <a:p>
@@ -5174,7 +5202,7 @@
         <p:spPr>
           <a:xfrm>
             <a:off x="1443300" y="4396154"/>
-            <a:ext cx="6346994" cy="523220"/>
+            <a:ext cx="8398453" cy="523220"/>
           </a:xfrm>
           <a:prstGeom prst="rect">
             <a:avLst/>
@@ -5209,7 +5237,35 @@
                 <a:latin typeface="Anonymous Pro for Powerline" panose="02060609030202000504" pitchFamily="49" charset="0"/>
                 <a:ea typeface="Anonymous Pro for Powerline" panose="02060609030202000504" pitchFamily="49" charset="0"/>
               </a:rPr>
-              <a:t>https://repl.it/@hewner/ArrayListExample</a:t>
+              <a:t>https://</a:t>
+            </a:r>
+            <a:r>
+              <a:rPr lang="en-US" sz="2800" i="1" dirty="0" err="1">
+                <a:latin typeface="Anonymous Pro for Powerline" panose="02060609030202000504" pitchFamily="49" charset="0"/>
+                <a:ea typeface="Anonymous Pro for Powerline" panose="02060609030202000504" pitchFamily="49" charset="0"/>
+              </a:rPr>
+              <a:t>repl.it</a:t>
+            </a:r>
+            <a:r>
+              <a:rPr lang="en-US" sz="2800" i="1" dirty="0">
+                <a:latin typeface="Anonymous Pro for Powerline" panose="02060609030202000504" pitchFamily="49" charset="0"/>
+                <a:ea typeface="Anonymous Pro for Powerline" panose="02060609030202000504" pitchFamily="49" charset="0"/>
+              </a:rPr>
+              <a:t>/@</a:t>
+            </a:r>
+            <a:r>
+              <a:rPr lang="en-US" sz="2800" i="1" dirty="0" err="1">
+                <a:latin typeface="Anonymous Pro for Powerline" panose="02060609030202000504" pitchFamily="49" charset="0"/>
+                <a:ea typeface="Anonymous Pro for Powerline" panose="02060609030202000504" pitchFamily="49" charset="0"/>
+              </a:rPr>
+              <a:t>RHITcsse</a:t>
+            </a:r>
+            <a:r>
+              <a:rPr lang="en-US" sz="2800" i="1" dirty="0">
+                <a:latin typeface="Anonymous Pro for Powerline" panose="02060609030202000504" pitchFamily="49" charset="0"/>
+                <a:ea typeface="Anonymous Pro for Powerline" panose="02060609030202000504" pitchFamily="49" charset="0"/>
+              </a:rPr>
+              <a:t>/ArrayListExample</a:t>
             </a:r>
           </a:p>
         </p:txBody>
@@ -6082,7 +6138,7 @@
         <p:spPr>
           <a:xfrm>
             <a:off x="1443300" y="4396154"/>
-            <a:ext cx="6346994" cy="523220"/>
+            <a:ext cx="8398453" cy="523220"/>
           </a:xfrm>
           <a:prstGeom prst="rect">
             <a:avLst/>
@@ -6117,7 +6173,35 @@
                 <a:latin typeface="Anonymous Pro for Powerline" panose="02060609030202000504" pitchFamily="49" charset="0"/>
                 <a:ea typeface="Anonymous Pro for Powerline" panose="02060609030202000504" pitchFamily="49" charset="0"/>
               </a:rPr>
-              <a:t>https://repl.it/@hewner/ArrayListExample</a:t>
+              <a:t>https://</a:t>
+            </a:r>
+            <a:r>
+              <a:rPr lang="en-US" sz="2800" i="1" dirty="0" err="1">
+                <a:latin typeface="Anonymous Pro for Powerline" panose="02060609030202000504" pitchFamily="49" charset="0"/>
+                <a:ea typeface="Anonymous Pro for Powerline" panose="02060609030202000504" pitchFamily="49" charset="0"/>
+              </a:rPr>
+              <a:t>repl.it</a:t>
+            </a:r>
+            <a:r>
+              <a:rPr lang="en-US" sz="2800" i="1" dirty="0">
+                <a:latin typeface="Anonymous Pro for Powerline" panose="02060609030202000504" pitchFamily="49" charset="0"/>
+                <a:ea typeface="Anonymous Pro for Powerline" panose="02060609030202000504" pitchFamily="49" charset="0"/>
+              </a:rPr>
+              <a:t>/@</a:t>
+            </a:r>
+            <a:r>
+              <a:rPr lang="en-US" sz="2800" i="1" dirty="0" err="1">
+                <a:latin typeface="Anonymous Pro for Powerline" panose="02060609030202000504" pitchFamily="49" charset="0"/>
+                <a:ea typeface="Anonymous Pro for Powerline" panose="02060609030202000504" pitchFamily="49" charset="0"/>
+              </a:rPr>
+              <a:t>RHITcsse</a:t>
+            </a:r>
+            <a:r>
+              <a:rPr lang="en-US" sz="2800" i="1" dirty="0">
+                <a:latin typeface="Anonymous Pro for Powerline" panose="02060609030202000504" pitchFamily="49" charset="0"/>
+                <a:ea typeface="Anonymous Pro for Powerline" panose="02060609030202000504" pitchFamily="49" charset="0"/>
+              </a:rPr>
+              <a:t>/ArrayListExample</a:t>
             </a:r>
           </a:p>
         </p:txBody>
@@ -7905,7 +7989,7 @@
         <p:spPr>
           <a:xfrm>
             <a:off x="1443300" y="4396154"/>
-            <a:ext cx="6346994" cy="523220"/>
+            <a:ext cx="8398453" cy="523220"/>
           </a:xfrm>
           <a:prstGeom prst="rect">
             <a:avLst/>
@@ -7940,7 +8024,35 @@
                 <a:latin typeface="Anonymous Pro for Powerline" panose="02060609030202000504" pitchFamily="49" charset="0"/>
                 <a:ea typeface="Anonymous Pro for Powerline" panose="02060609030202000504" pitchFamily="49" charset="0"/>
               </a:rPr>
-              <a:t>https://repl.it/@hewner/ArrayListExample</a:t>
+              <a:t>https://</a:t>
+            </a:r>
+            <a:r>
+              <a:rPr lang="en-US" sz="2800" i="1" dirty="0" err="1">
+                <a:latin typeface="Anonymous Pro for Powerline" panose="02060609030202000504" pitchFamily="49" charset="0"/>
+                <a:ea typeface="Anonymous Pro for Powerline" panose="02060609030202000504" pitchFamily="49" charset="0"/>
+              </a:rPr>
+              <a:t>repl.it</a:t>
+            </a:r>
+            <a:r>
+              <a:rPr lang="en-US" sz="2800" i="1" dirty="0">
+                <a:latin typeface="Anonymous Pro for Powerline" panose="02060609030202000504" pitchFamily="49" charset="0"/>
+                <a:ea typeface="Anonymous Pro for Powerline" panose="02060609030202000504" pitchFamily="49" charset="0"/>
+              </a:rPr>
+              <a:t>/@</a:t>
+            </a:r>
+            <a:r>
+              <a:rPr lang="en-US" sz="2800" i="1" dirty="0" err="1">
+                <a:latin typeface="Anonymous Pro for Powerline" panose="02060609030202000504" pitchFamily="49" charset="0"/>
+                <a:ea typeface="Anonymous Pro for Powerline" panose="02060609030202000504" pitchFamily="49" charset="0"/>
+              </a:rPr>
+              <a:t>RHITcsse</a:t>
+            </a:r>
+            <a:r>
+              <a:rPr lang="en-US" sz="2800" i="1" dirty="0">
+                <a:latin typeface="Anonymous Pro for Powerline" panose="02060609030202000504" pitchFamily="49" charset="0"/>
+                <a:ea typeface="Anonymous Pro for Powerline" panose="02060609030202000504" pitchFamily="49" charset="0"/>
+              </a:rPr>
+              <a:t>/ArrayListExample</a:t>
             </a:r>
           </a:p>
         </p:txBody>

</xml_diff>

<commit_message>
Updated C pointer slide
</commit_message>
<xml_diff>
--- a/ClassMaterials/C_Pointers/C_KeyConcepts.pptx
+++ b/ClassMaterials/C_Pointers/C_KeyConcepts.pptx
@@ -386,7 +386,7 @@
           <a:p>
             <a:fld id="{B2F99CBE-2880-364F-A223-8E393E38EFAB}" type="datetimeFigureOut">
               <a:rPr lang="en-US" smtClean="0"/>
-              <a:t>9/28/20</a:t>
+              <a:t>11/29/2021</a:t>
             </a:fld>
             <a:endParaRPr lang="en-US"/>
           </a:p>
@@ -563,7 +563,7 @@
           <a:p>
             <a:fld id="{8D9AE51D-F948-044F-B984-1DA50063DADE}" type="datetimeFigureOut">
               <a:rPr lang="en-US" smtClean="0"/>
-              <a:t>9/28/20</a:t>
+              <a:t>11/29/2021</a:t>
             </a:fld>
             <a:endParaRPr lang="en-US"/>
           </a:p>
@@ -1145,7 +1145,7 @@
           <a:p>
             <a:fld id="{82A73E24-5133-184A-B08C-013331FC8007}" type="datetimeFigureOut">
               <a:rPr lang="en-US" smtClean="0"/>
-              <a:t>9/28/20</a:t>
+              <a:t>11/29/2021</a:t>
             </a:fld>
             <a:endParaRPr lang="en-US"/>
           </a:p>
@@ -1425,7 +1425,7 @@
           <a:p>
             <a:fld id="{82A73E24-5133-184A-B08C-013331FC8007}" type="datetimeFigureOut">
               <a:rPr lang="en-US" smtClean="0"/>
-              <a:t>9/28/20</a:t>
+              <a:t>11/29/2021</a:t>
             </a:fld>
             <a:endParaRPr lang="en-US"/>
           </a:p>
@@ -1633,7 +1633,7 @@
           <a:p>
             <a:fld id="{82A73E24-5133-184A-B08C-013331FC8007}" type="datetimeFigureOut">
               <a:rPr lang="en-US" smtClean="0"/>
-              <a:t>9/28/20</a:t>
+              <a:t>11/29/2021</a:t>
             </a:fld>
             <a:endParaRPr lang="en-US"/>
           </a:p>
@@ -1873,7 +1873,7 @@
           <a:p>
             <a:fld id="{82A73E24-5133-184A-B08C-013331FC8007}" type="datetimeFigureOut">
               <a:rPr lang="en-US" smtClean="0"/>
-              <a:t>9/28/20</a:t>
+              <a:t>11/29/2021</a:t>
             </a:fld>
             <a:endParaRPr lang="en-US"/>
           </a:p>
@@ -2175,7 +2175,7 @@
           <a:p>
             <a:fld id="{82A73E24-5133-184A-B08C-013331FC8007}" type="datetimeFigureOut">
               <a:rPr lang="en-US" smtClean="0"/>
-              <a:t>9/28/20</a:t>
+              <a:t>11/29/2021</a:t>
             </a:fld>
             <a:endParaRPr lang="en-US"/>
           </a:p>
@@ -2440,7 +2440,7 @@
           <a:p>
             <a:fld id="{82A73E24-5133-184A-B08C-013331FC8007}" type="datetimeFigureOut">
               <a:rPr lang="en-US" smtClean="0"/>
-              <a:t>9/28/20</a:t>
+              <a:t>11/29/2021</a:t>
             </a:fld>
             <a:endParaRPr lang="en-US"/>
           </a:p>
@@ -2852,7 +2852,7 @@
           <a:p>
             <a:fld id="{82A73E24-5133-184A-B08C-013331FC8007}" type="datetimeFigureOut">
               <a:rPr lang="en-US" smtClean="0"/>
-              <a:t>9/28/20</a:t>
+              <a:t>11/29/2021</a:t>
             </a:fld>
             <a:endParaRPr lang="en-US"/>
           </a:p>
@@ -2993,7 +2993,7 @@
           <a:p>
             <a:fld id="{82A73E24-5133-184A-B08C-013331FC8007}" type="datetimeFigureOut">
               <a:rPr lang="en-US" smtClean="0"/>
-              <a:t>9/28/20</a:t>
+              <a:t>11/29/2021</a:t>
             </a:fld>
             <a:endParaRPr lang="en-US"/>
           </a:p>
@@ -3106,7 +3106,7 @@
           <a:p>
             <a:fld id="{82A73E24-5133-184A-B08C-013331FC8007}" type="datetimeFigureOut">
               <a:rPr lang="en-US" smtClean="0"/>
-              <a:t>9/28/20</a:t>
+              <a:t>11/29/2021</a:t>
             </a:fld>
             <a:endParaRPr lang="en-US"/>
           </a:p>
@@ -3417,7 +3417,7 @@
           <a:p>
             <a:fld id="{82A73E24-5133-184A-B08C-013331FC8007}" type="datetimeFigureOut">
               <a:rPr lang="en-US" smtClean="0"/>
-              <a:t>9/28/20</a:t>
+              <a:t>11/29/2021</a:t>
             </a:fld>
             <a:endParaRPr lang="en-US"/>
           </a:p>
@@ -3708,7 +3708,7 @@
           <a:p>
             <a:fld id="{82A73E24-5133-184A-B08C-013331FC8007}" type="datetimeFigureOut">
               <a:rPr lang="en-US" smtClean="0"/>
-              <a:t>9/28/20</a:t>
+              <a:t>11/29/2021</a:t>
             </a:fld>
             <a:endParaRPr lang="en-US"/>
           </a:p>
@@ -3949,7 +3949,7 @@
           <a:p>
             <a:fld id="{82A73E24-5133-184A-B08C-013331FC8007}" type="datetimeFigureOut">
               <a:rPr lang="en-US" smtClean="0"/>
-              <a:t>9/28/20</a:t>
+              <a:t>11/29/2021</a:t>
             </a:fld>
             <a:endParaRPr lang="en-US"/>
           </a:p>
@@ -4431,7 +4431,7 @@
           <a:p>
             <a:fld id="{B7B09853-F130-A44D-A7BC-226D14CA7C56}" type="datetime2">
               <a:rPr lang="en-US" smtClean="0"/>
-              <a:t>Monday, September 28, 2020</a:t>
+              <a:t>Monday, November 29, 2021</a:t>
             </a:fld>
             <a:endParaRPr lang="en-US"/>
           </a:p>
@@ -5390,44 +5390,147 @@
             <p:ph idx="1"/>
           </p:nvPr>
         </p:nvSpPr>
-        <p:spPr/>
+        <p:spPr>
+          <a:xfrm>
+            <a:off x="838200" y="2659053"/>
+            <a:ext cx="10515600" cy="4062422"/>
+          </a:xfrm>
+        </p:spPr>
         <p:txBody>
           <a:bodyPr/>
           <a:lstStyle/>
           <a:p>
             <a:r>
-              <a:rPr lang="en-US"/>
-              <a:t>like normal data pointers (</a:t>
-            </a:r>
-            <a:r>
-              <a:rPr lang="en-US" err="1"/>
-              <a:t>int</a:t>
-            </a:r>
-            <a:r>
-              <a:rPr lang="en-US"/>
-              <a:t> *, char *, </a:t>
-            </a:r>
-            <a:r>
-              <a:rPr lang="en-US" err="1"/>
+              <a:rPr lang="en-US" dirty="0"/>
+              <a:t>like normal data pointers (int *, char *, </a:t>
+            </a:r>
+            <a:r>
+              <a:rPr lang="en-US" dirty="0" err="1"/>
               <a:t>etc</a:t>
             </a:r>
             <a:r>
-              <a:rPr lang="en-US"/>
+              <a:rPr lang="en-US" dirty="0"/>
               <a:t>), we can have pointers to functions. </a:t>
             </a:r>
           </a:p>
           <a:p>
             <a:r>
-              <a:rPr lang="en-US"/>
+              <a:rPr lang="en-US" dirty="0"/>
               <a:t>We can use (</a:t>
             </a:r>
             <a:r>
-              <a:rPr lang="en-US" err="1"/>
+              <a:rPr lang="en-US" dirty="0" err="1"/>
               <a:t>a.k.a</a:t>
             </a:r>
             <a:r>
-              <a:rPr lang="en-US"/>
+              <a:rPr lang="en-US" dirty="0"/>
               <a:t> call) the pointer</a:t>
+            </a:r>
+          </a:p>
+        </p:txBody>
+      </p:sp>
+      <p:sp>
+        <p:nvSpPr>
+          <p:cNvPr id="4" name="TextBox 3">
+            <a:extLst>
+              <a:ext uri="{FF2B5EF4-FFF2-40B4-BE49-F238E27FC236}">
+                <a16:creationId xmlns:a16="http://schemas.microsoft.com/office/drawing/2014/main" id="{BB62DBED-EC13-40A3-A785-16F3E9E9BC70}"/>
+              </a:ext>
+            </a:extLst>
+          </p:cNvPr>
+          <p:cNvSpPr txBox="1"/>
+          <p:nvPr/>
+        </p:nvSpPr>
+        <p:spPr>
+          <a:xfrm>
+            <a:off x="838200" y="1800752"/>
+            <a:ext cx="10123380" cy="461665"/>
+          </a:xfrm>
+          <a:prstGeom prst="rect">
+            <a:avLst/>
+          </a:prstGeom>
+          <a:noFill/>
+        </p:spPr>
+        <p:txBody>
+          <a:bodyPr wrap="square" rtlCol="0">
+            <a:spAutoFit/>
+          </a:bodyPr>
+          <a:lstStyle/>
+          <a:p>
+            <a:r>
+              <a:rPr lang="en-US" sz="2400" dirty="0">
+                <a:solidFill>
+                  <a:schemeClr val="accent1"/>
+                </a:solidFill>
+                <a:latin typeface="Consolas" panose="020B0609020204030204" pitchFamily="49" charset="0"/>
+              </a:rPr>
+              <a:t>&lt;</a:t>
+            </a:r>
+            <a:r>
+              <a:rPr lang="en-US" sz="2400" dirty="0" err="1">
+                <a:solidFill>
+                  <a:schemeClr val="accent1"/>
+                </a:solidFill>
+                <a:latin typeface="Consolas" panose="020B0609020204030204" pitchFamily="49" charset="0"/>
+              </a:rPr>
+              <a:t>return_type</a:t>
+            </a:r>
+            <a:r>
+              <a:rPr lang="en-US" sz="2400" dirty="0">
+                <a:solidFill>
+                  <a:schemeClr val="accent1"/>
+                </a:solidFill>
+                <a:latin typeface="Consolas" panose="020B0609020204030204" pitchFamily="49" charset="0"/>
+              </a:rPr>
+              <a:t>&gt; </a:t>
+            </a:r>
+            <a:r>
+              <a:rPr lang="en-US" sz="2400" dirty="0">
+                <a:solidFill>
+                  <a:srgbClr val="FF0000"/>
+                </a:solidFill>
+                <a:latin typeface="Consolas" panose="020B0609020204030204" pitchFamily="49" charset="0"/>
+              </a:rPr>
+              <a:t>*</a:t>
+            </a:r>
+            <a:r>
+              <a:rPr lang="en-US" sz="2400" dirty="0" err="1">
+                <a:solidFill>
+                  <a:schemeClr val="accent6"/>
+                </a:solidFill>
+                <a:latin typeface="Consolas" panose="020B0609020204030204" pitchFamily="49" charset="0"/>
+              </a:rPr>
+              <a:t>func_pointer</a:t>
+            </a:r>
+            <a:r>
+              <a:rPr lang="en-US" sz="2400" dirty="0">
+                <a:solidFill>
+                  <a:schemeClr val="accent1"/>
+                </a:solidFill>
+                <a:latin typeface="Consolas" panose="020B0609020204030204" pitchFamily="49" charset="0"/>
+              </a:rPr>
+              <a:t>(&lt;input1_type&gt;</a:t>
+            </a:r>
+            <a:r>
+              <a:rPr lang="en-US" sz="2400" dirty="0">
+                <a:latin typeface="Consolas" panose="020B0609020204030204" pitchFamily="49" charset="0"/>
+              </a:rPr>
+              <a:t>, </a:t>
+            </a:r>
+            <a:r>
+              <a:rPr lang="en-US" sz="2400" dirty="0">
+                <a:solidFill>
+                  <a:schemeClr val="accent1"/>
+                </a:solidFill>
+                <a:latin typeface="Consolas" panose="020B0609020204030204" pitchFamily="49" charset="0"/>
+              </a:rPr>
+              <a:t>&lt;input2_type&gt;</a:t>
+            </a:r>
+            <a:r>
+              <a:rPr lang="en-US" sz="2400" dirty="0">
+                <a:latin typeface="Consolas" panose="020B0609020204030204" pitchFamily="49" charset="0"/>
+              </a:rPr>
+              <a:t>,…)</a:t>
             </a:r>
           </a:p>
         </p:txBody>
@@ -6394,7 +6497,7 @@
 </file>
 
 <file path=ppt/slides/slide3.xml><?xml version="1.0" encoding="utf-8"?>
-<p:sld xmlns:a="http://schemas.openxmlformats.org/drawingml/2006/main" xmlns:r="http://schemas.openxmlformats.org/officeDocument/2006/relationships" xmlns:p="http://schemas.openxmlformats.org/presentationml/2006/main">
+<p:sld xmlns:a="http://schemas.openxmlformats.org/drawingml/2006/main" xmlns:r="http://schemas.openxmlformats.org/officeDocument/2006/relationships" xmlns:p="http://schemas.openxmlformats.org/presentationml/2006/main" show="0">
   <p:cSld>
     <p:spTree>
       <p:nvGrpSpPr>
@@ -6861,7 +6964,7 @@
           <a:lstStyle/>
           <a:p>
             <a:r>
-              <a:rPr lang="en-US">
+              <a:rPr lang="en-US" dirty="0">
                 <a:cs typeface="Calibri"/>
               </a:rPr>
               <a:t>Just like regular pointers but can point to anything</a:t>
@@ -6869,7 +6972,7 @@
           </a:p>
           <a:p>
             <a:r>
-              <a:rPr lang="en-US"/>
+              <a:rPr lang="en-US" dirty="0"/>
               <a:t>Example:</a:t>
             </a:r>
           </a:p>
@@ -6906,7 +7009,7 @@
               <a:buNone/>
             </a:pPr>
             <a:r>
-              <a:rPr lang="en-US">
+              <a:rPr lang="en-US" dirty="0">
                 <a:latin typeface="Anonymous Pro for Powerline" panose="02060609030202000504" pitchFamily="49" charset="0"/>
                 <a:ea typeface="Anonymous Pro for Powerline" panose="02060609030202000504" pitchFamily="49" charset="0"/>
                 <a:cs typeface="Calibri"/>
@@ -6914,7 +7017,7 @@
               <a:t>void *</a:t>
             </a:r>
             <a:r>
-              <a:rPr lang="en-US" err="1">
+              <a:rPr lang="en-US" dirty="0" err="1">
                 <a:latin typeface="Anonymous Pro for Powerline" panose="02060609030202000504" pitchFamily="49" charset="0"/>
                 <a:ea typeface="Anonymous Pro for Powerline" panose="02060609030202000504" pitchFamily="49" charset="0"/>
                 <a:cs typeface="Calibri"/>
@@ -6922,14 +7025,14 @@
               <a:t>my_void_pointer</a:t>
             </a:r>
             <a:r>
-              <a:rPr lang="en-US">
+              <a:rPr lang="en-US" dirty="0">
                 <a:latin typeface="Anonymous Pro for Powerline" panose="02060609030202000504" pitchFamily="49" charset="0"/>
                 <a:ea typeface="Anonymous Pro for Powerline" panose="02060609030202000504" pitchFamily="49" charset="0"/>
                 <a:cs typeface="Calibri"/>
               </a:rPr>
               <a:t>;</a:t>
             </a:r>
-            <a:endParaRPr lang="en-US">
+            <a:endParaRPr lang="en-US" dirty="0">
               <a:latin typeface="Anonymous Pro for Powerline" panose="02060609030202000504" pitchFamily="49" charset="0"/>
               <a:ea typeface="Anonymous Pro for Powerline" panose="02060609030202000504" pitchFamily="49" charset="0"/>
             </a:endParaRPr>
@@ -6939,38 +7042,30 @@
               <a:buNone/>
             </a:pPr>
             <a:r>
-              <a:rPr lang="en-US" err="1">
+              <a:rPr lang="en-US" dirty="0">
                 <a:latin typeface="Anonymous Pro for Powerline" panose="02060609030202000504" pitchFamily="49" charset="0"/>
                 <a:ea typeface="Anonymous Pro for Powerline" panose="02060609030202000504" pitchFamily="49" charset="0"/>
                 <a:cs typeface="Calibri"/>
               </a:rPr>
-              <a:t>int</a:t>
-            </a:r>
-            <a:r>
-              <a:rPr lang="en-US">
+              <a:t>int </a:t>
+            </a:r>
+            <a:r>
+              <a:rPr lang="en-US" dirty="0" err="1">
                 <a:latin typeface="Anonymous Pro for Powerline" panose="02060609030202000504" pitchFamily="49" charset="0"/>
                 <a:ea typeface="Anonymous Pro for Powerline" panose="02060609030202000504" pitchFamily="49" charset="0"/>
                 <a:cs typeface="Calibri"/>
               </a:rPr>
-              <a:t> </a:t>
-            </a:r>
-            <a:r>
-              <a:rPr lang="en-US" err="1">
+              <a:t>my_int</a:t>
+            </a:r>
+            <a:r>
+              <a:rPr lang="en-US" dirty="0">
                 <a:latin typeface="Anonymous Pro for Powerline" panose="02060609030202000504" pitchFamily="49" charset="0"/>
                 <a:ea typeface="Anonymous Pro for Powerline" panose="02060609030202000504" pitchFamily="49" charset="0"/>
                 <a:cs typeface="Calibri"/>
               </a:rPr>
-              <a:t>my_int</a:t>
-            </a:r>
-            <a:r>
-              <a:rPr lang="en-US">
-                <a:latin typeface="Anonymous Pro for Powerline" panose="02060609030202000504" pitchFamily="49" charset="0"/>
-                <a:ea typeface="Anonymous Pro for Powerline" panose="02060609030202000504" pitchFamily="49" charset="0"/>
-                <a:cs typeface="Calibri"/>
-              </a:rPr>
               <a:t> = 77;</a:t>
             </a:r>
-            <a:endParaRPr lang="en-US">
+            <a:endParaRPr lang="en-US" dirty="0">
               <a:latin typeface="Anonymous Pro for Powerline" panose="02060609030202000504" pitchFamily="49" charset="0"/>
               <a:ea typeface="Anonymous Pro for Powerline" panose="02060609030202000504" pitchFamily="49" charset="0"/>
             </a:endParaRPr>
@@ -6980,7 +7075,7 @@
               <a:buNone/>
             </a:pPr>
             <a:r>
-              <a:rPr lang="en-US">
+              <a:rPr lang="en-US" dirty="0">
                 <a:latin typeface="Anonymous Pro for Powerline" panose="02060609030202000504" pitchFamily="49" charset="0"/>
                 <a:ea typeface="Anonymous Pro for Powerline" panose="02060609030202000504" pitchFamily="49" charset="0"/>
                 <a:cs typeface="Calibri"/>
@@ -6988,7 +7083,7 @@
               <a:t>double </a:t>
             </a:r>
             <a:r>
-              <a:rPr lang="en-US" err="1">
+              <a:rPr lang="en-US" dirty="0" err="1">
                 <a:latin typeface="Anonymous Pro for Powerline" panose="02060609030202000504" pitchFamily="49" charset="0"/>
                 <a:ea typeface="Anonymous Pro for Powerline" panose="02060609030202000504" pitchFamily="49" charset="0"/>
                 <a:cs typeface="Calibri"/>
@@ -6996,14 +7091,14 @@
               <a:t>my_double</a:t>
             </a:r>
             <a:r>
-              <a:rPr lang="en-US">
+              <a:rPr lang="en-US" dirty="0">
                 <a:latin typeface="Anonymous Pro for Powerline" panose="02060609030202000504" pitchFamily="49" charset="0"/>
                 <a:ea typeface="Anonymous Pro for Powerline" panose="02060609030202000504" pitchFamily="49" charset="0"/>
                 <a:cs typeface="Calibri"/>
               </a:rPr>
               <a:t> = 17;</a:t>
             </a:r>
-            <a:endParaRPr lang="en-US">
+            <a:endParaRPr lang="en-US" dirty="0">
               <a:latin typeface="Anonymous Pro for Powerline" panose="02060609030202000504" pitchFamily="49" charset="0"/>
               <a:ea typeface="Anonymous Pro for Powerline" panose="02060609030202000504" pitchFamily="49" charset="0"/>
             </a:endParaRPr>
@@ -7013,14 +7108,14 @@
               <a:buNone/>
             </a:pPr>
             <a:r>
-              <a:rPr lang="en-US">
+              <a:rPr lang="en-US" dirty="0">
                 <a:latin typeface="Anonymous Pro for Powerline" panose="02060609030202000504" pitchFamily="49" charset="0"/>
                 <a:ea typeface="Anonymous Pro for Powerline" panose="02060609030202000504" pitchFamily="49" charset="0"/>
                 <a:cs typeface="Calibri"/>
               </a:rPr>
               <a:t>  </a:t>
             </a:r>
-            <a:endParaRPr lang="en-US">
+            <a:endParaRPr lang="en-US" dirty="0">
               <a:latin typeface="Anonymous Pro for Powerline" panose="02060609030202000504" pitchFamily="49" charset="0"/>
               <a:ea typeface="Anonymous Pro for Powerline" panose="02060609030202000504" pitchFamily="49" charset="0"/>
             </a:endParaRPr>
@@ -7030,14 +7125,14 @@
               <a:buNone/>
             </a:pPr>
             <a:r>
-              <a:rPr lang="en-US">
+              <a:rPr lang="en-US" dirty="0">
                 <a:latin typeface="Anonymous Pro for Powerline" panose="02060609030202000504" pitchFamily="49" charset="0"/>
                 <a:ea typeface="Anonymous Pro for Powerline" panose="02060609030202000504" pitchFamily="49" charset="0"/>
                 <a:cs typeface="Calibri"/>
               </a:rPr>
               <a:t>//a void pointer can hold any pointer type</a:t>
             </a:r>
-            <a:endParaRPr lang="en-US">
+            <a:endParaRPr lang="en-US" dirty="0">
               <a:latin typeface="Anonymous Pro for Powerline" panose="02060609030202000504" pitchFamily="49" charset="0"/>
               <a:ea typeface="Anonymous Pro for Powerline" panose="02060609030202000504" pitchFamily="49" charset="0"/>
             </a:endParaRPr>
@@ -7047,7 +7142,7 @@
               <a:buNone/>
             </a:pPr>
             <a:r>
-              <a:rPr lang="en-US" err="1">
+              <a:rPr lang="en-US" dirty="0" err="1">
                 <a:latin typeface="Anonymous Pro for Powerline" panose="02060609030202000504" pitchFamily="49" charset="0"/>
                 <a:ea typeface="Anonymous Pro for Powerline" panose="02060609030202000504" pitchFamily="49" charset="0"/>
                 <a:cs typeface="Calibri"/>
@@ -7055,7 +7150,7 @@
               <a:t>my_void_pointer</a:t>
             </a:r>
             <a:r>
-              <a:rPr lang="en-US">
+              <a:rPr lang="en-US" dirty="0">
                 <a:latin typeface="Anonymous Pro for Powerline" panose="02060609030202000504" pitchFamily="49" charset="0"/>
                 <a:ea typeface="Anonymous Pro for Powerline" panose="02060609030202000504" pitchFamily="49" charset="0"/>
                 <a:cs typeface="Calibri"/>
@@ -7063,7 +7158,7 @@
               <a:t> = &amp;</a:t>
             </a:r>
             <a:r>
-              <a:rPr lang="en-US" err="1">
+              <a:rPr lang="en-US" dirty="0" err="1">
                 <a:latin typeface="Anonymous Pro for Powerline" panose="02060609030202000504" pitchFamily="49" charset="0"/>
                 <a:ea typeface="Anonymous Pro for Powerline" panose="02060609030202000504" pitchFamily="49" charset="0"/>
                 <a:cs typeface="Calibri"/>
@@ -7071,14 +7166,14 @@
               <a:t>my_int</a:t>
             </a:r>
             <a:r>
-              <a:rPr lang="en-US">
+              <a:rPr lang="en-US" dirty="0">
                 <a:latin typeface="Anonymous Pro for Powerline" panose="02060609030202000504" pitchFamily="49" charset="0"/>
                 <a:ea typeface="Anonymous Pro for Powerline" panose="02060609030202000504" pitchFamily="49" charset="0"/>
                 <a:cs typeface="Calibri"/>
               </a:rPr>
               <a:t>;</a:t>
             </a:r>
-            <a:endParaRPr lang="en-US">
+            <a:endParaRPr lang="en-US" dirty="0">
               <a:latin typeface="Anonymous Pro for Powerline" panose="02060609030202000504" pitchFamily="49" charset="0"/>
               <a:ea typeface="Anonymous Pro for Powerline" panose="02060609030202000504" pitchFamily="49" charset="0"/>
             </a:endParaRPr>
@@ -7088,7 +7183,7 @@
               <a:buNone/>
             </a:pPr>
             <a:r>
-              <a:rPr lang="en-US" err="1">
+              <a:rPr lang="en-US" dirty="0" err="1">
                 <a:latin typeface="Anonymous Pro for Powerline" panose="02060609030202000504" pitchFamily="49" charset="0"/>
                 <a:ea typeface="Anonymous Pro for Powerline" panose="02060609030202000504" pitchFamily="49" charset="0"/>
                 <a:cs typeface="Calibri"/>
@@ -7096,7 +7191,7 @@
               <a:t>my_void_pointer</a:t>
             </a:r>
             <a:r>
-              <a:rPr lang="en-US">
+              <a:rPr lang="en-US" dirty="0">
                 <a:latin typeface="Anonymous Pro for Powerline" panose="02060609030202000504" pitchFamily="49" charset="0"/>
                 <a:ea typeface="Anonymous Pro for Powerline" panose="02060609030202000504" pitchFamily="49" charset="0"/>
                 <a:cs typeface="Calibri"/>
@@ -7104,7 +7199,7 @@
               <a:t> = &amp;</a:t>
             </a:r>
             <a:r>
-              <a:rPr lang="en-US" err="1">
+              <a:rPr lang="en-US" dirty="0" err="1">
                 <a:latin typeface="Anonymous Pro for Powerline" panose="02060609030202000504" pitchFamily="49" charset="0"/>
                 <a:ea typeface="Anonymous Pro for Powerline" panose="02060609030202000504" pitchFamily="49" charset="0"/>
                 <a:cs typeface="Calibri"/>
@@ -7112,14 +7207,14 @@
               <a:t>my_double</a:t>
             </a:r>
             <a:r>
-              <a:rPr lang="en-US">
+              <a:rPr lang="en-US" dirty="0">
                 <a:latin typeface="Anonymous Pro for Powerline" panose="02060609030202000504" pitchFamily="49" charset="0"/>
                 <a:ea typeface="Anonymous Pro for Powerline" panose="02060609030202000504" pitchFamily="49" charset="0"/>
                 <a:cs typeface="Calibri"/>
               </a:rPr>
               <a:t>;</a:t>
             </a:r>
-            <a:endParaRPr lang="en-US">
+            <a:endParaRPr lang="en-US" dirty="0">
               <a:latin typeface="Anonymous Pro for Powerline" panose="02060609030202000504" pitchFamily="49" charset="0"/>
               <a:ea typeface="Anonymous Pro for Powerline" panose="02060609030202000504" pitchFamily="49" charset="0"/>
             </a:endParaRPr>
@@ -7129,14 +7224,14 @@
               <a:buNone/>
             </a:pPr>
             <a:r>
-              <a:rPr lang="en-US">
+              <a:rPr lang="en-US" dirty="0">
                 <a:latin typeface="Anonymous Pro for Powerline" panose="02060609030202000504" pitchFamily="49" charset="0"/>
                 <a:ea typeface="Anonymous Pro for Powerline" panose="02060609030202000504" pitchFamily="49" charset="0"/>
                 <a:cs typeface="Calibri"/>
               </a:rPr>
               <a:t>  </a:t>
             </a:r>
-            <a:endParaRPr lang="en-US">
+            <a:endParaRPr lang="en-US" dirty="0">
               <a:latin typeface="Anonymous Pro for Powerline" panose="02060609030202000504" pitchFamily="49" charset="0"/>
               <a:ea typeface="Anonymous Pro for Powerline" panose="02060609030202000504" pitchFamily="49" charset="0"/>
             </a:endParaRPr>
@@ -7146,14 +7241,14 @@
               <a:buNone/>
             </a:pPr>
             <a:r>
-              <a:rPr lang="en-US">
+              <a:rPr lang="en-US" dirty="0">
                 <a:latin typeface="Anonymous Pro for Powerline" panose="02060609030202000504" pitchFamily="49" charset="0"/>
                 <a:ea typeface="Anonymous Pro for Powerline" panose="02060609030202000504" pitchFamily="49" charset="0"/>
                 <a:cs typeface="Calibri"/>
               </a:rPr>
               <a:t>//you must convert or cast back to another pointer type before use</a:t>
             </a:r>
-            <a:endParaRPr lang="en-US">
+            <a:endParaRPr lang="en-US" dirty="0">
               <a:latin typeface="Anonymous Pro for Powerline" panose="02060609030202000504" pitchFamily="49" charset="0"/>
               <a:ea typeface="Anonymous Pro for Powerline" panose="02060609030202000504" pitchFamily="49" charset="0"/>
             </a:endParaRPr>
@@ -7163,7 +7258,7 @@
               <a:buNone/>
             </a:pPr>
             <a:r>
-              <a:rPr lang="en-US">
+              <a:rPr lang="en-US" dirty="0">
                 <a:latin typeface="Anonymous Pro for Powerline" panose="02060609030202000504" pitchFamily="49" charset="0"/>
                 <a:ea typeface="Anonymous Pro for Powerline" panose="02060609030202000504" pitchFamily="49" charset="0"/>
                 <a:cs typeface="Calibri"/>
@@ -7171,7 +7266,7 @@
               <a:t>double *</a:t>
             </a:r>
             <a:r>
-              <a:rPr lang="en-US" err="1">
+              <a:rPr lang="en-US" dirty="0" err="1">
                 <a:latin typeface="Anonymous Pro for Powerline" panose="02060609030202000504" pitchFamily="49" charset="0"/>
                 <a:ea typeface="Anonymous Pro for Powerline" panose="02060609030202000504" pitchFamily="49" charset="0"/>
                 <a:cs typeface="Calibri"/>
@@ -7179,14 +7274,14 @@
               <a:t>my_double_pointer</a:t>
             </a:r>
             <a:r>
-              <a:rPr lang="en-US">
+              <a:rPr lang="en-US" dirty="0">
                 <a:latin typeface="Anonymous Pro for Powerline" panose="02060609030202000504" pitchFamily="49" charset="0"/>
                 <a:ea typeface="Anonymous Pro for Powerline" panose="02060609030202000504" pitchFamily="49" charset="0"/>
                 <a:cs typeface="Calibri"/>
               </a:rPr>
               <a:t>;</a:t>
             </a:r>
-            <a:endParaRPr lang="en-US">
+            <a:endParaRPr lang="en-US" dirty="0">
               <a:latin typeface="Anonymous Pro for Powerline" panose="02060609030202000504" pitchFamily="49" charset="0"/>
               <a:ea typeface="Anonymous Pro for Powerline" panose="02060609030202000504" pitchFamily="49" charset="0"/>
             </a:endParaRPr>
@@ -7196,7 +7291,7 @@
               <a:buNone/>
             </a:pPr>
             <a:r>
-              <a:rPr lang="en-US" err="1">
+              <a:rPr lang="en-US" dirty="0" err="1">
                 <a:latin typeface="Anonymous Pro for Powerline" panose="02060609030202000504" pitchFamily="49" charset="0"/>
                 <a:ea typeface="Anonymous Pro for Powerline" panose="02060609030202000504" pitchFamily="49" charset="0"/>
                 <a:cs typeface="Calibri"/>
@@ -7204,7 +7299,7 @@
               <a:t>my_double_pointer</a:t>
             </a:r>
             <a:r>
-              <a:rPr lang="en-US">
+              <a:rPr lang="en-US" dirty="0">
                 <a:latin typeface="Anonymous Pro for Powerline" panose="02060609030202000504" pitchFamily="49" charset="0"/>
                 <a:ea typeface="Anonymous Pro for Powerline" panose="02060609030202000504" pitchFamily="49" charset="0"/>
                 <a:cs typeface="Calibri"/>
@@ -7212,7 +7307,7 @@
               <a:t> = (double*) </a:t>
             </a:r>
             <a:r>
-              <a:rPr lang="en-US" err="1">
+              <a:rPr lang="en-US" dirty="0" err="1">
                 <a:latin typeface="Anonymous Pro for Powerline" panose="02060609030202000504" pitchFamily="49" charset="0"/>
                 <a:ea typeface="Anonymous Pro for Powerline" panose="02060609030202000504" pitchFamily="49" charset="0"/>
                 <a:cs typeface="Calibri"/>
@@ -7220,14 +7315,14 @@
               <a:t>my_void_pointer</a:t>
             </a:r>
             <a:r>
-              <a:rPr lang="en-US">
+              <a:rPr lang="en-US" dirty="0">
                 <a:latin typeface="Anonymous Pro for Powerline" panose="02060609030202000504" pitchFamily="49" charset="0"/>
                 <a:ea typeface="Anonymous Pro for Powerline" panose="02060609030202000504" pitchFamily="49" charset="0"/>
                 <a:cs typeface="Calibri"/>
               </a:rPr>
               <a:t>;</a:t>
             </a:r>
-            <a:endParaRPr lang="en-US">
+            <a:endParaRPr lang="en-US" dirty="0">
               <a:latin typeface="Anonymous Pro for Powerline" panose="02060609030202000504" pitchFamily="49" charset="0"/>
               <a:ea typeface="Anonymous Pro for Powerline" panose="02060609030202000504" pitchFamily="49" charset="0"/>
             </a:endParaRPr>
@@ -7237,7 +7332,7 @@
               <a:buNone/>
             </a:pPr>
             <a:r>
-              <a:rPr lang="en-US">
+              <a:rPr lang="en-US" dirty="0">
                 <a:latin typeface="Anonymous Pro for Powerline" panose="02060609030202000504" pitchFamily="49" charset="0"/>
                 <a:ea typeface="Anonymous Pro for Powerline" panose="02060609030202000504" pitchFamily="49" charset="0"/>
                 <a:cs typeface="Calibri"/>
@@ -7245,7 +7340,7 @@
               <a:t>double </a:t>
             </a:r>
             <a:r>
-              <a:rPr lang="en-US" err="1">
+              <a:rPr lang="en-US" dirty="0" err="1">
                 <a:latin typeface="Anonymous Pro for Powerline" panose="02060609030202000504" pitchFamily="49" charset="0"/>
                 <a:ea typeface="Anonymous Pro for Powerline" panose="02060609030202000504" pitchFamily="49" charset="0"/>
                 <a:cs typeface="Calibri"/>
@@ -7253,7 +7348,7 @@
               <a:t>val_as_double</a:t>
             </a:r>
             <a:r>
-              <a:rPr lang="en-US">
+              <a:rPr lang="en-US" dirty="0">
                 <a:latin typeface="Anonymous Pro for Powerline" panose="02060609030202000504" pitchFamily="49" charset="0"/>
                 <a:ea typeface="Anonymous Pro for Powerline" panose="02060609030202000504" pitchFamily="49" charset="0"/>
                 <a:cs typeface="Calibri"/>
@@ -7261,7 +7356,7 @@
               <a:t> = *</a:t>
             </a:r>
             <a:r>
-              <a:rPr lang="en-US" err="1">
+              <a:rPr lang="en-US" dirty="0" err="1">
                 <a:latin typeface="Anonymous Pro for Powerline" panose="02060609030202000504" pitchFamily="49" charset="0"/>
                 <a:ea typeface="Anonymous Pro for Powerline" panose="02060609030202000504" pitchFamily="49" charset="0"/>
                 <a:cs typeface="Calibri"/>
@@ -7269,14 +7364,14 @@
               <a:t>my_double_pointer</a:t>
             </a:r>
             <a:r>
-              <a:rPr lang="en-US">
+              <a:rPr lang="en-US" dirty="0">
                 <a:latin typeface="Anonymous Pro for Powerline" panose="02060609030202000504" pitchFamily="49" charset="0"/>
                 <a:ea typeface="Anonymous Pro for Powerline" panose="02060609030202000504" pitchFamily="49" charset="0"/>
                 <a:cs typeface="Calibri"/>
               </a:rPr>
               <a:t>;</a:t>
             </a:r>
-            <a:endParaRPr lang="en-US">
+            <a:endParaRPr lang="en-US" dirty="0">
               <a:latin typeface="Anonymous Pro for Powerline" panose="02060609030202000504" pitchFamily="49" charset="0"/>
               <a:ea typeface="Anonymous Pro for Powerline" panose="02060609030202000504" pitchFamily="49" charset="0"/>
             </a:endParaRPr>
@@ -7286,7 +7381,7 @@
               <a:buNone/>
             </a:pPr>
             <a:r>
-              <a:rPr lang="en-US" err="1">
+              <a:rPr lang="en-US" dirty="0" err="1">
                 <a:latin typeface="Anonymous Pro for Powerline" panose="02060609030202000504" pitchFamily="49" charset="0"/>
                 <a:ea typeface="Anonymous Pro for Powerline" panose="02060609030202000504" pitchFamily="49" charset="0"/>
                 <a:cs typeface="Calibri"/>
@@ -7294,7 +7389,7 @@
               <a:t>printf</a:t>
             </a:r>
             <a:r>
-              <a:rPr lang="en-US">
+              <a:rPr lang="en-US" dirty="0">
                 <a:latin typeface="Anonymous Pro for Powerline" panose="02060609030202000504" pitchFamily="49" charset="0"/>
                 <a:ea typeface="Anonymous Pro for Powerline" panose="02060609030202000504" pitchFamily="49" charset="0"/>
                 <a:cs typeface="Calibri"/>
@@ -7302,7 +7397,7 @@
               <a:t>("double value: %f\n", </a:t>
             </a:r>
             <a:r>
-              <a:rPr lang="en-US" err="1">
+              <a:rPr lang="en-US" dirty="0" err="1">
                 <a:latin typeface="Anonymous Pro for Powerline" panose="02060609030202000504" pitchFamily="49" charset="0"/>
                 <a:ea typeface="Anonymous Pro for Powerline" panose="02060609030202000504" pitchFamily="49" charset="0"/>
                 <a:cs typeface="Calibri"/>
@@ -7310,14 +7405,14 @@
               <a:t>val_as_double</a:t>
             </a:r>
             <a:r>
-              <a:rPr lang="en-US">
+              <a:rPr lang="en-US" dirty="0">
                 <a:latin typeface="Anonymous Pro for Powerline" panose="02060609030202000504" pitchFamily="49" charset="0"/>
                 <a:ea typeface="Anonymous Pro for Powerline" panose="02060609030202000504" pitchFamily="49" charset="0"/>
                 <a:cs typeface="Calibri"/>
               </a:rPr>
               <a:t>);</a:t>
             </a:r>
-            <a:endParaRPr lang="en-US">
+            <a:endParaRPr lang="en-US" dirty="0">
               <a:latin typeface="Anonymous Pro for Powerline" panose="02060609030202000504" pitchFamily="49" charset="0"/>
               <a:ea typeface="Anonymous Pro for Powerline" panose="02060609030202000504" pitchFamily="49" charset="0"/>
             </a:endParaRPr>

</xml_diff>